<commit_message>
Added readme and gitignore
</commit_message>
<xml_diff>
--- a/Presentation6.pptx
+++ b/Presentation6.pptx
@@ -4,11 +4,17 @@
   <p:sldMasterIdLst>
     <p:sldMasterId id="2147483648" r:id="rId1"/>
   </p:sldMasterIdLst>
+  <p:notesMasterIdLst>
+    <p:notesMasterId r:id="rId13"/>
+  </p:notesMasterIdLst>
+  <p:handoutMasterIdLst>
+    <p:handoutMasterId r:id="rId14"/>
+  </p:handoutMasterIdLst>
   <p:sldIdLst>
     <p:sldId id="256" r:id="rId2"/>
     <p:sldId id="262" r:id="rId3"/>
-    <p:sldId id="267" r:id="rId4"/>
-    <p:sldId id="263" r:id="rId5"/>
+    <p:sldId id="270" r:id="rId4"/>
+    <p:sldId id="272" r:id="rId5"/>
     <p:sldId id="265" r:id="rId6"/>
     <p:sldId id="261" r:id="rId7"/>
     <p:sldId id="258" r:id="rId8"/>
@@ -117,6 +123,799 @@
 </p:presentation>
 </file>
 
+<file path=ppt/handoutMasters/handoutMaster1.xml><?xml version="1.0" encoding="utf-8"?>
+<p:handoutMaster xmlns:a="http://schemas.openxmlformats.org/drawingml/2006/main" xmlns:r="http://schemas.openxmlformats.org/officeDocument/2006/relationships" xmlns:p="http://schemas.openxmlformats.org/presentationml/2006/main">
+  <p:cSld>
+    <p:bg>
+      <p:bgRef idx="1001">
+        <a:schemeClr val="bg1"/>
+      </p:bgRef>
+    </p:bg>
+    <p:spTree>
+      <p:nvGrpSpPr>
+        <p:cNvPr id="1" name=""/>
+        <p:cNvGrpSpPr/>
+        <p:nvPr/>
+      </p:nvGrpSpPr>
+      <p:grpSpPr>
+        <a:xfrm>
+          <a:off x="0" y="0"/>
+          <a:ext cx="0" cy="0"/>
+          <a:chOff x="0" y="0"/>
+          <a:chExt cx="0" cy="0"/>
+        </a:xfrm>
+      </p:grpSpPr>
+      <p:sp>
+        <p:nvSpPr>
+          <p:cNvPr id="2" name="Header Placeholder 1">
+            <a:extLst>
+              <a:ext uri="{FF2B5EF4-FFF2-40B4-BE49-F238E27FC236}">
+                <a16:creationId xmlns:a16="http://schemas.microsoft.com/office/drawing/2014/main" id="{ABF44120-52EA-F743-ABBE-2F6887BB300C}"/>
+              </a:ext>
+            </a:extLst>
+          </p:cNvPr>
+          <p:cNvSpPr>
+            <a:spLocks noGrp="1"/>
+          </p:cNvSpPr>
+          <p:nvPr>
+            <p:ph type="hdr" sz="quarter"/>
+          </p:nvPr>
+        </p:nvSpPr>
+        <p:spPr>
+          <a:xfrm>
+            <a:off x="0" y="0"/>
+            <a:ext cx="2971800" cy="458788"/>
+          </a:xfrm>
+          <a:prstGeom prst="rect">
+            <a:avLst/>
+          </a:prstGeom>
+        </p:spPr>
+        <p:txBody>
+          <a:bodyPr vert="horz" lIns="91440" tIns="45720" rIns="91440" bIns="45720" rtlCol="0"/>
+          <a:lstStyle>
+            <a:lvl1pPr algn="l">
+              <a:defRPr sz="1200"/>
+            </a:lvl1pPr>
+          </a:lstStyle>
+          <a:p>
+            <a:endParaRPr lang="en-US"/>
+          </a:p>
+        </p:txBody>
+      </p:sp>
+      <p:sp>
+        <p:nvSpPr>
+          <p:cNvPr id="3" name="Date Placeholder 2">
+            <a:extLst>
+              <a:ext uri="{FF2B5EF4-FFF2-40B4-BE49-F238E27FC236}">
+                <a16:creationId xmlns:a16="http://schemas.microsoft.com/office/drawing/2014/main" id="{096A86C0-5ED6-F44B-8CEF-EAA69653F9AE}"/>
+              </a:ext>
+            </a:extLst>
+          </p:cNvPr>
+          <p:cNvSpPr>
+            <a:spLocks noGrp="1"/>
+          </p:cNvSpPr>
+          <p:nvPr>
+            <p:ph type="dt" sz="quarter" idx="1"/>
+          </p:nvPr>
+        </p:nvSpPr>
+        <p:spPr>
+          <a:xfrm>
+            <a:off x="3884613" y="0"/>
+            <a:ext cx="2971800" cy="458788"/>
+          </a:xfrm>
+          <a:prstGeom prst="rect">
+            <a:avLst/>
+          </a:prstGeom>
+        </p:spPr>
+        <p:txBody>
+          <a:bodyPr vert="horz" lIns="91440" tIns="45720" rIns="91440" bIns="45720" rtlCol="0"/>
+          <a:lstStyle>
+            <a:lvl1pPr algn="r">
+              <a:defRPr sz="1200"/>
+            </a:lvl1pPr>
+          </a:lstStyle>
+          <a:p>
+            <a:fld id="{0AFC1C30-F44C-2C44-8CE0-A38EAA5B5623}" type="datetimeFigureOut">
+              <a:rPr lang="en-US" smtClean="0"/>
+              <a:t>9/25/20</a:t>
+            </a:fld>
+            <a:endParaRPr lang="en-US"/>
+          </a:p>
+        </p:txBody>
+      </p:sp>
+      <p:sp>
+        <p:nvSpPr>
+          <p:cNvPr id="4" name="Footer Placeholder 3">
+            <a:extLst>
+              <a:ext uri="{FF2B5EF4-FFF2-40B4-BE49-F238E27FC236}">
+                <a16:creationId xmlns:a16="http://schemas.microsoft.com/office/drawing/2014/main" id="{012901CF-7E31-4643-9F7F-3F495F0A2AD9}"/>
+              </a:ext>
+            </a:extLst>
+          </p:cNvPr>
+          <p:cNvSpPr>
+            <a:spLocks noGrp="1"/>
+          </p:cNvSpPr>
+          <p:nvPr>
+            <p:ph type="ftr" sz="quarter" idx="2"/>
+          </p:nvPr>
+        </p:nvSpPr>
+        <p:spPr>
+          <a:xfrm>
+            <a:off x="0" y="8685213"/>
+            <a:ext cx="2971800" cy="458787"/>
+          </a:xfrm>
+          <a:prstGeom prst="rect">
+            <a:avLst/>
+          </a:prstGeom>
+        </p:spPr>
+        <p:txBody>
+          <a:bodyPr vert="horz" lIns="91440" tIns="45720" rIns="91440" bIns="45720" rtlCol="0" anchor="b"/>
+          <a:lstStyle>
+            <a:lvl1pPr algn="l">
+              <a:defRPr sz="1200"/>
+            </a:lvl1pPr>
+          </a:lstStyle>
+          <a:p>
+            <a:endParaRPr lang="en-US"/>
+          </a:p>
+        </p:txBody>
+      </p:sp>
+      <p:sp>
+        <p:nvSpPr>
+          <p:cNvPr id="5" name="Slide Number Placeholder 4">
+            <a:extLst>
+              <a:ext uri="{FF2B5EF4-FFF2-40B4-BE49-F238E27FC236}">
+                <a16:creationId xmlns:a16="http://schemas.microsoft.com/office/drawing/2014/main" id="{B02693C2-EA55-B842-9A81-E5C0A4367DB9}"/>
+              </a:ext>
+            </a:extLst>
+          </p:cNvPr>
+          <p:cNvSpPr>
+            <a:spLocks noGrp="1"/>
+          </p:cNvSpPr>
+          <p:nvPr>
+            <p:ph type="sldNum" sz="quarter" idx="3"/>
+          </p:nvPr>
+        </p:nvSpPr>
+        <p:spPr>
+          <a:xfrm>
+            <a:off x="3884613" y="8685213"/>
+            <a:ext cx="2971800" cy="458787"/>
+          </a:xfrm>
+          <a:prstGeom prst="rect">
+            <a:avLst/>
+          </a:prstGeom>
+        </p:spPr>
+        <p:txBody>
+          <a:bodyPr vert="horz" lIns="91440" tIns="45720" rIns="91440" bIns="45720" rtlCol="0" anchor="b"/>
+          <a:lstStyle>
+            <a:lvl1pPr algn="r">
+              <a:defRPr sz="1200"/>
+            </a:lvl1pPr>
+          </a:lstStyle>
+          <a:p>
+            <a:fld id="{85F48282-8218-F141-860C-FC8271BDA9D1}" type="slidenum">
+              <a:rPr lang="en-US" smtClean="0"/>
+              <a:t>‹#›</a:t>
+            </a:fld>
+            <a:endParaRPr lang="en-US"/>
+          </a:p>
+        </p:txBody>
+      </p:sp>
+    </p:spTree>
+    <p:extLst>
+      <p:ext uri="{BB962C8B-B14F-4D97-AF65-F5344CB8AC3E}">
+        <p14:creationId xmlns:p14="http://schemas.microsoft.com/office/powerpoint/2010/main" val="299696851"/>
+      </p:ext>
+    </p:extLst>
+  </p:cSld>
+  <p:clrMap bg1="lt1" tx1="dk1" bg2="lt2" tx2="dk2" accent1="accent1" accent2="accent2" accent3="accent3" accent4="accent4" accent5="accent5" accent6="accent6" hlink="hlink" folHlink="folHlink"/>
+</p:handoutMaster>
+</file>
+
+<file path=ppt/notesMasters/notesMaster1.xml><?xml version="1.0" encoding="utf-8"?>
+<p:notesMaster xmlns:a="http://schemas.openxmlformats.org/drawingml/2006/main" xmlns:r="http://schemas.openxmlformats.org/officeDocument/2006/relationships" xmlns:p="http://schemas.openxmlformats.org/presentationml/2006/main">
+  <p:cSld>
+    <p:bg>
+      <p:bgRef idx="1001">
+        <a:schemeClr val="bg1"/>
+      </p:bgRef>
+    </p:bg>
+    <p:spTree>
+      <p:nvGrpSpPr>
+        <p:cNvPr id="1" name=""/>
+        <p:cNvGrpSpPr/>
+        <p:nvPr/>
+      </p:nvGrpSpPr>
+      <p:grpSpPr>
+        <a:xfrm>
+          <a:off x="0" y="0"/>
+          <a:ext cx="0" cy="0"/>
+          <a:chOff x="0" y="0"/>
+          <a:chExt cx="0" cy="0"/>
+        </a:xfrm>
+      </p:grpSpPr>
+      <p:sp>
+        <p:nvSpPr>
+          <p:cNvPr id="2" name="Header Placeholder 1"/>
+          <p:cNvSpPr>
+            <a:spLocks noGrp="1"/>
+          </p:cNvSpPr>
+          <p:nvPr>
+            <p:ph type="hdr" sz="quarter"/>
+          </p:nvPr>
+        </p:nvSpPr>
+        <p:spPr>
+          <a:xfrm>
+            <a:off x="0" y="0"/>
+            <a:ext cx="2971800" cy="458788"/>
+          </a:xfrm>
+          <a:prstGeom prst="rect">
+            <a:avLst/>
+          </a:prstGeom>
+        </p:spPr>
+        <p:txBody>
+          <a:bodyPr vert="horz" lIns="91440" tIns="45720" rIns="91440" bIns="45720" rtlCol="0"/>
+          <a:lstStyle>
+            <a:lvl1pPr algn="l">
+              <a:defRPr sz="1200"/>
+            </a:lvl1pPr>
+          </a:lstStyle>
+          <a:p>
+            <a:endParaRPr lang="en-US"/>
+          </a:p>
+        </p:txBody>
+      </p:sp>
+      <p:sp>
+        <p:nvSpPr>
+          <p:cNvPr id="3" name="Date Placeholder 2"/>
+          <p:cNvSpPr>
+            <a:spLocks noGrp="1"/>
+          </p:cNvSpPr>
+          <p:nvPr>
+            <p:ph type="dt" idx="1"/>
+          </p:nvPr>
+        </p:nvSpPr>
+        <p:spPr>
+          <a:xfrm>
+            <a:off x="3884613" y="0"/>
+            <a:ext cx="2971800" cy="458788"/>
+          </a:xfrm>
+          <a:prstGeom prst="rect">
+            <a:avLst/>
+          </a:prstGeom>
+        </p:spPr>
+        <p:txBody>
+          <a:bodyPr vert="horz" lIns="91440" tIns="45720" rIns="91440" bIns="45720" rtlCol="0"/>
+          <a:lstStyle>
+            <a:lvl1pPr algn="r">
+              <a:defRPr sz="1200"/>
+            </a:lvl1pPr>
+          </a:lstStyle>
+          <a:p>
+            <a:fld id="{A11C6DF8-DABD-4042-9E30-CFC69C4C3C74}" type="datetimeFigureOut">
+              <a:rPr lang="en-US" smtClean="0"/>
+              <a:t>9/24/20</a:t>
+            </a:fld>
+            <a:endParaRPr lang="en-US"/>
+          </a:p>
+        </p:txBody>
+      </p:sp>
+      <p:sp>
+        <p:nvSpPr>
+          <p:cNvPr id="4" name="Slide Image Placeholder 3"/>
+          <p:cNvSpPr>
+            <a:spLocks noGrp="1" noRot="1" noChangeAspect="1"/>
+          </p:cNvSpPr>
+          <p:nvPr>
+            <p:ph type="sldImg" idx="2"/>
+          </p:nvPr>
+        </p:nvSpPr>
+        <p:spPr>
+          <a:xfrm>
+            <a:off x="685800" y="1143000"/>
+            <a:ext cx="5486400" cy="3086100"/>
+          </a:xfrm>
+          <a:prstGeom prst="rect">
+            <a:avLst/>
+          </a:prstGeom>
+          <a:noFill/>
+          <a:ln w="12700">
+            <a:solidFill>
+              <a:prstClr val="black"/>
+            </a:solidFill>
+          </a:ln>
+        </p:spPr>
+        <p:txBody>
+          <a:bodyPr vert="horz" lIns="91440" tIns="45720" rIns="91440" bIns="45720" rtlCol="0" anchor="ctr"/>
+          <a:lstStyle/>
+          <a:p>
+            <a:endParaRPr lang="en-US"/>
+          </a:p>
+        </p:txBody>
+      </p:sp>
+      <p:sp>
+        <p:nvSpPr>
+          <p:cNvPr id="5" name="Notes Placeholder 4"/>
+          <p:cNvSpPr>
+            <a:spLocks noGrp="1"/>
+          </p:cNvSpPr>
+          <p:nvPr>
+            <p:ph type="body" sz="quarter" idx="3"/>
+          </p:nvPr>
+        </p:nvSpPr>
+        <p:spPr>
+          <a:xfrm>
+            <a:off x="685800" y="4400550"/>
+            <a:ext cx="5486400" cy="3600450"/>
+          </a:xfrm>
+          <a:prstGeom prst="rect">
+            <a:avLst/>
+          </a:prstGeom>
+        </p:spPr>
+        <p:txBody>
+          <a:bodyPr vert="horz" lIns="91440" tIns="45720" rIns="91440" bIns="45720" rtlCol="0"/>
+          <a:lstStyle/>
+          <a:p>
+            <a:pPr lvl="0"/>
+            <a:r>
+              <a:rPr lang="en-US"/>
+              <a:t>Click to edit Master text styles</a:t>
+            </a:r>
+          </a:p>
+          <a:p>
+            <a:pPr lvl="1"/>
+            <a:r>
+              <a:rPr lang="en-US"/>
+              <a:t>Second level</a:t>
+            </a:r>
+          </a:p>
+          <a:p>
+            <a:pPr lvl="2"/>
+            <a:r>
+              <a:rPr lang="en-US"/>
+              <a:t>Third level</a:t>
+            </a:r>
+          </a:p>
+          <a:p>
+            <a:pPr lvl="3"/>
+            <a:r>
+              <a:rPr lang="en-US"/>
+              <a:t>Fourth level</a:t>
+            </a:r>
+          </a:p>
+          <a:p>
+            <a:pPr lvl="4"/>
+            <a:r>
+              <a:rPr lang="en-US"/>
+              <a:t>Fifth level</a:t>
+            </a:r>
+          </a:p>
+        </p:txBody>
+      </p:sp>
+      <p:sp>
+        <p:nvSpPr>
+          <p:cNvPr id="6" name="Footer Placeholder 5"/>
+          <p:cNvSpPr>
+            <a:spLocks noGrp="1"/>
+          </p:cNvSpPr>
+          <p:nvPr>
+            <p:ph type="ftr" sz="quarter" idx="4"/>
+          </p:nvPr>
+        </p:nvSpPr>
+        <p:spPr>
+          <a:xfrm>
+            <a:off x="0" y="8685213"/>
+            <a:ext cx="2971800" cy="458787"/>
+          </a:xfrm>
+          <a:prstGeom prst="rect">
+            <a:avLst/>
+          </a:prstGeom>
+        </p:spPr>
+        <p:txBody>
+          <a:bodyPr vert="horz" lIns="91440" tIns="45720" rIns="91440" bIns="45720" rtlCol="0" anchor="b"/>
+          <a:lstStyle>
+            <a:lvl1pPr algn="l">
+              <a:defRPr sz="1200"/>
+            </a:lvl1pPr>
+          </a:lstStyle>
+          <a:p>
+            <a:endParaRPr lang="en-US"/>
+          </a:p>
+        </p:txBody>
+      </p:sp>
+      <p:sp>
+        <p:nvSpPr>
+          <p:cNvPr id="7" name="Slide Number Placeholder 6"/>
+          <p:cNvSpPr>
+            <a:spLocks noGrp="1"/>
+          </p:cNvSpPr>
+          <p:nvPr>
+            <p:ph type="sldNum" sz="quarter" idx="5"/>
+          </p:nvPr>
+        </p:nvSpPr>
+        <p:spPr>
+          <a:xfrm>
+            <a:off x="3884613" y="8685213"/>
+            <a:ext cx="2971800" cy="458787"/>
+          </a:xfrm>
+          <a:prstGeom prst="rect">
+            <a:avLst/>
+          </a:prstGeom>
+        </p:spPr>
+        <p:txBody>
+          <a:bodyPr vert="horz" lIns="91440" tIns="45720" rIns="91440" bIns="45720" rtlCol="0" anchor="b"/>
+          <a:lstStyle>
+            <a:lvl1pPr algn="r">
+              <a:defRPr sz="1200"/>
+            </a:lvl1pPr>
+          </a:lstStyle>
+          <a:p>
+            <a:fld id="{3CFD093F-147C-534F-828E-C80044553B62}" type="slidenum">
+              <a:rPr lang="en-US" smtClean="0"/>
+              <a:t>‹#›</a:t>
+            </a:fld>
+            <a:endParaRPr lang="en-US"/>
+          </a:p>
+        </p:txBody>
+      </p:sp>
+    </p:spTree>
+    <p:extLst>
+      <p:ext uri="{BB962C8B-B14F-4D97-AF65-F5344CB8AC3E}">
+        <p14:creationId xmlns:p14="http://schemas.microsoft.com/office/powerpoint/2010/main" val="1512652169"/>
+      </p:ext>
+    </p:extLst>
+  </p:cSld>
+  <p:clrMap bg1="lt1" tx1="dk1" bg2="lt2" tx2="dk2" accent1="accent1" accent2="accent2" accent3="accent3" accent4="accent4" accent5="accent5" accent6="accent6" hlink="hlink" folHlink="folHlink"/>
+  <p:notesStyle>
+    <a:lvl1pPr marL="0" algn="l" defTabSz="914400" rtl="0" eaLnBrk="1" latinLnBrk="0" hangingPunct="1">
+      <a:defRPr sz="1200" kern="1200">
+        <a:solidFill>
+          <a:schemeClr val="tx1"/>
+        </a:solidFill>
+        <a:latin typeface="+mn-lt"/>
+        <a:ea typeface="+mn-ea"/>
+        <a:cs typeface="+mn-cs"/>
+      </a:defRPr>
+    </a:lvl1pPr>
+    <a:lvl2pPr marL="457200" algn="l" defTabSz="914400" rtl="0" eaLnBrk="1" latinLnBrk="0" hangingPunct="1">
+      <a:defRPr sz="1200" kern="1200">
+        <a:solidFill>
+          <a:schemeClr val="tx1"/>
+        </a:solidFill>
+        <a:latin typeface="+mn-lt"/>
+        <a:ea typeface="+mn-ea"/>
+        <a:cs typeface="+mn-cs"/>
+      </a:defRPr>
+    </a:lvl2pPr>
+    <a:lvl3pPr marL="914400" algn="l" defTabSz="914400" rtl="0" eaLnBrk="1" latinLnBrk="0" hangingPunct="1">
+      <a:defRPr sz="1200" kern="1200">
+        <a:solidFill>
+          <a:schemeClr val="tx1"/>
+        </a:solidFill>
+        <a:latin typeface="+mn-lt"/>
+        <a:ea typeface="+mn-ea"/>
+        <a:cs typeface="+mn-cs"/>
+      </a:defRPr>
+    </a:lvl3pPr>
+    <a:lvl4pPr marL="1371600" algn="l" defTabSz="914400" rtl="0" eaLnBrk="1" latinLnBrk="0" hangingPunct="1">
+      <a:defRPr sz="1200" kern="1200">
+        <a:solidFill>
+          <a:schemeClr val="tx1"/>
+        </a:solidFill>
+        <a:latin typeface="+mn-lt"/>
+        <a:ea typeface="+mn-ea"/>
+        <a:cs typeface="+mn-cs"/>
+      </a:defRPr>
+    </a:lvl4pPr>
+    <a:lvl5pPr marL="1828800" algn="l" defTabSz="914400" rtl="0" eaLnBrk="1" latinLnBrk="0" hangingPunct="1">
+      <a:defRPr sz="1200" kern="1200">
+        <a:solidFill>
+          <a:schemeClr val="tx1"/>
+        </a:solidFill>
+        <a:latin typeface="+mn-lt"/>
+        <a:ea typeface="+mn-ea"/>
+        <a:cs typeface="+mn-cs"/>
+      </a:defRPr>
+    </a:lvl5pPr>
+    <a:lvl6pPr marL="2286000" algn="l" defTabSz="914400" rtl="0" eaLnBrk="1" latinLnBrk="0" hangingPunct="1">
+      <a:defRPr sz="1200" kern="1200">
+        <a:solidFill>
+          <a:schemeClr val="tx1"/>
+        </a:solidFill>
+        <a:latin typeface="+mn-lt"/>
+        <a:ea typeface="+mn-ea"/>
+        <a:cs typeface="+mn-cs"/>
+      </a:defRPr>
+    </a:lvl6pPr>
+    <a:lvl7pPr marL="2743200" algn="l" defTabSz="914400" rtl="0" eaLnBrk="1" latinLnBrk="0" hangingPunct="1">
+      <a:defRPr sz="1200" kern="1200">
+        <a:solidFill>
+          <a:schemeClr val="tx1"/>
+        </a:solidFill>
+        <a:latin typeface="+mn-lt"/>
+        <a:ea typeface="+mn-ea"/>
+        <a:cs typeface="+mn-cs"/>
+      </a:defRPr>
+    </a:lvl7pPr>
+    <a:lvl8pPr marL="3200400" algn="l" defTabSz="914400" rtl="0" eaLnBrk="1" latinLnBrk="0" hangingPunct="1">
+      <a:defRPr sz="1200" kern="1200">
+        <a:solidFill>
+          <a:schemeClr val="tx1"/>
+        </a:solidFill>
+        <a:latin typeface="+mn-lt"/>
+        <a:ea typeface="+mn-ea"/>
+        <a:cs typeface="+mn-cs"/>
+      </a:defRPr>
+    </a:lvl8pPr>
+    <a:lvl9pPr marL="3657600" algn="l" defTabSz="914400" rtl="0" eaLnBrk="1" latinLnBrk="0" hangingPunct="1">
+      <a:defRPr sz="1200" kern="1200">
+        <a:solidFill>
+          <a:schemeClr val="tx1"/>
+        </a:solidFill>
+        <a:latin typeface="+mn-lt"/>
+        <a:ea typeface="+mn-ea"/>
+        <a:cs typeface="+mn-cs"/>
+      </a:defRPr>
+    </a:lvl9pPr>
+  </p:notesStyle>
+</p:notesMaster>
+</file>
+
+<file path=ppt/notesSlides/notesSlide1.xml><?xml version="1.0" encoding="utf-8"?>
+<p:notes xmlns:a="http://schemas.openxmlformats.org/drawingml/2006/main" xmlns:r="http://schemas.openxmlformats.org/officeDocument/2006/relationships" xmlns:p="http://schemas.openxmlformats.org/presentationml/2006/main">
+  <p:cSld>
+    <p:spTree>
+      <p:nvGrpSpPr>
+        <p:cNvPr id="1" name=""/>
+        <p:cNvGrpSpPr/>
+        <p:nvPr/>
+      </p:nvGrpSpPr>
+      <p:grpSpPr>
+        <a:xfrm>
+          <a:off x="0" y="0"/>
+          <a:ext cx="0" cy="0"/>
+          <a:chOff x="0" y="0"/>
+          <a:chExt cx="0" cy="0"/>
+        </a:xfrm>
+      </p:grpSpPr>
+      <p:sp>
+        <p:nvSpPr>
+          <p:cNvPr id="2" name="Slide Image Placeholder 1"/>
+          <p:cNvSpPr>
+            <a:spLocks noGrp="1" noRot="1" noChangeAspect="1"/>
+          </p:cNvSpPr>
+          <p:nvPr>
+            <p:ph type="sldImg"/>
+          </p:nvPr>
+        </p:nvSpPr>
+        <p:spPr/>
+      </p:sp>
+      <p:sp>
+        <p:nvSpPr>
+          <p:cNvPr id="3" name="Notes Placeholder 2"/>
+          <p:cNvSpPr>
+            <a:spLocks noGrp="1"/>
+          </p:cNvSpPr>
+          <p:nvPr>
+            <p:ph type="body" idx="1"/>
+          </p:nvPr>
+        </p:nvSpPr>
+        <p:spPr/>
+        <p:txBody>
+          <a:bodyPr/>
+          <a:lstStyle/>
+          <a:p>
+            <a:r>
+              <a:rPr lang="en-US" dirty="0"/>
+              <a:t>GOOD MORNING, MY NAME IS DAWN WALKER. MY TOPIC OF DISCUSSION TODAY IN ‘HIDDEN DISPARITIES IN INSURANCE CHARGES’</a:t>
+            </a:r>
+          </a:p>
+        </p:txBody>
+      </p:sp>
+      <p:sp>
+        <p:nvSpPr>
+          <p:cNvPr id="4" name="Slide Number Placeholder 3"/>
+          <p:cNvSpPr>
+            <a:spLocks noGrp="1"/>
+          </p:cNvSpPr>
+          <p:nvPr>
+            <p:ph type="sldNum" sz="quarter" idx="5"/>
+          </p:nvPr>
+        </p:nvSpPr>
+        <p:spPr/>
+        <p:txBody>
+          <a:bodyPr/>
+          <a:lstStyle/>
+          <a:p>
+            <a:fld id="{3CFD093F-147C-534F-828E-C80044553B62}" type="slidenum">
+              <a:rPr lang="en-US" smtClean="0"/>
+              <a:t>1</a:t>
+            </a:fld>
+            <a:endParaRPr lang="en-US"/>
+          </a:p>
+        </p:txBody>
+      </p:sp>
+    </p:spTree>
+    <p:extLst>
+      <p:ext uri="{BB962C8B-B14F-4D97-AF65-F5344CB8AC3E}">
+        <p14:creationId xmlns:p14="http://schemas.microsoft.com/office/powerpoint/2010/main" val="4249968086"/>
+      </p:ext>
+    </p:extLst>
+  </p:cSld>
+  <p:clrMapOvr>
+    <a:masterClrMapping/>
+  </p:clrMapOvr>
+</p:notes>
+</file>
+
+<file path=ppt/notesSlides/notesSlide2.xml><?xml version="1.0" encoding="utf-8"?>
+<p:notes xmlns:a="http://schemas.openxmlformats.org/drawingml/2006/main" xmlns:r="http://schemas.openxmlformats.org/officeDocument/2006/relationships" xmlns:p="http://schemas.openxmlformats.org/presentationml/2006/main">
+  <p:cSld>
+    <p:spTree>
+      <p:nvGrpSpPr>
+        <p:cNvPr id="1" name=""/>
+        <p:cNvGrpSpPr/>
+        <p:nvPr/>
+      </p:nvGrpSpPr>
+      <p:grpSpPr>
+        <a:xfrm>
+          <a:off x="0" y="0"/>
+          <a:ext cx="0" cy="0"/>
+          <a:chOff x="0" y="0"/>
+          <a:chExt cx="0" cy="0"/>
+        </a:xfrm>
+      </p:grpSpPr>
+      <p:sp>
+        <p:nvSpPr>
+          <p:cNvPr id="2" name="Slide Image Placeholder 1"/>
+          <p:cNvSpPr>
+            <a:spLocks noGrp="1" noRot="1" noChangeAspect="1"/>
+          </p:cNvSpPr>
+          <p:nvPr>
+            <p:ph type="sldImg"/>
+          </p:nvPr>
+        </p:nvSpPr>
+        <p:spPr/>
+      </p:sp>
+      <p:sp>
+        <p:nvSpPr>
+          <p:cNvPr id="3" name="Notes Placeholder 2"/>
+          <p:cNvSpPr>
+            <a:spLocks noGrp="1"/>
+          </p:cNvSpPr>
+          <p:nvPr>
+            <p:ph type="body" idx="1"/>
+          </p:nvPr>
+        </p:nvSpPr>
+        <p:spPr/>
+        <p:txBody>
+          <a:bodyPr/>
+          <a:lstStyle/>
+          <a:p>
+            <a:endParaRPr lang="en-US" dirty="0"/>
+          </a:p>
+        </p:txBody>
+      </p:sp>
+      <p:sp>
+        <p:nvSpPr>
+          <p:cNvPr id="4" name="Slide Number Placeholder 3"/>
+          <p:cNvSpPr>
+            <a:spLocks noGrp="1"/>
+          </p:cNvSpPr>
+          <p:nvPr>
+            <p:ph type="sldNum" sz="quarter" idx="5"/>
+          </p:nvPr>
+        </p:nvSpPr>
+        <p:spPr/>
+        <p:txBody>
+          <a:bodyPr/>
+          <a:lstStyle/>
+          <a:p>
+            <a:fld id="{3CFD093F-147C-534F-828E-C80044553B62}" type="slidenum">
+              <a:rPr lang="en-US" smtClean="0"/>
+              <a:t>2</a:t>
+            </a:fld>
+            <a:endParaRPr lang="en-US"/>
+          </a:p>
+        </p:txBody>
+      </p:sp>
+    </p:spTree>
+    <p:extLst>
+      <p:ext uri="{BB962C8B-B14F-4D97-AF65-F5344CB8AC3E}">
+        <p14:creationId xmlns:p14="http://schemas.microsoft.com/office/powerpoint/2010/main" val="3958077032"/>
+      </p:ext>
+    </p:extLst>
+  </p:cSld>
+  <p:clrMapOvr>
+    <a:masterClrMapping/>
+  </p:clrMapOvr>
+</p:notes>
+</file>
+
+<file path=ppt/notesSlides/notesSlide3.xml><?xml version="1.0" encoding="utf-8"?>
+<p:notes xmlns:a="http://schemas.openxmlformats.org/drawingml/2006/main" xmlns:r="http://schemas.openxmlformats.org/officeDocument/2006/relationships" xmlns:p="http://schemas.openxmlformats.org/presentationml/2006/main">
+  <p:cSld>
+    <p:spTree>
+      <p:nvGrpSpPr>
+        <p:cNvPr id="1" name=""/>
+        <p:cNvGrpSpPr/>
+        <p:nvPr/>
+      </p:nvGrpSpPr>
+      <p:grpSpPr>
+        <a:xfrm>
+          <a:off x="0" y="0"/>
+          <a:ext cx="0" cy="0"/>
+          <a:chOff x="0" y="0"/>
+          <a:chExt cx="0" cy="0"/>
+        </a:xfrm>
+      </p:grpSpPr>
+      <p:sp>
+        <p:nvSpPr>
+          <p:cNvPr id="2" name="Slide Image Placeholder 1"/>
+          <p:cNvSpPr>
+            <a:spLocks noGrp="1" noRot="1" noChangeAspect="1"/>
+          </p:cNvSpPr>
+          <p:nvPr>
+            <p:ph type="sldImg"/>
+          </p:nvPr>
+        </p:nvSpPr>
+        <p:spPr/>
+      </p:sp>
+      <p:sp>
+        <p:nvSpPr>
+          <p:cNvPr id="3" name="Notes Placeholder 2"/>
+          <p:cNvSpPr>
+            <a:spLocks noGrp="1"/>
+          </p:cNvSpPr>
+          <p:nvPr>
+            <p:ph type="body" idx="1"/>
+          </p:nvPr>
+        </p:nvSpPr>
+        <p:spPr/>
+        <p:txBody>
+          <a:bodyPr/>
+          <a:lstStyle/>
+          <a:p>
+            <a:endParaRPr lang="en-US" dirty="0"/>
+          </a:p>
+        </p:txBody>
+      </p:sp>
+      <p:sp>
+        <p:nvSpPr>
+          <p:cNvPr id="4" name="Slide Number Placeholder 3"/>
+          <p:cNvSpPr>
+            <a:spLocks noGrp="1"/>
+          </p:cNvSpPr>
+          <p:nvPr>
+            <p:ph type="sldNum" sz="quarter" idx="5"/>
+          </p:nvPr>
+        </p:nvSpPr>
+        <p:spPr/>
+        <p:txBody>
+          <a:bodyPr/>
+          <a:lstStyle/>
+          <a:p>
+            <a:fld id="{3CFD093F-147C-534F-828E-C80044553B62}" type="slidenum">
+              <a:rPr lang="en-US" smtClean="0"/>
+              <a:t>6</a:t>
+            </a:fld>
+            <a:endParaRPr lang="en-US"/>
+          </a:p>
+        </p:txBody>
+      </p:sp>
+    </p:spTree>
+    <p:extLst>
+      <p:ext uri="{BB962C8B-B14F-4D97-AF65-F5344CB8AC3E}">
+        <p14:creationId xmlns:p14="http://schemas.microsoft.com/office/powerpoint/2010/main" val="3405891204"/>
+      </p:ext>
+    </p:extLst>
+  </p:cSld>
+  <p:clrMapOvr>
+    <a:masterClrMapping/>
+  </p:clrMapOvr>
+</p:notes>
+</file>
+
 <file path=ppt/slideLayouts/slideLayout1.xml><?xml version="1.0" encoding="utf-8"?>
 <p:sldLayout xmlns:a="http://schemas.openxmlformats.org/drawingml/2006/main" xmlns:r="http://schemas.openxmlformats.org/officeDocument/2006/relationships" xmlns:p="http://schemas.openxmlformats.org/presentationml/2006/main" type="title" preserve="1">
   <p:cSld name="Title Slide">
@@ -951,45 +1750,6 @@
       </p:grpSpPr>
       <p:sp>
         <p:nvSpPr>
-          <p:cNvPr id="7" name="Rectangle 6"/>
-          <p:cNvSpPr>
-            <a:spLocks noChangeAspect="1"/>
-          </p:cNvSpPr>
-          <p:nvPr/>
-        </p:nvSpPr>
-        <p:spPr>
-          <a:xfrm>
-            <a:off x="440286" y="614407"/>
-            <a:ext cx="11309338" cy="1189298"/>
-          </a:xfrm>
-          <a:prstGeom prst="rect">
-            <a:avLst/>
-          </a:prstGeom>
-          <a:solidFill>
-            <a:schemeClr val="accent1"/>
-          </a:solidFill>
-          <a:ln>
-            <a:noFill/>
-          </a:ln>
-          <a:effectLst/>
-        </p:spPr>
-        <p:style>
-          <a:lnRef idx="1">
-            <a:schemeClr val="accent1"/>
-          </a:lnRef>
-          <a:fillRef idx="3">
-            <a:schemeClr val="accent1"/>
-          </a:fillRef>
-          <a:effectRef idx="2">
-            <a:schemeClr val="accent1"/>
-          </a:effectRef>
-          <a:fontRef idx="minor">
-            <a:schemeClr val="lt1"/>
-          </a:fontRef>
-        </p:style>
-      </p:sp>
-      <p:sp>
-        <p:nvSpPr>
           <p:cNvPr id="2" name="Title 1"/>
           <p:cNvSpPr>
             <a:spLocks noGrp="1"/>
@@ -1000,19 +1760,26 @@
         </p:nvSpPr>
         <p:spPr>
           <a:xfrm>
-            <a:off x="581192" y="702156"/>
-            <a:ext cx="11029616" cy="1013800"/>
-          </a:xfrm>
-        </p:spPr>
-        <p:txBody>
-          <a:bodyPr/>
-          <a:lstStyle/>
-          <a:p>
-            <a:r>
-              <a:rPr lang="en-US"/>
+            <a:off x="631310" y="611127"/>
+            <a:ext cx="11029616" cy="543905"/>
+          </a:xfrm>
+        </p:spPr>
+        <p:txBody>
+          <a:bodyPr anchor="t"/>
+          <a:lstStyle>
+            <a:lvl1pPr algn="ctr">
+              <a:defRPr>
+                <a:solidFill>
+                  <a:schemeClr val="accent1"/>
+                </a:solidFill>
+              </a:defRPr>
+            </a:lvl1pPr>
+          </a:lstStyle>
+          <a:p>
+            <a:r>
+              <a:rPr lang="en-US" dirty="0"/>
               <a:t>Click to edit Master title style</a:t>
             </a:r>
-            <a:endParaRPr lang="en-US" dirty="0"/>
           </a:p>
         </p:txBody>
       </p:sp>
@@ -3854,7 +4621,15 @@
             <a:pPr algn="ctr"/>
             <a:r>
               <a:rPr lang="en-US" dirty="0"/>
-              <a:t>Gender disparity in insurance charges</a:t>
+              <a:t>HIDDEN </a:t>
+            </a:r>
+            <a:r>
+              <a:rPr lang="en-US" dirty="0" err="1"/>
+              <a:t>disparitIES</a:t>
+            </a:r>
+            <a:r>
+              <a:rPr lang="en-US" dirty="0"/>
+              <a:t> in insurance charges</a:t>
             </a:r>
           </a:p>
         </p:txBody>
@@ -4145,12 +4920,15 @@
         </p:nvSpPr>
         <p:spPr/>
         <p:txBody>
-          <a:bodyPr/>
+          <a:bodyPr anchor="t"/>
           <a:lstStyle/>
           <a:p>
+            <a:endParaRPr lang="en-US" dirty="0"/>
+          </a:p>
+          <a:p>
             <a:r>
               <a:rPr lang="en-US" dirty="0"/>
-              <a:t>EXPLORE OTHER MODELS OR STATISTICAL TECHNIQUES THAT MIGHT PROVE MORE INSIGHT</a:t>
+              <a:t>EXPLORE OTHER TYPES OF STATISTICAL MODELS  THAT MIGHT FIT THE DATA BETTER</a:t>
             </a:r>
           </a:p>
           <a:p>
@@ -4333,14 +5111,6 @@
 <file path=ppt/slides/slide3.xml><?xml version="1.0" encoding="utf-8"?>
 <p:sld xmlns:a="http://schemas.openxmlformats.org/drawingml/2006/main" xmlns:r="http://schemas.openxmlformats.org/officeDocument/2006/relationships" xmlns:p="http://schemas.openxmlformats.org/presentationml/2006/main">
   <p:cSld>
-    <p:bg>
-      <p:bgPr>
-        <a:solidFill>
-          <a:schemeClr val="bg1"/>
-        </a:solidFill>
-        <a:effectLst/>
-      </p:bgPr>
-    </p:bg>
     <p:spTree>
       <p:nvGrpSpPr>
         <p:cNvPr id="1" name=""/>
@@ -4357,319 +5127,70 @@
       </p:grpSpPr>
       <p:sp>
         <p:nvSpPr>
-          <p:cNvPr id="30" name="Rectangle 29">
+          <p:cNvPr id="2" name="Title 1">
             <a:extLst>
               <a:ext uri="{FF2B5EF4-FFF2-40B4-BE49-F238E27FC236}">
-                <a16:creationId xmlns:a16="http://schemas.microsoft.com/office/drawing/2014/main" id="{636F6DB7-CF8D-494A-82F6-13B58DCA9896}"/>
-              </a:ext>
-              <a:ext uri="{C183D7F6-B498-43B3-948B-1728B52AA6E4}">
-                <adec:decorative xmlns:adec="http://schemas.microsoft.com/office/drawing/2017/decorative" val="1"/>
+                <a16:creationId xmlns:a16="http://schemas.microsoft.com/office/drawing/2014/main" id="{E952DAF5-3E11-E640-BABB-9C5F65800E88}"/>
               </a:ext>
             </a:extLst>
           </p:cNvPr>
           <p:cNvSpPr>
-            <a:spLocks noGrp="1" noRot="1" noChangeAspect="1" noMove="1" noResize="1" noEditPoints="1" noAdjustHandles="1" noChangeArrowheads="1" noChangeShapeType="1" noTextEdit="1"/>
-          </p:cNvSpPr>
-          <p:nvPr>
-            <p:extLst>
-              <p:ext uri="{386F3935-93C4-4BCD-93E2-E3B085C9AB24}">
-                <p16:designElem xmlns:p16="http://schemas.microsoft.com/office/powerpoint/2015/main" val="1"/>
-              </p:ext>
-            </p:extLst>
-          </p:nvPr>
-        </p:nvSpPr>
-        <p:spPr>
-          <a:xfrm>
-            <a:off x="0" y="0"/>
-            <a:ext cx="12192000" cy="6858000"/>
-          </a:xfrm>
-          <a:prstGeom prst="rect">
-            <a:avLst/>
-          </a:prstGeom>
-          <a:solidFill>
-            <a:schemeClr val="tx1"/>
-          </a:solidFill>
-          <a:ln>
-            <a:noFill/>
-          </a:ln>
-        </p:spPr>
-        <p:style>
-          <a:lnRef idx="2">
-            <a:schemeClr val="accent1">
-              <a:shade val="50000"/>
-            </a:schemeClr>
-          </a:lnRef>
-          <a:fillRef idx="1">
-            <a:schemeClr val="accent1"/>
-          </a:fillRef>
-          <a:effectRef idx="0">
-            <a:schemeClr val="accent1"/>
-          </a:effectRef>
-          <a:fontRef idx="minor">
-            <a:schemeClr val="lt1"/>
-          </a:fontRef>
-        </p:style>
-        <p:txBody>
-          <a:bodyPr rtlCol="0" anchor="ctr"/>
+            <a:spLocks noGrp="1"/>
+          </p:cNvSpPr>
+          <p:nvPr>
+            <p:ph type="title"/>
+          </p:nvPr>
+        </p:nvSpPr>
+        <p:spPr>
+          <a:xfrm>
+            <a:off x="424447" y="824092"/>
+            <a:ext cx="11029616" cy="988666"/>
+          </a:xfrm>
+        </p:spPr>
+        <p:txBody>
+          <a:bodyPr/>
           <a:lstStyle/>
           <a:p>
-            <a:pPr algn="ctr"/>
-            <a:endParaRPr lang="en-US"/>
-          </a:p>
-        </p:txBody>
-      </p:sp>
-      <p:sp>
-        <p:nvSpPr>
-          <p:cNvPr id="32" name="Rectangle 31">
+            <a:r>
+              <a:rPr lang="en-US" b="1" dirty="0">
+                <a:solidFill>
+                  <a:schemeClr val="accent1"/>
+                </a:solidFill>
+              </a:rPr>
+              <a:t>THE SAMPLE DATA SET</a:t>
+            </a:r>
+            <a:br>
+              <a:rPr lang="en-US" sz="3200" b="1" dirty="0">
+                <a:solidFill>
+                  <a:schemeClr val="accent1"/>
+                </a:solidFill>
+              </a:rPr>
+            </a:br>
+            <a:r>
+              <a:rPr lang="en-US" sz="2400" b="1" dirty="0"/>
+              <a:t>ONE  YEAR OF insurance charges for 1,338 people</a:t>
+            </a:r>
+            <a:br>
+              <a:rPr lang="en-US" sz="2400" b="1" dirty="0"/>
+            </a:br>
+            <a:endParaRPr lang="en-US" sz="2400" b="1" dirty="0">
+              <a:solidFill>
+                <a:schemeClr val="accent1"/>
+              </a:solidFill>
+            </a:endParaRPr>
+          </a:p>
+        </p:txBody>
+      </p:sp>
+      <p:sp>
+        <p:nvSpPr>
+          <p:cNvPr id="11" name="Content Placeholder 10">
             <a:extLst>
               <a:ext uri="{FF2B5EF4-FFF2-40B4-BE49-F238E27FC236}">
-                <a16:creationId xmlns:a16="http://schemas.microsoft.com/office/drawing/2014/main" id="{0B7E5194-6E82-4A44-99C3-FE7D87F34134}"/>
-              </a:ext>
-              <a:ext uri="{C183D7F6-B498-43B3-948B-1728B52AA6E4}">
-                <adec:decorative xmlns:adec="http://schemas.microsoft.com/office/drawing/2017/decorative" val="1"/>
+                <a16:creationId xmlns:a16="http://schemas.microsoft.com/office/drawing/2014/main" id="{AE544CB2-EF18-B846-9DD3-9E955C2169A9}"/>
               </a:ext>
             </a:extLst>
           </p:cNvPr>
           <p:cNvSpPr>
-            <a:spLocks noGrp="1" noRot="1" noChangeAspect="1" noMove="1" noResize="1" noEditPoints="1" noAdjustHandles="1" noChangeArrowheads="1" noChangeShapeType="1" noTextEdit="1"/>
-          </p:cNvSpPr>
-          <p:nvPr>
-            <p:extLst>
-              <p:ext uri="{386F3935-93C4-4BCD-93E2-E3B085C9AB24}">
-                <p16:designElem xmlns:p16="http://schemas.microsoft.com/office/powerpoint/2015/main" val="1"/>
-              </p:ext>
-            </p:extLst>
-          </p:nvPr>
-        </p:nvSpPr>
-        <p:spPr>
-          <a:xfrm>
-            <a:off x="442377" y="614407"/>
-            <a:ext cx="3707477" cy="5611772"/>
-          </a:xfrm>
-          <a:prstGeom prst="rect">
-            <a:avLst/>
-          </a:prstGeom>
-          <a:solidFill>
-            <a:schemeClr val="accent1"/>
-          </a:solidFill>
-          <a:ln>
-            <a:noFill/>
-          </a:ln>
-          <a:effectLst/>
-        </p:spPr>
-        <p:style>
-          <a:lnRef idx="1">
-            <a:schemeClr val="accent1"/>
-          </a:lnRef>
-          <a:fillRef idx="3">
-            <a:schemeClr val="accent1"/>
-          </a:fillRef>
-          <a:effectRef idx="2">
-            <a:schemeClr val="accent1"/>
-          </a:effectRef>
-          <a:fontRef idx="minor">
-            <a:schemeClr val="lt1"/>
-          </a:fontRef>
-        </p:style>
-      </p:sp>
-      <p:grpSp>
-        <p:nvGrpSpPr>
-          <p:cNvPr id="34" name="Group 33">
-            <a:extLst>
-              <a:ext uri="{FF2B5EF4-FFF2-40B4-BE49-F238E27FC236}">
-                <a16:creationId xmlns:a16="http://schemas.microsoft.com/office/drawing/2014/main" id="{49FCC1E1-84D3-494D-A0A0-286AFA1C3018}"/>
-              </a:ext>
-              <a:ext uri="{C183D7F6-B498-43B3-948B-1728B52AA6E4}">
-                <adec:decorative xmlns:adec="http://schemas.microsoft.com/office/drawing/2017/decorative" val="1"/>
-              </a:ext>
-            </a:extLst>
-          </p:cNvPr>
-          <p:cNvGrpSpPr>
-            <a:grpSpLocks noGrp="1" noUngrp="1" noRot="1" noChangeAspect="1" noMove="1" noResize="1"/>
-          </p:cNvGrpSpPr>
-          <p:nvPr>
-            <p:extLst>
-              <p:ext uri="{386F3935-93C4-4BCD-93E2-E3B085C9AB24}">
-                <p16:designElem xmlns:p16="http://schemas.microsoft.com/office/powerpoint/2015/main" val="1"/>
-              </p:ext>
-            </p:extLst>
-          </p:nvPr>
-        </p:nvGrpSpPr>
-        <p:grpSpPr>
-          <a:xfrm>
-            <a:off x="446534" y="453643"/>
-            <a:ext cx="11298933" cy="98554"/>
-            <a:chOff x="446534" y="453643"/>
-            <a:chExt cx="11298933" cy="98554"/>
-          </a:xfrm>
-        </p:grpSpPr>
-        <p:sp>
-          <p:nvSpPr>
-            <p:cNvPr id="35" name="Rectangle 34">
-              <a:extLst>
-                <a:ext uri="{FF2B5EF4-FFF2-40B4-BE49-F238E27FC236}">
-                  <a16:creationId xmlns:a16="http://schemas.microsoft.com/office/drawing/2014/main" id="{96E09E90-FF79-402E-AF01-97A279BEADAD}"/>
-                </a:ext>
-                <a:ext uri="{C183D7F6-B498-43B3-948B-1728B52AA6E4}">
-                  <adec:decorative xmlns:adec="http://schemas.microsoft.com/office/drawing/2017/decorative" val="1"/>
-                </a:ext>
-              </a:extLst>
-            </p:cNvPr>
-            <p:cNvSpPr/>
-            <p:nvPr>
-              <p:extLst>
-                <p:ext uri="{386F3935-93C4-4BCD-93E2-E3B085C9AB24}">
-                  <p16:designElem xmlns:p16="http://schemas.microsoft.com/office/powerpoint/2015/main" val="1"/>
-                </p:ext>
-              </p:extLst>
-            </p:nvPr>
-          </p:nvSpPr>
-          <p:spPr>
-            <a:xfrm>
-              <a:off x="446534" y="457200"/>
-              <a:ext cx="3703320" cy="94997"/>
-            </a:xfrm>
-            <a:prstGeom prst="rect">
-              <a:avLst/>
-            </a:prstGeom>
-            <a:solidFill>
-              <a:schemeClr val="accent1"/>
-            </a:solidFill>
-            <a:ln>
-              <a:noFill/>
-            </a:ln>
-            <a:effectLst/>
-          </p:spPr>
-          <p:style>
-            <a:lnRef idx="1">
-              <a:schemeClr val="accent1"/>
-            </a:lnRef>
-            <a:fillRef idx="3">
-              <a:schemeClr val="accent1"/>
-            </a:fillRef>
-            <a:effectRef idx="2">
-              <a:schemeClr val="accent1"/>
-            </a:effectRef>
-            <a:fontRef idx="minor">
-              <a:schemeClr val="lt1"/>
-            </a:fontRef>
-          </p:style>
-        </p:sp>
-        <p:sp>
-          <p:nvSpPr>
-            <p:cNvPr id="36" name="Rectangle 35">
-              <a:extLst>
-                <a:ext uri="{FF2B5EF4-FFF2-40B4-BE49-F238E27FC236}">
-                  <a16:creationId xmlns:a16="http://schemas.microsoft.com/office/drawing/2014/main" id="{EC6946F8-4B9B-4C51-9F51-2DB377392CC1}"/>
-                </a:ext>
-                <a:ext uri="{C183D7F6-B498-43B3-948B-1728B52AA6E4}">
-                  <adec:decorative xmlns:adec="http://schemas.microsoft.com/office/drawing/2017/decorative" val="1"/>
-                </a:ext>
-              </a:extLst>
-            </p:cNvPr>
-            <p:cNvSpPr/>
-            <p:nvPr>
-              <p:extLst>
-                <p:ext uri="{386F3935-93C4-4BCD-93E2-E3B085C9AB24}">
-                  <p16:designElem xmlns:p16="http://schemas.microsoft.com/office/powerpoint/2015/main" val="1"/>
-                </p:ext>
-              </p:extLst>
-            </p:nvPr>
-          </p:nvSpPr>
-          <p:spPr>
-            <a:xfrm>
-              <a:off x="8042147" y="453643"/>
-              <a:ext cx="3703320" cy="98554"/>
-            </a:xfrm>
-            <a:prstGeom prst="rect">
-              <a:avLst/>
-            </a:prstGeom>
-            <a:solidFill>
-              <a:schemeClr val="accent4"/>
-            </a:solidFill>
-            <a:ln>
-              <a:noFill/>
-            </a:ln>
-            <a:effectLst/>
-          </p:spPr>
-          <p:style>
-            <a:lnRef idx="1">
-              <a:schemeClr val="accent1"/>
-            </a:lnRef>
-            <a:fillRef idx="3">
-              <a:schemeClr val="accent1"/>
-            </a:fillRef>
-            <a:effectRef idx="2">
-              <a:schemeClr val="accent1"/>
-            </a:effectRef>
-            <a:fontRef idx="minor">
-              <a:schemeClr val="lt1"/>
-            </a:fontRef>
-          </p:style>
-        </p:sp>
-        <p:sp>
-          <p:nvSpPr>
-            <p:cNvPr id="37" name="Rectangle 36">
-              <a:extLst>
-                <a:ext uri="{FF2B5EF4-FFF2-40B4-BE49-F238E27FC236}">
-                  <a16:creationId xmlns:a16="http://schemas.microsoft.com/office/drawing/2014/main" id="{7B3D2B3D-A285-438C-A344-AED3E46A0782}"/>
-                </a:ext>
-                <a:ext uri="{C183D7F6-B498-43B3-948B-1728B52AA6E4}">
-                  <adec:decorative xmlns:adec="http://schemas.microsoft.com/office/drawing/2017/decorative" val="1"/>
-                </a:ext>
-              </a:extLst>
-            </p:cNvPr>
-            <p:cNvSpPr/>
-            <p:nvPr>
-              <p:extLst>
-                <p:ext uri="{386F3935-93C4-4BCD-93E2-E3B085C9AB24}">
-                  <p16:designElem xmlns:p16="http://schemas.microsoft.com/office/powerpoint/2015/main" val="1"/>
-                </p:ext>
-              </p:extLst>
-            </p:nvPr>
-          </p:nvSpPr>
-          <p:spPr>
-            <a:xfrm>
-              <a:off x="4241830" y="457200"/>
-              <a:ext cx="3703320" cy="91440"/>
-            </a:xfrm>
-            <a:prstGeom prst="rect">
-              <a:avLst/>
-            </a:prstGeom>
-            <a:solidFill>
-              <a:schemeClr val="accent2"/>
-            </a:solidFill>
-            <a:ln>
-              <a:noFill/>
-            </a:ln>
-            <a:effectLst/>
-          </p:spPr>
-          <p:style>
-            <a:lnRef idx="1">
-              <a:schemeClr val="accent1"/>
-            </a:lnRef>
-            <a:fillRef idx="3">
-              <a:schemeClr val="accent1"/>
-            </a:fillRef>
-            <a:effectRef idx="2">
-              <a:schemeClr val="accent1"/>
-            </a:effectRef>
-            <a:fontRef idx="minor">
-              <a:schemeClr val="lt1"/>
-            </a:fontRef>
-          </p:style>
-        </p:sp>
-      </p:grpSp>
-      <p:sp>
-        <p:nvSpPr>
-          <p:cNvPr id="25" name="Content Placeholder 2">
-            <a:extLst>
-              <a:ext uri="{FF2B5EF4-FFF2-40B4-BE49-F238E27FC236}">
-                <a16:creationId xmlns:a16="http://schemas.microsoft.com/office/drawing/2014/main" id="{1D50AC1F-0509-ED4D-B9CA-20EBC79925F6}"/>
-              </a:ext>
-            </a:extLst>
-          </p:cNvPr>
-          <p:cNvSpPr>
             <a:spLocks noGrp="1"/>
           </p:cNvSpPr>
           <p:nvPr>
@@ -4678,40 +5199,71 @@
         </p:nvSpPr>
         <p:spPr>
           <a:xfrm>
-            <a:off x="779490" y="919750"/>
-            <a:ext cx="3033249" cy="5027626"/>
-          </a:xfrm>
-        </p:spPr>
-        <p:txBody>
-          <a:bodyPr anchor="t">
-            <a:normAutofit/>
-          </a:bodyPr>
+            <a:off x="424448" y="1989221"/>
+            <a:ext cx="11186360" cy="4283242"/>
+          </a:xfrm>
+        </p:spPr>
+        <p:txBody>
+          <a:bodyPr/>
           <a:lstStyle/>
           <a:p>
-            <a:r>
-              <a:rPr lang="en-US" sz="1600" dirty="0">
+            <a:pPr marL="0" indent="0">
+              <a:buNone/>
+            </a:pPr>
+            <a:r>
+              <a:rPr lang="en-US" sz="2400" b="1" dirty="0">
                 <a:solidFill>
-                  <a:srgbClr val="FFFFFF"/>
+                  <a:schemeClr val="accent1"/>
                 </a:solidFill>
               </a:rPr>
-              <a:t>SAMPLE DATA SET OF  676 MALES AND 662 FEMALES</a:t>
-            </a:r>
-          </a:p>
-          <a:p>
-            <a:r>
-              <a:rPr lang="en-US" sz="1600" dirty="0">
+              <a:t> </a:t>
+            </a:r>
+          </a:p>
+          <a:p>
+            <a:r>
+              <a:rPr lang="en-US" sz="2400" b="1" dirty="0">
                 <a:solidFill>
-                  <a:srgbClr val="FFFFFF"/>
+                  <a:schemeClr val="accent1"/>
                 </a:solidFill>
               </a:rPr>
-              <a:t>AGED 18 – 64 WITH AN AVERAGE AGE OF 39 </a:t>
-            </a:r>
-          </a:p>
-          <a:p>
-            <a:r>
-              <a:rPr lang="en-US" sz="1600" dirty="0">
+              <a:t>TOTAL CHARGES FOR THE YEAR</a:t>
+            </a:r>
+          </a:p>
+          <a:p>
+            <a:r>
+              <a:rPr lang="en-US" sz="2400" b="1" dirty="0">
                 <a:solidFill>
-                  <a:srgbClr val="FFFFFF"/>
+                  <a:schemeClr val="accent1"/>
+                </a:solidFill>
+              </a:rPr>
+              <a:t>676 MALES, 662 FEMALES</a:t>
+            </a:r>
+          </a:p>
+          <a:p>
+            <a:r>
+              <a:rPr lang="en-US" sz="2400" b="1" dirty="0">
+                <a:solidFill>
+                  <a:schemeClr val="accent1"/>
+                </a:solidFill>
+              </a:rPr>
+              <a:t>AVERAGE AGE OF 39 </a:t>
+            </a:r>
+          </a:p>
+          <a:p>
+            <a:r>
+              <a:rPr lang="en-US" sz="2400" b="1" dirty="0">
+                <a:solidFill>
+                  <a:schemeClr val="accent1"/>
+                </a:solidFill>
+              </a:rPr>
+              <a:t>BMI,  NUMBER OF CHILDREN,  REGION</a:t>
+            </a:r>
+          </a:p>
+          <a:p>
+            <a:r>
+              <a:rPr lang="en-US" sz="2400" b="1" dirty="0">
+                <a:solidFill>
+                  <a:schemeClr val="accent1"/>
                 </a:solidFill>
               </a:rPr>
               <a:t>AS EXPECTED, CHARGES INCREASE FOR WOMEN AND MEN AS THEY GET OLDER</a:t>
@@ -4719,64 +5271,28 @@
           </a:p>
           <a:p>
             <a:r>
-              <a:rPr lang="en-US" sz="1600" dirty="0">
+              <a:rPr lang="en-US" sz="2400" b="1" dirty="0">
                 <a:solidFill>
-                  <a:srgbClr val="FFFFFF"/>
+                  <a:schemeClr val="accent1"/>
                 </a:solidFill>
               </a:rPr>
               <a:t>THE CHARGES OUTLIERS IN THIS DATA SET ARE NOT EXPLAINED. IT IS UNKOWN IF THEY REPRESENT CHRONIC ILLNESSES, ACCIDENTS ETC</a:t>
             </a:r>
           </a:p>
           <a:p>
-            <a:r>
-              <a:rPr lang="en-US" sz="1600" dirty="0">
-                <a:solidFill>
-                  <a:srgbClr val="FFFFFF"/>
-                </a:solidFill>
-              </a:rPr>
-              <a:t>LOOKS LIKE TWO SEPARATE DATA SETS</a:t>
-            </a:r>
-          </a:p>
-        </p:txBody>
-      </p:sp>
-      <p:pic>
-        <p:nvPicPr>
-          <p:cNvPr id="9" name="Picture 8">
-            <a:extLst>
-              <a:ext uri="{FF2B5EF4-FFF2-40B4-BE49-F238E27FC236}">
-                <a16:creationId xmlns:a16="http://schemas.microsoft.com/office/drawing/2014/main" id="{A5DAD290-765F-FD4F-AA29-FFA00D7459E1}"/>
-              </a:ext>
-            </a:extLst>
-          </p:cNvPr>
-          <p:cNvPicPr>
-            <a:picLocks noChangeAspect="1"/>
-          </p:cNvPicPr>
-          <p:nvPr/>
-        </p:nvPicPr>
-        <p:blipFill>
-          <a:blip r:embed="rId2"/>
-          <a:srcRect/>
-          <a:stretch/>
-        </p:blipFill>
-        <p:spPr>
-          <a:xfrm>
-            <a:off x="4358429" y="1105148"/>
-            <a:ext cx="7393710" cy="4842228"/>
-          </a:xfrm>
-          <a:prstGeom prst="rect">
-            <a:avLst/>
-          </a:prstGeom>
-        </p:spPr>
-      </p:pic>
+            <a:endParaRPr lang="en-US" dirty="0"/>
+          </a:p>
+        </p:txBody>
+      </p:sp>
     </p:spTree>
     <p:extLst>
       <p:ext uri="{BB962C8B-B14F-4D97-AF65-F5344CB8AC3E}">
-        <p14:creationId xmlns:p14="http://schemas.microsoft.com/office/powerpoint/2010/main" val="2637650362"/>
+        <p14:creationId xmlns:p14="http://schemas.microsoft.com/office/powerpoint/2010/main" val="2874590467"/>
       </p:ext>
     </p:extLst>
   </p:cSld>
   <p:clrMapOvr>
-    <a:overrideClrMapping bg1="dk1" tx1="lt1" bg2="dk2" tx2="lt2" accent1="accent1" accent2="accent2" accent3="accent3" accent4="accent4" accent5="accent5" accent6="accent6" hlink="hlink" folHlink="folHlink"/>
+    <a:masterClrMapping/>
   </p:clrMapOvr>
 </p:sld>
 </file>
@@ -4784,14 +5300,6 @@
 <file path=ppt/slides/slide4.xml><?xml version="1.0" encoding="utf-8"?>
 <p:sld xmlns:a="http://schemas.openxmlformats.org/drawingml/2006/main" xmlns:r="http://schemas.openxmlformats.org/officeDocument/2006/relationships" xmlns:p="http://schemas.openxmlformats.org/presentationml/2006/main">
   <p:cSld>
-    <p:bg>
-      <p:bgPr>
-        <a:solidFill>
-          <a:schemeClr val="bg1"/>
-        </a:solidFill>
-        <a:effectLst/>
-      </p:bgPr>
-    </p:bg>
     <p:spTree>
       <p:nvGrpSpPr>
         <p:cNvPr id="1" name=""/>
@@ -4806,260 +5314,12 @@
           <a:chExt cx="0" cy="0"/>
         </a:xfrm>
       </p:grpSpPr>
-      <p:sp useBgFill="1">
-        <p:nvSpPr>
-          <p:cNvPr id="12" name="Rectangle 11">
+      <p:pic>
+        <p:nvPicPr>
+          <p:cNvPr id="2" name="Picture 1">
             <a:extLst>
               <a:ext uri="{FF2B5EF4-FFF2-40B4-BE49-F238E27FC236}">
-                <a16:creationId xmlns:a16="http://schemas.microsoft.com/office/drawing/2014/main" id="{F875149D-F692-45DA-8324-D5E0193D5FC4}"/>
-              </a:ext>
-              <a:ext uri="{C183D7F6-B498-43B3-948B-1728B52AA6E4}">
-                <adec:decorative xmlns:adec="http://schemas.microsoft.com/office/drawing/2017/decorative" val="1"/>
-              </a:ext>
-            </a:extLst>
-          </p:cNvPr>
-          <p:cNvSpPr>
-            <a:spLocks noGrp="1" noRot="1" noChangeAspect="1" noMove="1" noResize="1" noEditPoints="1" noAdjustHandles="1" noChangeArrowheads="1" noChangeShapeType="1" noTextEdit="1"/>
-          </p:cNvSpPr>
-          <p:nvPr>
-            <p:extLst>
-              <p:ext uri="{386F3935-93C4-4BCD-93E2-E3B085C9AB24}">
-                <p16:designElem xmlns:p16="http://schemas.microsoft.com/office/powerpoint/2015/main" val="1"/>
-              </p:ext>
-            </p:extLst>
-          </p:nvPr>
-        </p:nvSpPr>
-        <p:spPr>
-          <a:xfrm>
-            <a:off x="0" y="0"/>
-            <a:ext cx="12191999" cy="6858001"/>
-          </a:xfrm>
-          <a:prstGeom prst="rect">
-            <a:avLst/>
-          </a:prstGeom>
-          <a:ln>
-            <a:noFill/>
-          </a:ln>
-        </p:spPr>
-        <p:style>
-          <a:lnRef idx="2">
-            <a:schemeClr val="accent1">
-              <a:shade val="50000"/>
-            </a:schemeClr>
-          </a:lnRef>
-          <a:fillRef idx="1">
-            <a:schemeClr val="accent1"/>
-          </a:fillRef>
-          <a:effectRef idx="0">
-            <a:schemeClr val="accent1"/>
-          </a:effectRef>
-          <a:fontRef idx="minor">
-            <a:schemeClr val="lt1"/>
-          </a:fontRef>
-        </p:style>
-        <p:txBody>
-          <a:bodyPr rtlCol="0" anchor="ctr"/>
-          <a:lstStyle/>
-          <a:p>
-            <a:pPr algn="ctr"/>
-            <a:endParaRPr lang="en-US"/>
-          </a:p>
-        </p:txBody>
-      </p:sp>
-      <p:sp>
-        <p:nvSpPr>
-          <p:cNvPr id="2" name="Title 1">
-            <a:extLst>
-              <a:ext uri="{FF2B5EF4-FFF2-40B4-BE49-F238E27FC236}">
-                <a16:creationId xmlns:a16="http://schemas.microsoft.com/office/drawing/2014/main" id="{9254A15D-CB00-5F4D-92F9-464B8C19B2F2}"/>
-              </a:ext>
-            </a:extLst>
-          </p:cNvPr>
-          <p:cNvSpPr>
-            <a:spLocks noGrp="1"/>
-          </p:cNvSpPr>
-          <p:nvPr>
-            <p:ph type="title"/>
-          </p:nvPr>
-        </p:nvSpPr>
-        <p:spPr>
-          <a:xfrm>
-            <a:off x="581192" y="800931"/>
-            <a:ext cx="5351431" cy="1387554"/>
-          </a:xfrm>
-        </p:spPr>
-        <p:txBody>
-          <a:bodyPr anchor="t">
-            <a:normAutofit/>
-          </a:bodyPr>
-          <a:lstStyle/>
-          <a:p>
-            <a:pPr algn="ctr"/>
-            <a:r>
-              <a:rPr lang="en-US" sz="2400" dirty="0">
-                <a:solidFill>
-                  <a:schemeClr val="tx2"/>
-                </a:solidFill>
-              </a:rPr>
-              <a:t>Smokers account for only 26% of the data, but 49.5% of  the  charges IN THIS DATA SET</a:t>
-            </a:r>
-          </a:p>
-        </p:txBody>
-      </p:sp>
-      <p:sp>
-        <p:nvSpPr>
-          <p:cNvPr id="14" name="Rectangle 13">
-            <a:extLst>
-              <a:ext uri="{FF2B5EF4-FFF2-40B4-BE49-F238E27FC236}">
-                <a16:creationId xmlns:a16="http://schemas.microsoft.com/office/drawing/2014/main" id="{D4EE8A32-B29E-46B5-B8B8-0148869E904A}"/>
-              </a:ext>
-              <a:ext uri="{C183D7F6-B498-43B3-948B-1728B52AA6E4}">
-                <adec:decorative xmlns:adec="http://schemas.microsoft.com/office/drawing/2017/decorative" val="1"/>
-              </a:ext>
-            </a:extLst>
-          </p:cNvPr>
-          <p:cNvSpPr>
-            <a:spLocks noGrp="1" noRot="1" noChangeAspect="1" noMove="1" noResize="1" noEditPoints="1" noAdjustHandles="1" noChangeArrowheads="1" noChangeShapeType="1" noTextEdit="1"/>
-          </p:cNvSpPr>
-          <p:nvPr>
-            <p:extLst>
-              <p:ext uri="{386F3935-93C4-4BCD-93E2-E3B085C9AB24}">
-                <p16:designElem xmlns:p16="http://schemas.microsoft.com/office/powerpoint/2015/main" val="1"/>
-              </p:ext>
-            </p:extLst>
-          </p:nvPr>
-        </p:nvSpPr>
-        <p:spPr>
-          <a:xfrm>
-            <a:off x="446534" y="457200"/>
-            <a:ext cx="5596128" cy="94997"/>
-          </a:xfrm>
-          <a:prstGeom prst="rect">
-            <a:avLst/>
-          </a:prstGeom>
-          <a:solidFill>
-            <a:schemeClr val="accent1"/>
-          </a:solidFill>
-          <a:ln>
-            <a:noFill/>
-          </a:ln>
-          <a:effectLst/>
-        </p:spPr>
-        <p:style>
-          <a:lnRef idx="1">
-            <a:schemeClr val="accent1"/>
-          </a:lnRef>
-          <a:fillRef idx="3">
-            <a:schemeClr val="accent1"/>
-          </a:fillRef>
-          <a:effectRef idx="2">
-            <a:schemeClr val="accent1"/>
-          </a:effectRef>
-          <a:fontRef idx="minor">
-            <a:schemeClr val="lt1"/>
-          </a:fontRef>
-        </p:style>
-      </p:sp>
-      <p:sp>
-        <p:nvSpPr>
-          <p:cNvPr id="16" name="Rectangle 15">
-            <a:extLst>
-              <a:ext uri="{FF2B5EF4-FFF2-40B4-BE49-F238E27FC236}">
-                <a16:creationId xmlns:a16="http://schemas.microsoft.com/office/drawing/2014/main" id="{BBB92E81-4F6A-4CF1-B486-AE63E15F31D3}"/>
-              </a:ext>
-              <a:ext uri="{C183D7F6-B498-43B3-948B-1728B52AA6E4}">
-                <adec:decorative xmlns:adec="http://schemas.microsoft.com/office/drawing/2017/decorative" val="1"/>
-              </a:ext>
-            </a:extLst>
-          </p:cNvPr>
-          <p:cNvSpPr>
-            <a:spLocks noGrp="1" noRot="1" noChangeAspect="1" noMove="1" noResize="1" noEditPoints="1" noAdjustHandles="1" noChangeArrowheads="1" noChangeShapeType="1" noTextEdit="1"/>
-          </p:cNvSpPr>
-          <p:nvPr>
-            <p:extLst>
-              <p:ext uri="{386F3935-93C4-4BCD-93E2-E3B085C9AB24}">
-                <p16:designElem xmlns:p16="http://schemas.microsoft.com/office/powerpoint/2015/main" val="1"/>
-              </p:ext>
-            </p:extLst>
-          </p:nvPr>
-        </p:nvSpPr>
-        <p:spPr>
-          <a:xfrm>
-            <a:off x="6149338" y="453643"/>
-            <a:ext cx="5596128" cy="98554"/>
-          </a:xfrm>
-          <a:prstGeom prst="rect">
-            <a:avLst/>
-          </a:prstGeom>
-          <a:solidFill>
-            <a:schemeClr val="accent4"/>
-          </a:solidFill>
-          <a:ln>
-            <a:noFill/>
-          </a:ln>
-          <a:effectLst/>
-        </p:spPr>
-        <p:style>
-          <a:lnRef idx="1">
-            <a:schemeClr val="accent1"/>
-          </a:lnRef>
-          <a:fillRef idx="3">
-            <a:schemeClr val="accent1"/>
-          </a:fillRef>
-          <a:effectRef idx="2">
-            <a:schemeClr val="accent1"/>
-          </a:effectRef>
-          <a:fontRef idx="minor">
-            <a:schemeClr val="lt1"/>
-          </a:fontRef>
-        </p:style>
-      </p:sp>
-      <p:sp>
-        <p:nvSpPr>
-          <p:cNvPr id="3" name="Content Placeholder 2">
-            <a:extLst>
-              <a:ext uri="{FF2B5EF4-FFF2-40B4-BE49-F238E27FC236}">
-                <a16:creationId xmlns:a16="http://schemas.microsoft.com/office/drawing/2014/main" id="{C8A4D441-5AC0-814F-8E6E-C35CECC87542}"/>
-              </a:ext>
-            </a:extLst>
-          </p:cNvPr>
-          <p:cNvSpPr>
-            <a:spLocks noGrp="1"/>
-          </p:cNvSpPr>
-          <p:nvPr>
-            <p:ph idx="1"/>
-          </p:nvPr>
-        </p:nvSpPr>
-        <p:spPr>
-          <a:xfrm>
-            <a:off x="6254357" y="800930"/>
-            <a:ext cx="5491110" cy="664358"/>
-          </a:xfrm>
-        </p:spPr>
-        <p:txBody>
-          <a:bodyPr anchor="t">
-            <a:normAutofit/>
-          </a:bodyPr>
-          <a:lstStyle/>
-          <a:p>
-            <a:pPr>
-              <a:buClr>
-                <a:srgbClr val="E0802B"/>
-              </a:buClr>
-            </a:pPr>
-            <a:r>
-              <a:rPr lang="en-US" dirty="0"/>
-              <a:t>Outliers and smokers obscure other factors that may affect charges</a:t>
-            </a:r>
-          </a:p>
-        </p:txBody>
-      </p:sp>
-      <p:pic>
-        <p:nvPicPr>
-          <p:cNvPr id="7" name="Picture 6" descr="A screenshot of a cell phone&#10;&#10;Description automatically generated">
-            <a:extLst>
-              <a:ext uri="{FF2B5EF4-FFF2-40B4-BE49-F238E27FC236}">
-                <a16:creationId xmlns:a16="http://schemas.microsoft.com/office/drawing/2014/main" id="{253A09F4-173B-414D-9248-0F5A5882368E}"/>
+                <a16:creationId xmlns:a16="http://schemas.microsoft.com/office/drawing/2014/main" id="{86E2E6AF-BDEA-934D-8E96-05FF342E83BE}"/>
               </a:ext>
             </a:extLst>
           </p:cNvPr>
@@ -5070,26 +5330,110 @@
         </p:nvPicPr>
         <p:blipFill>
           <a:blip r:embed="rId2"/>
-          <a:stretch>
-            <a:fillRect/>
-          </a:stretch>
+          <a:srcRect/>
+          <a:stretch/>
         </p:blipFill>
         <p:spPr>
           <a:xfrm>
-            <a:off x="808152" y="3353874"/>
-            <a:ext cx="4652422" cy="3046926"/>
+            <a:off x="0" y="1989221"/>
+            <a:ext cx="6469995" cy="4237277"/>
           </a:xfrm>
           <a:prstGeom prst="rect">
             <a:avLst/>
           </a:prstGeom>
         </p:spPr>
       </p:pic>
+      <p:sp>
+        <p:nvSpPr>
+          <p:cNvPr id="4" name="TextBox 3">
+            <a:extLst>
+              <a:ext uri="{FF2B5EF4-FFF2-40B4-BE49-F238E27FC236}">
+                <a16:creationId xmlns:a16="http://schemas.microsoft.com/office/drawing/2014/main" id="{9CEB39A4-E6FD-2449-A5B8-0CE6284D33EB}"/>
+              </a:ext>
+            </a:extLst>
+          </p:cNvPr>
+          <p:cNvSpPr txBox="1"/>
+          <p:nvPr/>
+        </p:nvSpPr>
+        <p:spPr>
+          <a:xfrm>
+            <a:off x="1106908" y="788892"/>
+            <a:ext cx="5197640" cy="1477328"/>
+          </a:xfrm>
+          <a:prstGeom prst="rect">
+            <a:avLst/>
+          </a:prstGeom>
+          <a:noFill/>
+        </p:spPr>
+        <p:txBody>
+          <a:bodyPr wrap="square" rtlCol="0">
+            <a:spAutoFit/>
+          </a:bodyPr>
+          <a:lstStyle/>
+          <a:p>
+            <a:pPr marL="285750" indent="-285750">
+              <a:buFont typeface="Wingdings" pitchFamily="2" charset="2"/>
+              <a:buChar char="§"/>
+            </a:pPr>
+            <a:r>
+              <a:rPr lang="en-US" b="1" dirty="0">
+                <a:solidFill>
+                  <a:schemeClr val="accent1"/>
+                </a:solidFill>
+              </a:rPr>
+              <a:t>BIMODAL, 2 DISTINCT DATA SETS?</a:t>
+            </a:r>
+          </a:p>
+          <a:p>
+            <a:pPr marL="285750" indent="-285750">
+              <a:buFont typeface="Wingdings" pitchFamily="2" charset="2"/>
+              <a:buChar char="§"/>
+            </a:pPr>
+            <a:r>
+              <a:rPr lang="en-US" b="1" dirty="0">
+                <a:solidFill>
+                  <a:schemeClr val="accent1"/>
+                </a:solidFill>
+              </a:rPr>
+              <a:t>UNEXPLAINABLE OUTLIERS</a:t>
+            </a:r>
+          </a:p>
+          <a:p>
+            <a:pPr marL="285750" indent="-285750">
+              <a:buFont typeface="Wingdings" pitchFamily="2" charset="2"/>
+              <a:buChar char="§"/>
+            </a:pPr>
+            <a:r>
+              <a:rPr lang="en-US" b="1" dirty="0">
+                <a:solidFill>
+                  <a:schemeClr val="accent1"/>
+                </a:solidFill>
+              </a:rPr>
+              <a:t>CHARGES INCREASE WITH AGE</a:t>
+            </a:r>
+          </a:p>
+          <a:p>
+            <a:pPr marL="285750" indent="-285750">
+              <a:buFont typeface="Wingdings" pitchFamily="2" charset="2"/>
+              <a:buChar char="§"/>
+            </a:pPr>
+            <a:endParaRPr lang="en-US" b="1" dirty="0">
+              <a:solidFill>
+                <a:schemeClr val="accent1"/>
+              </a:solidFill>
+            </a:endParaRPr>
+          </a:p>
+          <a:p>
+            <a:endParaRPr lang="en-US" dirty="0"/>
+          </a:p>
+        </p:txBody>
+      </p:sp>
       <p:pic>
         <p:nvPicPr>
-          <p:cNvPr id="5" name="Picture 4" descr="A screenshot of a cell phone&#10;&#10;Description automatically generated">
+          <p:cNvPr id="6" name="Picture 5" descr="A screenshot of a cell phone&#10;&#10;Description automatically generated">
             <a:extLst>
               <a:ext uri="{FF2B5EF4-FFF2-40B4-BE49-F238E27FC236}">
-                <a16:creationId xmlns:a16="http://schemas.microsoft.com/office/drawing/2014/main" id="{2C65FFCE-4D65-4548-8CEC-E6666AC3A68A}"/>
+                <a16:creationId xmlns:a16="http://schemas.microsoft.com/office/drawing/2014/main" id="{94ECF8B9-B051-3647-B6E3-17E282959682}"/>
               </a:ext>
             </a:extLst>
           </p:cNvPr>
@@ -5106,48 +5450,89 @@
         </p:blipFill>
         <p:spPr>
           <a:xfrm>
-            <a:off x="6731428" y="3353874"/>
-            <a:ext cx="4769337" cy="3012855"/>
+            <a:off x="6469995" y="1989221"/>
+            <a:ext cx="5703231" cy="3735113"/>
           </a:xfrm>
           <a:prstGeom prst="rect">
             <a:avLst/>
           </a:prstGeom>
         </p:spPr>
       </p:pic>
-      <p:pic>
-        <p:nvPicPr>
-          <p:cNvPr id="11" name="Picture 10" descr="A screenshot of a cell phone&#10;&#10;Description automatically generated">
+      <p:sp>
+        <p:nvSpPr>
+          <p:cNvPr id="7" name="TextBox 6">
             <a:extLst>
               <a:ext uri="{FF2B5EF4-FFF2-40B4-BE49-F238E27FC236}">
-                <a16:creationId xmlns:a16="http://schemas.microsoft.com/office/drawing/2014/main" id="{CCB6336D-380D-7F4E-88F8-F0A4A4FC5041}"/>
+                <a16:creationId xmlns:a16="http://schemas.microsoft.com/office/drawing/2014/main" id="{9C361D79-BEB6-AE46-8600-C268459ED428}"/>
               </a:ext>
             </a:extLst>
           </p:cNvPr>
-          <p:cNvPicPr>
-            <a:picLocks noChangeAspect="1"/>
-          </p:cNvPicPr>
+          <p:cNvSpPr txBox="1"/>
           <p:nvPr/>
-        </p:nvPicPr>
-        <p:blipFill>
-          <a:blip r:embed="rId4"/>
-          <a:stretch>
-            <a:fillRect/>
-          </a:stretch>
-        </p:blipFill>
-        <p:spPr>
-          <a:xfrm>
-            <a:off x="1913771" y="2089736"/>
-            <a:ext cx="2686272" cy="1229311"/>
+        </p:nvSpPr>
+        <p:spPr>
+          <a:xfrm>
+            <a:off x="7218947" y="788892"/>
+            <a:ext cx="4828674" cy="1200329"/>
           </a:xfrm>
           <a:prstGeom prst="rect">
             <a:avLst/>
           </a:prstGeom>
-        </p:spPr>
-      </p:pic>
+          <a:noFill/>
+        </p:spPr>
+        <p:txBody>
+          <a:bodyPr wrap="square" rtlCol="0">
+            <a:spAutoFit/>
+          </a:bodyPr>
+          <a:lstStyle/>
+          <a:p>
+            <a:r>
+              <a:rPr lang="en-US" b="1" dirty="0">
+                <a:solidFill>
+                  <a:schemeClr val="accent1"/>
+                </a:solidFill>
+              </a:rPr>
+              <a:t>NON-SMOKERS: 1064</a:t>
+            </a:r>
+          </a:p>
+          <a:p>
+            <a:endParaRPr lang="en-US" b="1" dirty="0">
+              <a:solidFill>
+                <a:schemeClr val="accent1"/>
+              </a:solidFill>
+            </a:endParaRPr>
+          </a:p>
+          <a:p>
+            <a:r>
+              <a:rPr lang="en-US" b="1" dirty="0">
+                <a:solidFill>
+                  <a:schemeClr val="accent1"/>
+                </a:solidFill>
+              </a:rPr>
+              <a:t>SMOKERS: 274</a:t>
+            </a:r>
+          </a:p>
+          <a:p>
+            <a:r>
+              <a:rPr lang="en-US" dirty="0">
+                <a:solidFill>
+                  <a:schemeClr val="tx2"/>
+                </a:solidFill>
+              </a:rPr>
+              <a:t>26% of the data, but 49.5% of the charges</a:t>
+            </a:r>
+            <a:endParaRPr lang="en-US" b="1" dirty="0">
+              <a:solidFill>
+                <a:schemeClr val="accent1"/>
+              </a:solidFill>
+            </a:endParaRPr>
+          </a:p>
+        </p:txBody>
+      </p:sp>
     </p:spTree>
     <p:extLst>
       <p:ext uri="{BB962C8B-B14F-4D97-AF65-F5344CB8AC3E}">
-        <p14:creationId xmlns:p14="http://schemas.microsoft.com/office/powerpoint/2010/main" val="3807363449"/>
+        <p14:creationId xmlns:p14="http://schemas.microsoft.com/office/powerpoint/2010/main" val="3928363096"/>
       </p:ext>
     </p:extLst>
   </p:cSld>
@@ -5176,6 +5561,223 @@
       </p:grpSpPr>
       <p:sp>
         <p:nvSpPr>
+          <p:cNvPr id="21" name="Rectangle 23">
+            <a:extLst>
+              <a:ext uri="{FF2B5EF4-FFF2-40B4-BE49-F238E27FC236}">
+                <a16:creationId xmlns:a16="http://schemas.microsoft.com/office/drawing/2014/main" id="{00401440-1DC9-4C9E-A3BA-4DECEEB46503}"/>
+              </a:ext>
+              <a:ext uri="{C183D7F6-B498-43B3-948B-1728B52AA6E4}">
+                <adec:decorative xmlns:adec="http://schemas.microsoft.com/office/drawing/2017/decorative" val="1"/>
+              </a:ext>
+            </a:extLst>
+          </p:cNvPr>
+          <p:cNvSpPr>
+            <a:spLocks noGrp="1" noRot="1" noChangeAspect="1" noMove="1" noResize="1" noEditPoints="1" noAdjustHandles="1" noChangeArrowheads="1" noChangeShapeType="1" noTextEdit="1"/>
+          </p:cNvSpPr>
+          <p:nvPr>
+            <p:extLst>
+              <p:ext uri="{386F3935-93C4-4BCD-93E2-E3B085C9AB24}">
+                <p16:designElem xmlns:p16="http://schemas.microsoft.com/office/powerpoint/2015/main" val="1"/>
+              </p:ext>
+            </p:extLst>
+          </p:nvPr>
+        </p:nvSpPr>
+        <p:spPr>
+          <a:xfrm>
+            <a:off x="0" y="0"/>
+            <a:ext cx="12192000" cy="6858000"/>
+          </a:xfrm>
+          <a:prstGeom prst="rect">
+            <a:avLst/>
+          </a:prstGeom>
+          <a:solidFill>
+            <a:srgbClr val="FFFFFF"/>
+          </a:solidFill>
+          <a:ln>
+            <a:noFill/>
+          </a:ln>
+        </p:spPr>
+        <p:style>
+          <a:lnRef idx="2">
+            <a:schemeClr val="accent1">
+              <a:shade val="50000"/>
+            </a:schemeClr>
+          </a:lnRef>
+          <a:fillRef idx="1">
+            <a:schemeClr val="accent1"/>
+          </a:fillRef>
+          <a:effectRef idx="0">
+            <a:schemeClr val="accent1"/>
+          </a:effectRef>
+          <a:fontRef idx="minor">
+            <a:schemeClr val="lt1"/>
+          </a:fontRef>
+        </p:style>
+        <p:txBody>
+          <a:bodyPr rtlCol="0" anchor="ctr"/>
+          <a:lstStyle/>
+          <a:p>
+            <a:pPr algn="ctr"/>
+            <a:endParaRPr lang="en-US" dirty="0"/>
+          </a:p>
+        </p:txBody>
+      </p:sp>
+      <p:cxnSp>
+        <p:nvCxnSpPr>
+          <p:cNvPr id="22" name="Straight Connector 25">
+            <a:extLst>
+              <a:ext uri="{FF2B5EF4-FFF2-40B4-BE49-F238E27FC236}">
+                <a16:creationId xmlns:a16="http://schemas.microsoft.com/office/drawing/2014/main" id="{EEE3F140-02CB-4BBC-ABC0-8BF046C9D1B8}"/>
+              </a:ext>
+              <a:ext uri="{C183D7F6-B498-43B3-948B-1728B52AA6E4}">
+                <adec:decorative xmlns:adec="http://schemas.microsoft.com/office/drawing/2017/decorative" val="1"/>
+              </a:ext>
+            </a:extLst>
+          </p:cNvPr>
+          <p:cNvCxnSpPr>
+            <a:cxnSpLocks noGrp="1" noRot="1" noChangeAspect="1" noMove="1" noResize="1" noEditPoints="1" noAdjustHandles="1" noChangeArrowheads="1" noChangeShapeType="1"/>
+          </p:cNvCxnSpPr>
+          <p:nvPr>
+            <p:extLst>
+              <p:ext uri="{386F3935-93C4-4BCD-93E2-E3B085C9AB24}">
+                <p16:designElem xmlns:p16="http://schemas.microsoft.com/office/powerpoint/2015/main" val="1"/>
+              </p:ext>
+            </p:extLst>
+          </p:nvPr>
+        </p:nvCxnSpPr>
+        <p:spPr>
+          <a:xfrm>
+            <a:off x="6096000" y="1436050"/>
+            <a:ext cx="0" cy="1645920"/>
+          </a:xfrm>
+          <a:prstGeom prst="line">
+            <a:avLst/>
+          </a:prstGeom>
+          <a:ln w="19050">
+            <a:solidFill>
+              <a:srgbClr val="465359"/>
+            </a:solidFill>
+          </a:ln>
+        </p:spPr>
+        <p:style>
+          <a:lnRef idx="1">
+            <a:schemeClr val="accent1"/>
+          </a:lnRef>
+          <a:fillRef idx="0">
+            <a:schemeClr val="accent1"/>
+          </a:fillRef>
+          <a:effectRef idx="0">
+            <a:schemeClr val="accent1"/>
+          </a:effectRef>
+          <a:fontRef idx="minor">
+            <a:schemeClr val="tx1"/>
+          </a:fontRef>
+        </p:style>
+      </p:cxnSp>
+      <p:sp useBgFill="1">
+        <p:nvSpPr>
+          <p:cNvPr id="23" name="Rectangle 27">
+            <a:extLst>
+              <a:ext uri="{FF2B5EF4-FFF2-40B4-BE49-F238E27FC236}">
+                <a16:creationId xmlns:a16="http://schemas.microsoft.com/office/drawing/2014/main" id="{36B822CC-7DA9-4417-AA94-64CEB676F0B8}"/>
+              </a:ext>
+              <a:ext uri="{C183D7F6-B498-43B3-948B-1728B52AA6E4}">
+                <adec:decorative xmlns:adec="http://schemas.microsoft.com/office/drawing/2017/decorative" val="1"/>
+              </a:ext>
+            </a:extLst>
+          </p:cNvPr>
+          <p:cNvSpPr>
+            <a:spLocks noGrp="1" noRot="1" noChangeAspect="1" noMove="1" noResize="1" noEditPoints="1" noAdjustHandles="1" noChangeArrowheads="1" noChangeShapeType="1" noTextEdit="1"/>
+          </p:cNvSpPr>
+          <p:nvPr>
+            <p:extLst>
+              <p:ext uri="{386F3935-93C4-4BCD-93E2-E3B085C9AB24}">
+                <p16:designElem xmlns:p16="http://schemas.microsoft.com/office/powerpoint/2015/main" val="1"/>
+              </p:ext>
+            </p:extLst>
+          </p:nvPr>
+        </p:nvSpPr>
+        <p:spPr>
+          <a:xfrm>
+            <a:off x="447234" y="4219240"/>
+            <a:ext cx="11301984" cy="94997"/>
+          </a:xfrm>
+          <a:prstGeom prst="rect">
+            <a:avLst/>
+          </a:prstGeom>
+          <a:ln>
+            <a:noFill/>
+          </a:ln>
+          <a:effectLst/>
+        </p:spPr>
+        <p:style>
+          <a:lnRef idx="1">
+            <a:schemeClr val="accent1"/>
+          </a:lnRef>
+          <a:fillRef idx="3">
+            <a:schemeClr val="accent1"/>
+          </a:fillRef>
+          <a:effectRef idx="2">
+            <a:schemeClr val="accent1"/>
+          </a:effectRef>
+          <a:fontRef idx="minor">
+            <a:schemeClr val="lt1"/>
+          </a:fontRef>
+        </p:style>
+      </p:sp>
+      <p:sp useBgFill="1">
+        <p:nvSpPr>
+          <p:cNvPr id="25" name="Rectangle 29">
+            <a:extLst>
+              <a:ext uri="{FF2B5EF4-FFF2-40B4-BE49-F238E27FC236}">
+                <a16:creationId xmlns:a16="http://schemas.microsoft.com/office/drawing/2014/main" id="{AFA01E88-71CC-4FF3-9E81-51E0C32B45E4}"/>
+              </a:ext>
+              <a:ext uri="{C183D7F6-B498-43B3-948B-1728B52AA6E4}">
+                <adec:decorative xmlns:adec="http://schemas.microsoft.com/office/drawing/2017/decorative" val="1"/>
+              </a:ext>
+            </a:extLst>
+          </p:cNvPr>
+          <p:cNvSpPr>
+            <a:spLocks noGrp="1" noRot="1" noChangeAspect="1" noMove="1" noResize="1" noEditPoints="1" noAdjustHandles="1" noChangeArrowheads="1" noChangeShapeType="1" noTextEdit="1"/>
+          </p:cNvSpPr>
+          <p:nvPr>
+            <p:extLst>
+              <p:ext uri="{386F3935-93C4-4BCD-93E2-E3B085C9AB24}">
+                <p16:designElem xmlns:p16="http://schemas.microsoft.com/office/powerpoint/2015/main" val="1"/>
+              </p:ext>
+            </p:extLst>
+          </p:nvPr>
+        </p:nvSpPr>
+        <p:spPr>
+          <a:xfrm>
+            <a:off x="447234" y="4359623"/>
+            <a:ext cx="11303626" cy="2051143"/>
+          </a:xfrm>
+          <a:prstGeom prst="rect">
+            <a:avLst/>
+          </a:prstGeom>
+          <a:ln w="6350" cmpd="sng">
+            <a:noFill/>
+          </a:ln>
+          <a:effectLst/>
+        </p:spPr>
+        <p:style>
+          <a:lnRef idx="1">
+            <a:schemeClr val="accent1"/>
+          </a:lnRef>
+          <a:fillRef idx="3">
+            <a:schemeClr val="accent1"/>
+          </a:fillRef>
+          <a:effectRef idx="2">
+            <a:schemeClr val="accent1"/>
+          </a:effectRef>
+          <a:fontRef idx="minor">
+            <a:schemeClr val="lt1"/>
+          </a:fontRef>
+        </p:style>
+      </p:sp>
+      <p:sp>
+        <p:nvSpPr>
           <p:cNvPr id="2" name="Title 1">
             <a:extLst>
               <a:ext uri="{FF2B5EF4-FFF2-40B4-BE49-F238E27FC236}">
@@ -5190,12 +5792,27 @@
             <p:ph type="title"/>
           </p:nvPr>
         </p:nvSpPr>
-        <p:spPr/>
-        <p:txBody>
-          <a:bodyPr/>
+        <p:spPr>
+          <a:xfrm>
+            <a:off x="2772062" y="265910"/>
+            <a:ext cx="5759193" cy="924907"/>
+          </a:xfrm>
+        </p:spPr>
+        <p:txBody>
+          <a:bodyPr anchor="ctr">
+            <a:normAutofit/>
+          </a:bodyPr>
           <a:lstStyle/>
           <a:p>
-            <a:endParaRPr lang="en-US"/>
+            <a:pPr algn="ctr"/>
+            <a:r>
+              <a:rPr lang="en-US" sz="3200" dirty="0">
+                <a:solidFill>
+                  <a:schemeClr val="tx2"/>
+                </a:solidFill>
+              </a:rPr>
+              <a:t>WHAT ELSE IS HERE?</a:t>
+            </a:r>
           </a:p>
         </p:txBody>
       </p:sp>
@@ -5217,13 +5834,25 @@
         </p:nvSpPr>
         <p:spPr>
           <a:xfrm>
-            <a:off x="581192" y="2180496"/>
-            <a:ext cx="4205121" cy="3678303"/>
-          </a:xfrm>
-        </p:spPr>
-        <p:txBody>
-          <a:bodyPr/>
+            <a:off x="2475545" y="1064267"/>
+            <a:ext cx="7240909" cy="1256611"/>
+          </a:xfrm>
+        </p:spPr>
+        <p:txBody>
+          <a:bodyPr anchor="t">
+            <a:normAutofit/>
+          </a:bodyPr>
           <a:lstStyle/>
+          <a:p>
+            <a:pPr>
+              <a:buFont typeface="Wingdings" pitchFamily="2" charset="2"/>
+              <a:buChar char="§"/>
+            </a:pPr>
+            <a:r>
+              <a:rPr lang="en-US" dirty="0"/>
+              <a:t>Slight relationship between charges and age, much weaker correlation </a:t>
+            </a:r>
+          </a:p>
           <a:p>
             <a:r>
               <a:rPr lang="en-US" dirty="0"/>
@@ -5238,6 +5867,36 @@
           </a:p>
         </p:txBody>
       </p:sp>
+      <p:pic>
+        <p:nvPicPr>
+          <p:cNvPr id="12" name="Picture 11" descr="A screenshot of a cell phone&#10;&#10;Description automatically generated">
+            <a:extLst>
+              <a:ext uri="{FF2B5EF4-FFF2-40B4-BE49-F238E27FC236}">
+                <a16:creationId xmlns:a16="http://schemas.microsoft.com/office/drawing/2014/main" id="{2EC57C8F-898A-0B42-8972-BE80FA36A8CF}"/>
+              </a:ext>
+            </a:extLst>
+          </p:cNvPr>
+          <p:cNvPicPr>
+            <a:picLocks noChangeAspect="1"/>
+          </p:cNvPicPr>
+          <p:nvPr/>
+        </p:nvPicPr>
+        <p:blipFill>
+          <a:blip r:embed="rId2"/>
+          <a:stretch>
+            <a:fillRect/>
+          </a:stretch>
+        </p:blipFill>
+        <p:spPr>
+          <a:xfrm>
+            <a:off x="637463" y="2973754"/>
+            <a:ext cx="5331481" cy="2624979"/>
+          </a:xfrm>
+          <a:prstGeom prst="rect">
+            <a:avLst/>
+          </a:prstGeom>
+        </p:spPr>
+      </p:pic>
       <p:pic>
         <p:nvPicPr>
           <p:cNvPr id="7" name="Picture 6" descr="A screenshot of a cell phone&#10;&#10;Description automatically generated">
@@ -5253,15 +5912,15 @@
           <p:nvPr/>
         </p:nvPicPr>
         <p:blipFill>
-          <a:blip r:embed="rId2"/>
+          <a:blip r:embed="rId3"/>
           <a:stretch>
             <a:fillRect/>
           </a:stretch>
         </p:blipFill>
         <p:spPr>
           <a:xfrm>
-            <a:off x="5676733" y="2312110"/>
-            <a:ext cx="5676900" cy="3843734"/>
+            <a:off x="6223056" y="2973754"/>
+            <a:ext cx="5086605" cy="3444056"/>
           </a:xfrm>
           <a:prstGeom prst="rect">
             <a:avLst/>
@@ -5593,13 +6252,13 @@
           <p:nvPr/>
         </p:nvPicPr>
         <p:blipFill>
-          <a:blip r:embed="rId2"/>
+          <a:blip r:embed="rId3"/>
           <a:srcRect/>
           <a:stretch/>
         </p:blipFill>
         <p:spPr>
           <a:xfrm>
-            <a:off x="4287952" y="1803705"/>
+            <a:off x="4241830" y="1803705"/>
             <a:ext cx="7507794" cy="4916942"/>
           </a:xfrm>
           <a:prstGeom prst="rect">
@@ -5625,8 +6284,8 @@
         </p:nvSpPr>
         <p:spPr>
           <a:xfrm>
-            <a:off x="581194" y="3705726"/>
-            <a:ext cx="3363542" cy="2408730"/>
+            <a:off x="581194" y="3705725"/>
+            <a:ext cx="3310504" cy="2502967"/>
           </a:xfrm>
         </p:spPr>
         <p:txBody>
@@ -5635,10 +6294,12 @@
           </a:bodyPr>
           <a:lstStyle/>
           <a:p>
-            <a:pPr algn="ctr">
+            <a:pPr marL="285750" indent="-285750" algn="l">
               <a:lnSpc>
                 <a:spcPct val="90000"/>
               </a:lnSpc>
+              <a:buFont typeface="Wingdings" pitchFamily="2" charset="2"/>
+              <a:buChar char="§"/>
             </a:pPr>
             <a:r>
               <a:rPr lang="en-US" sz="1800" dirty="0">
@@ -5646,8 +6307,15 @@
                   <a:schemeClr val="accent2"/>
                 </a:solidFill>
               </a:rPr>
-              <a:t>LOOK AT NON SMOKERS AND REMOVE THE ‘NOISE’, outliers in outer regions of the data</a:t>
-            </a:r>
+              <a:t>REMOVE OUTLIERS: TOTAL CHARGES &gt; 22,500</a:t>
+            </a:r>
+            <a:br>
+              <a:rPr lang="en-US" sz="1800" dirty="0">
+                <a:solidFill>
+                  <a:schemeClr val="accent2"/>
+                </a:solidFill>
+              </a:rPr>
+            </a:br>
             <a:br>
               <a:rPr lang="en-US" sz="2200" dirty="0">
                 <a:solidFill>
@@ -5655,21 +6323,26 @@
                 </a:solidFill>
               </a:rPr>
             </a:br>
+            <a:r>
+              <a:rPr lang="en-US" sz="1800" dirty="0">
+                <a:solidFill>
+                  <a:schemeClr val="accent2"/>
+                </a:solidFill>
+              </a:rPr>
+              <a:t>After removing 24% of outlier we created a DATA SET  that is applicable to 74% of cases</a:t>
+            </a:r>
             <a:br>
-              <a:rPr lang="en-US" sz="1400" dirty="0">
+              <a:rPr lang="en-US" sz="1800" dirty="0">
                 <a:solidFill>
                   <a:schemeClr val="accent2"/>
                 </a:solidFill>
               </a:rPr>
             </a:br>
-            <a:r>
-              <a:rPr lang="en-US" sz="1800" dirty="0">
-                <a:solidFill>
-                  <a:schemeClr val="accent2"/>
-                </a:solidFill>
-              </a:rPr>
-              <a:t>After removing 24% of outlier we created a model that is applicable to 74% of cases"</a:t>
-            </a:r>
+            <a:endParaRPr lang="en-US" sz="1800" dirty="0">
+              <a:solidFill>
+                <a:schemeClr val="accent2"/>
+              </a:solidFill>
+            </a:endParaRPr>
           </a:p>
         </p:txBody>
       </p:sp>
@@ -5688,7 +6361,7 @@
           <p:nvPr/>
         </p:nvPicPr>
         <p:blipFill>
-          <a:blip r:embed="rId3"/>
+          <a:blip r:embed="rId4"/>
           <a:stretch>
             <a:fillRect/>
           </a:stretch>
@@ -5703,6 +6376,46 @@
           </a:prstGeom>
         </p:spPr>
       </p:pic>
+      <p:sp>
+        <p:nvSpPr>
+          <p:cNvPr id="42" name="TextBox 41">
+            <a:extLst>
+              <a:ext uri="{FF2B5EF4-FFF2-40B4-BE49-F238E27FC236}">
+                <a16:creationId xmlns:a16="http://schemas.microsoft.com/office/drawing/2014/main" id="{2FD841A5-8909-0F4F-A914-FF9C507A18C3}"/>
+              </a:ext>
+            </a:extLst>
+          </p:cNvPr>
+          <p:cNvSpPr txBox="1"/>
+          <p:nvPr/>
+        </p:nvSpPr>
+        <p:spPr>
+          <a:xfrm>
+            <a:off x="4391249" y="847572"/>
+            <a:ext cx="7208956" cy="461665"/>
+          </a:xfrm>
+          <a:prstGeom prst="rect">
+            <a:avLst/>
+          </a:prstGeom>
+          <a:noFill/>
+        </p:spPr>
+        <p:txBody>
+          <a:bodyPr wrap="square" rtlCol="0">
+            <a:spAutoFit/>
+          </a:bodyPr>
+          <a:lstStyle/>
+          <a:p>
+            <a:pPr algn="ctr"/>
+            <a:r>
+              <a:rPr lang="en-US" sz="2400" dirty="0">
+                <a:solidFill>
+                  <a:schemeClr val="bg1"/>
+                </a:solidFill>
+              </a:rPr>
+              <a:t>VIEW OF NON-SMOKERS ONLY</a:t>
+            </a:r>
+          </a:p>
+        </p:txBody>
+      </p:sp>
     </p:spTree>
     <p:extLst>
       <p:ext uri="{BB962C8B-B14F-4D97-AF65-F5344CB8AC3E}">
@@ -5743,6 +6456,59 @@
       </p:grpSpPr>
       <p:sp>
         <p:nvSpPr>
+          <p:cNvPr id="16" name="Rectangle 15">
+            <a:extLst>
+              <a:ext uri="{FF2B5EF4-FFF2-40B4-BE49-F238E27FC236}">
+                <a16:creationId xmlns:a16="http://schemas.microsoft.com/office/drawing/2014/main" id="{E00AC7A8-1927-9A4E-8CC4-47C5E37D86B5}"/>
+              </a:ext>
+            </a:extLst>
+          </p:cNvPr>
+          <p:cNvSpPr/>
+          <p:nvPr/>
+        </p:nvSpPr>
+        <p:spPr>
+          <a:xfrm>
+            <a:off x="3441321" y="1363991"/>
+            <a:ext cx="6096000" cy="1754326"/>
+          </a:xfrm>
+          <a:prstGeom prst="rect">
+            <a:avLst/>
+          </a:prstGeom>
+        </p:spPr>
+        <p:txBody>
+          <a:bodyPr>
+            <a:spAutoFit/>
+          </a:bodyPr>
+          <a:lstStyle/>
+          <a:p>
+            <a:r>
+              <a:rPr lang="en-US" dirty="0">
+                <a:solidFill>
+                  <a:schemeClr val="accent2"/>
+                </a:solidFill>
+              </a:rPr>
+              <a:t>After removing 24% of the outliers data, the data set was now in a model that was applicable to 74% of cases. This allowed for a cleaner data set to be able to examine the larger population, non-smokers. </a:t>
+            </a:r>
+            <a:br>
+              <a:rPr lang="en-US" dirty="0">
+                <a:solidFill>
+                  <a:schemeClr val="accent2"/>
+                </a:solidFill>
+              </a:rPr>
+            </a:br>
+            <a:r>
+              <a:rPr lang="en-US" dirty="0">
+                <a:solidFill>
+                  <a:schemeClr val="accent2"/>
+                </a:solidFill>
+              </a:rPr>
+              <a:t>For non-smoking men and women, only age appears highly correlated with costs.</a:t>
+            </a:r>
+          </a:p>
+        </p:txBody>
+      </p:sp>
+      <p:sp>
+        <p:nvSpPr>
           <p:cNvPr id="2" name="Title 1">
             <a:extLst>
               <a:ext uri="{FF2B5EF4-FFF2-40B4-BE49-F238E27FC236}">
@@ -5775,69 +6541,11 @@
                   <a:srgbClr val="FFFFFF"/>
                 </a:solidFill>
               </a:rPr>
-              <a:t>When we examine non-smokers AS an independent group,  only AGE appears highly correlated with costs, for both men and women.</a:t>
-            </a:r>
-          </a:p>
-        </p:txBody>
-      </p:sp>
-      <p:pic>
-        <p:nvPicPr>
-          <p:cNvPr id="9" name="Content Placeholder 8">
-            <a:extLst>
-              <a:ext uri="{FF2B5EF4-FFF2-40B4-BE49-F238E27FC236}">
-                <a16:creationId xmlns:a16="http://schemas.microsoft.com/office/drawing/2014/main" id="{E061C99A-84F3-914B-93C1-C96BAE1BF6D0}"/>
-              </a:ext>
-            </a:extLst>
-          </p:cNvPr>
-          <p:cNvPicPr>
-            <a:picLocks noChangeAspect="1"/>
-          </p:cNvPicPr>
-          <p:nvPr/>
-        </p:nvPicPr>
-        <p:blipFill>
-          <a:blip r:embed="rId2"/>
-          <a:srcRect/>
-          <a:stretch/>
-        </p:blipFill>
-        <p:spPr>
-          <a:xfrm>
-            <a:off x="537030" y="2459867"/>
-            <a:ext cx="4992622" cy="3621816"/>
-          </a:xfrm>
-          <a:prstGeom prst="rect">
-            <a:avLst/>
-          </a:prstGeom>
-        </p:spPr>
-      </p:pic>
-      <p:pic>
-        <p:nvPicPr>
-          <p:cNvPr id="11" name="Picture 10">
-            <a:extLst>
-              <a:ext uri="{FF2B5EF4-FFF2-40B4-BE49-F238E27FC236}">
-                <a16:creationId xmlns:a16="http://schemas.microsoft.com/office/drawing/2014/main" id="{4FC8C4F9-40AD-C241-8EBF-47DF99831262}"/>
-              </a:ext>
-            </a:extLst>
-          </p:cNvPr>
-          <p:cNvPicPr>
-            <a:picLocks noChangeAspect="1"/>
-          </p:cNvPicPr>
-          <p:nvPr/>
-        </p:nvPicPr>
-        <p:blipFill>
-          <a:blip r:embed="rId3"/>
-          <a:srcRect/>
-          <a:stretch/>
-        </p:blipFill>
-        <p:spPr>
-          <a:xfrm>
-            <a:off x="6211614" y="2459656"/>
-            <a:ext cx="4992913" cy="3622027"/>
-          </a:xfrm>
-          <a:prstGeom prst="rect">
-            <a:avLst/>
-          </a:prstGeom>
-        </p:spPr>
-      </p:pic>
+              <a:t>for both men and women non-smokers,  only AGE appears highly correlated with costs.</a:t>
+            </a:r>
+          </a:p>
+        </p:txBody>
+      </p:sp>
       <p:sp>
         <p:nvSpPr>
           <p:cNvPr id="13" name="TextBox 12">
@@ -5852,7 +6560,7 @@
         </p:nvSpPr>
         <p:spPr>
           <a:xfrm>
-            <a:off x="1371455" y="1903245"/>
+            <a:off x="559410" y="3244334"/>
             <a:ext cx="3323772" cy="369332"/>
           </a:xfrm>
           <a:prstGeom prst="rect">
@@ -5888,7 +6596,7 @@
         </p:nvSpPr>
         <p:spPr>
           <a:xfrm>
-            <a:off x="6930571" y="1853727"/>
+            <a:off x="7520474" y="3212614"/>
             <a:ext cx="3323772" cy="369332"/>
           </a:xfrm>
           <a:prstGeom prst="rect">
@@ -5906,6 +6614,260 @@
             <a:r>
               <a:rPr lang="en-US" dirty="0"/>
               <a:t>Men</a:t>
+            </a:r>
+          </a:p>
+        </p:txBody>
+      </p:sp>
+      <p:grpSp>
+        <p:nvGrpSpPr>
+          <p:cNvPr id="17" name="Group 16">
+            <a:extLst>
+              <a:ext uri="{FF2B5EF4-FFF2-40B4-BE49-F238E27FC236}">
+                <a16:creationId xmlns:a16="http://schemas.microsoft.com/office/drawing/2014/main" id="{516FBDC5-BF3B-D44F-BA9C-36A1E1134E82}"/>
+              </a:ext>
+            </a:extLst>
+          </p:cNvPr>
+          <p:cNvGrpSpPr/>
+          <p:nvPr/>
+        </p:nvGrpSpPr>
+        <p:grpSpPr>
+          <a:xfrm>
+            <a:off x="299551" y="3613660"/>
+            <a:ext cx="4113858" cy="3019215"/>
+            <a:chOff x="299551" y="3613660"/>
+            <a:chExt cx="4113858" cy="3019215"/>
+          </a:xfrm>
+        </p:grpSpPr>
+        <p:pic>
+          <p:nvPicPr>
+            <p:cNvPr id="9" name="Content Placeholder 8">
+              <a:extLst>
+                <a:ext uri="{FF2B5EF4-FFF2-40B4-BE49-F238E27FC236}">
+                  <a16:creationId xmlns:a16="http://schemas.microsoft.com/office/drawing/2014/main" id="{E061C99A-84F3-914B-93C1-C96BAE1BF6D0}"/>
+                </a:ext>
+              </a:extLst>
+            </p:cNvPr>
+            <p:cNvPicPr>
+              <a:picLocks noChangeAspect="1"/>
+            </p:cNvPicPr>
+            <p:nvPr/>
+          </p:nvPicPr>
+          <p:blipFill>
+            <a:blip r:embed="rId2"/>
+            <a:srcRect/>
+            <a:stretch/>
+          </p:blipFill>
+          <p:spPr>
+            <a:xfrm>
+              <a:off x="299551" y="3648544"/>
+              <a:ext cx="4113858" cy="2984331"/>
+            </a:xfrm>
+            <a:prstGeom prst="rect">
+              <a:avLst/>
+            </a:prstGeom>
+          </p:spPr>
+        </p:pic>
+        <p:sp>
+          <p:nvSpPr>
+            <p:cNvPr id="21" name="Oval 20">
+              <a:extLst>
+                <a:ext uri="{FF2B5EF4-FFF2-40B4-BE49-F238E27FC236}">
+                  <a16:creationId xmlns:a16="http://schemas.microsoft.com/office/drawing/2014/main" id="{AEF7AC96-1891-EF48-A14F-F5C3F4CE251C}"/>
+                </a:ext>
+              </a:extLst>
+            </p:cNvPr>
+            <p:cNvSpPr/>
+            <p:nvPr/>
+          </p:nvSpPr>
+          <p:spPr>
+            <a:xfrm rot="20936872">
+              <a:off x="2918121" y="3613660"/>
+              <a:ext cx="893504" cy="832982"/>
+            </a:xfrm>
+            <a:prstGeom prst="ellipse">
+              <a:avLst/>
+            </a:prstGeom>
+            <a:noFill/>
+            <a:ln>
+              <a:solidFill>
+                <a:srgbClr val="FF0000"/>
+              </a:solidFill>
+            </a:ln>
+          </p:spPr>
+          <p:style>
+            <a:lnRef idx="1">
+              <a:schemeClr val="accent1"/>
+            </a:lnRef>
+            <a:fillRef idx="3">
+              <a:schemeClr val="accent1"/>
+            </a:fillRef>
+            <a:effectRef idx="2">
+              <a:schemeClr val="accent1"/>
+            </a:effectRef>
+            <a:fontRef idx="minor">
+              <a:schemeClr val="lt1"/>
+            </a:fontRef>
+          </p:style>
+          <p:txBody>
+            <a:bodyPr rtlCol="0" anchor="ctr"/>
+            <a:lstStyle/>
+            <a:p>
+              <a:pPr algn="ctr"/>
+              <a:endParaRPr lang="en-US"/>
+            </a:p>
+          </p:txBody>
+        </p:sp>
+      </p:grpSp>
+      <p:grpSp>
+        <p:nvGrpSpPr>
+          <p:cNvPr id="25" name="Group 24">
+            <a:extLst>
+              <a:ext uri="{FF2B5EF4-FFF2-40B4-BE49-F238E27FC236}">
+                <a16:creationId xmlns:a16="http://schemas.microsoft.com/office/drawing/2014/main" id="{EE1AEF7B-AF47-8F48-8CD8-1CBE861F38BE}"/>
+              </a:ext>
+            </a:extLst>
+          </p:cNvPr>
+          <p:cNvGrpSpPr/>
+          <p:nvPr/>
+        </p:nvGrpSpPr>
+        <p:grpSpPr>
+          <a:xfrm>
+            <a:off x="7306286" y="3616915"/>
+            <a:ext cx="3752149" cy="2784174"/>
+            <a:chOff x="7306286" y="3616915"/>
+            <a:chExt cx="3752149" cy="2784174"/>
+          </a:xfrm>
+        </p:grpSpPr>
+        <p:pic>
+          <p:nvPicPr>
+            <p:cNvPr id="11" name="Picture 10">
+              <a:extLst>
+                <a:ext uri="{FF2B5EF4-FFF2-40B4-BE49-F238E27FC236}">
+                  <a16:creationId xmlns:a16="http://schemas.microsoft.com/office/drawing/2014/main" id="{4FC8C4F9-40AD-C241-8EBF-47DF99831262}"/>
+                </a:ext>
+              </a:extLst>
+            </p:cNvPr>
+            <p:cNvPicPr>
+              <a:picLocks noChangeAspect="1"/>
+            </p:cNvPicPr>
+            <p:nvPr/>
+          </p:nvPicPr>
+          <p:blipFill>
+            <a:blip r:embed="rId3"/>
+            <a:srcRect/>
+            <a:stretch/>
+          </p:blipFill>
+          <p:spPr>
+            <a:xfrm>
+              <a:off x="7306286" y="3679154"/>
+              <a:ext cx="3752149" cy="2721935"/>
+            </a:xfrm>
+            <a:prstGeom prst="rect">
+              <a:avLst/>
+            </a:prstGeom>
+          </p:spPr>
+        </p:pic>
+        <p:sp>
+          <p:nvSpPr>
+            <p:cNvPr id="23" name="Oval 22">
+              <a:extLst>
+                <a:ext uri="{FF2B5EF4-FFF2-40B4-BE49-F238E27FC236}">
+                  <a16:creationId xmlns:a16="http://schemas.microsoft.com/office/drawing/2014/main" id="{40B4C149-BB34-6E45-BCFA-C8F568482EDE}"/>
+                </a:ext>
+              </a:extLst>
+            </p:cNvPr>
+            <p:cNvSpPr/>
+            <p:nvPr/>
+          </p:nvSpPr>
+          <p:spPr>
+            <a:xfrm rot="20936872">
+              <a:off x="9607944" y="3616915"/>
+              <a:ext cx="926836" cy="826468"/>
+            </a:xfrm>
+            <a:prstGeom prst="ellipse">
+              <a:avLst/>
+            </a:prstGeom>
+            <a:noFill/>
+            <a:ln>
+              <a:solidFill>
+                <a:srgbClr val="FF0000"/>
+              </a:solidFill>
+            </a:ln>
+          </p:spPr>
+          <p:style>
+            <a:lnRef idx="1">
+              <a:schemeClr val="accent1"/>
+            </a:lnRef>
+            <a:fillRef idx="3">
+              <a:schemeClr val="accent1"/>
+            </a:fillRef>
+            <a:effectRef idx="2">
+              <a:schemeClr val="accent1"/>
+            </a:effectRef>
+            <a:fontRef idx="minor">
+              <a:schemeClr val="lt1"/>
+            </a:fontRef>
+          </p:style>
+          <p:txBody>
+            <a:bodyPr rtlCol="0" anchor="ctr"/>
+            <a:lstStyle/>
+            <a:p>
+              <a:pPr algn="ctr"/>
+              <a:endParaRPr lang="en-US"/>
+            </a:p>
+          </p:txBody>
+        </p:sp>
+      </p:grpSp>
+      <p:sp>
+        <p:nvSpPr>
+          <p:cNvPr id="14" name="Rectangle 13">
+            <a:extLst>
+              <a:ext uri="{FF2B5EF4-FFF2-40B4-BE49-F238E27FC236}">
+                <a16:creationId xmlns:a16="http://schemas.microsoft.com/office/drawing/2014/main" id="{C1C99066-953A-7F45-ADA1-D59FF8B012A1}"/>
+              </a:ext>
+            </a:extLst>
+          </p:cNvPr>
+          <p:cNvSpPr/>
+          <p:nvPr/>
+        </p:nvSpPr>
+        <p:spPr>
+          <a:xfrm>
+            <a:off x="3348388" y="664421"/>
+            <a:ext cx="6096000" cy="646331"/>
+          </a:xfrm>
+          <a:prstGeom prst="rect">
+            <a:avLst/>
+          </a:prstGeom>
+        </p:spPr>
+        <p:txBody>
+          <a:bodyPr>
+            <a:spAutoFit/>
+          </a:bodyPr>
+          <a:lstStyle/>
+          <a:p>
+            <a:pPr algn="ctr"/>
+            <a:r>
+              <a:rPr lang="en-US" b="1" dirty="0">
+                <a:solidFill>
+                  <a:schemeClr val="accent2"/>
+                </a:solidFill>
+              </a:rPr>
+              <a:t>Double click on Non-Smokers as the Larger Population</a:t>
+            </a:r>
+            <a:br>
+              <a:rPr lang="en-US" b="1" dirty="0">
+                <a:solidFill>
+                  <a:schemeClr val="accent2"/>
+                </a:solidFill>
+              </a:rPr>
+            </a:br>
+            <a:r>
+              <a:rPr lang="en-US" b="1" dirty="0">
+                <a:solidFill>
+                  <a:schemeClr val="accent2"/>
+                </a:solidFill>
+              </a:rPr>
+              <a:t>(excluding outliers)</a:t>
             </a:r>
           </a:p>
         </p:txBody>
@@ -5929,7 +6891,7 @@
     <p:bg>
       <p:bgPr>
         <a:solidFill>
-          <a:schemeClr val="bg2"/>
+          <a:schemeClr val="bg1"/>
         </a:solidFill>
         <a:effectLst/>
       </p:bgPr>
@@ -5948,12 +6910,12 @@
           <a:chExt cx="0" cy="0"/>
         </a:xfrm>
       </p:grpSpPr>
-      <p:sp>
-        <p:nvSpPr>
-          <p:cNvPr id="37" name="Rectangle 36">
+      <p:sp useBgFill="1">
+        <p:nvSpPr>
+          <p:cNvPr id="53" name="Rectangle 47">
             <a:extLst>
               <a:ext uri="{FF2B5EF4-FFF2-40B4-BE49-F238E27FC236}">
-                <a16:creationId xmlns:a16="http://schemas.microsoft.com/office/drawing/2014/main" id="{00401440-1DC9-4C9E-A3BA-4DECEEB46503}"/>
+                <a16:creationId xmlns:a16="http://schemas.microsoft.com/office/drawing/2014/main" id="{A21E7785-3D2D-4FF8-9C82-42CE9DBD7BB9}"/>
               </a:ext>
               <a:ext uri="{C183D7F6-B498-43B3-948B-1728B52AA6E4}">
                 <adec:decorative xmlns:adec="http://schemas.microsoft.com/office/drawing/2017/decorative" val="1"/>
@@ -5973,15 +6935,12 @@
         </p:nvSpPr>
         <p:spPr>
           <a:xfrm>
-            <a:off x="0" y="0"/>
-            <a:ext cx="12192000" cy="6858000"/>
+            <a:off x="0" y="548641"/>
+            <a:ext cx="12191999" cy="6309360"/>
           </a:xfrm>
           <a:prstGeom prst="rect">
             <a:avLst/>
           </a:prstGeom>
-          <a:solidFill>
-            <a:srgbClr val="FFFFFF"/>
-          </a:solidFill>
           <a:ln>
             <a:noFill/>
           </a:ln>
@@ -6007,54 +6966,25 @@
           <a:lstStyle/>
           <a:p>
             <a:pPr algn="ctr"/>
-            <a:endParaRPr lang="en-US" dirty="0"/>
-          </a:p>
-        </p:txBody>
-      </p:sp>
-      <p:pic>
-        <p:nvPicPr>
-          <p:cNvPr id="23" name="Picture 22">
+            <a:endParaRPr lang="en-US"/>
+          </a:p>
+        </p:txBody>
+      </p:sp>
+      <p:sp>
+        <p:nvSpPr>
+          <p:cNvPr id="55" name="Rectangle 49">
             <a:extLst>
               <a:ext uri="{FF2B5EF4-FFF2-40B4-BE49-F238E27FC236}">
-                <a16:creationId xmlns:a16="http://schemas.microsoft.com/office/drawing/2014/main" id="{73F9B532-B43B-3F45-BE06-979F7F3A8811}"/>
-              </a:ext>
-            </a:extLst>
-          </p:cNvPr>
-          <p:cNvPicPr>
-            <a:picLocks noChangeAspect="1"/>
-          </p:cNvPicPr>
-          <p:nvPr/>
-        </p:nvPicPr>
-        <p:blipFill>
-          <a:blip r:embed="rId2"/>
-          <a:srcRect/>
-          <a:stretch/>
-        </p:blipFill>
-        <p:spPr>
-          <a:xfrm>
-            <a:off x="382261" y="752978"/>
-            <a:ext cx="5331479" cy="3348272"/>
-          </a:xfrm>
-          <a:prstGeom prst="rect">
-            <a:avLst/>
-          </a:prstGeom>
-        </p:spPr>
-      </p:pic>
-      <p:cxnSp>
-        <p:nvCxnSpPr>
-          <p:cNvPr id="39" name="Straight Connector 38">
-            <a:extLst>
-              <a:ext uri="{FF2B5EF4-FFF2-40B4-BE49-F238E27FC236}">
-                <a16:creationId xmlns:a16="http://schemas.microsoft.com/office/drawing/2014/main" id="{EEE3F140-02CB-4BBC-ABC0-8BF046C9D1B8}"/>
+                <a16:creationId xmlns:a16="http://schemas.microsoft.com/office/drawing/2014/main" id="{9911E146-5AE8-4892-B0B5-42052873B9E5}"/>
               </a:ext>
               <a:ext uri="{C183D7F6-B498-43B3-948B-1728B52AA6E4}">
                 <adec:decorative xmlns:adec="http://schemas.microsoft.com/office/drawing/2017/decorative" val="1"/>
               </a:ext>
             </a:extLst>
           </p:cNvPr>
-          <p:cNvCxnSpPr>
-            <a:cxnSpLocks noGrp="1" noRot="1" noChangeAspect="1" noMove="1" noResize="1" noEditPoints="1" noAdjustHandles="1" noChangeArrowheads="1" noChangeShapeType="1"/>
-          </p:cNvCxnSpPr>
+          <p:cNvSpPr>
+            <a:spLocks noGrp="1" noRot="1" noChangeAspect="1" noMove="1" noResize="1" noEditPoints="1" noAdjustHandles="1" noChangeArrowheads="1" noChangeShapeType="1" noTextEdit="1"/>
+          </p:cNvSpPr>
           <p:nvPr>
             <p:extLst>
               <p:ext uri="{386F3935-93C4-4BCD-93E2-E3B085C9AB24}">
@@ -6062,36 +6992,307 @@
               </p:ext>
             </p:extLst>
           </p:nvPr>
-        </p:nvCxnSpPr>
-        <p:spPr>
-          <a:xfrm>
-            <a:off x="6096000" y="1436050"/>
-            <a:ext cx="0" cy="1645920"/>
-          </a:xfrm>
-          <a:prstGeom prst="line">
+        </p:nvSpPr>
+        <p:spPr>
+          <a:xfrm>
+            <a:off x="442377" y="3194092"/>
+            <a:ext cx="3705323" cy="3206708"/>
+          </a:xfrm>
+          <a:prstGeom prst="rect">
             <a:avLst/>
           </a:prstGeom>
-          <a:ln w="19050">
-            <a:solidFill>
-              <a:srgbClr val="465359"/>
-            </a:solidFill>
+          <a:solidFill>
+            <a:schemeClr val="accent1"/>
+          </a:solidFill>
+          <a:ln>
+            <a:noFill/>
           </a:ln>
+          <a:effectLst/>
         </p:spPr>
         <p:style>
           <a:lnRef idx="1">
             <a:schemeClr val="accent1"/>
           </a:lnRef>
-          <a:fillRef idx="0">
+          <a:fillRef idx="3">
+            <a:schemeClr val="accent1"/>
+          </a:fillRef>
+          <a:effectRef idx="2">
+            <a:schemeClr val="accent1"/>
+          </a:effectRef>
+          <a:fontRef idx="minor">
+            <a:schemeClr val="lt1"/>
+          </a:fontRef>
+        </p:style>
+      </p:sp>
+      <p:sp>
+        <p:nvSpPr>
+          <p:cNvPr id="2" name="Title 1">
+            <a:extLst>
+              <a:ext uri="{FF2B5EF4-FFF2-40B4-BE49-F238E27FC236}">
+                <a16:creationId xmlns:a16="http://schemas.microsoft.com/office/drawing/2014/main" id="{331C21C6-7084-FE4F-8FC4-AD73E7446C3F}"/>
+              </a:ext>
+            </a:extLst>
+          </p:cNvPr>
+          <p:cNvSpPr>
+            <a:spLocks noGrp="1"/>
+          </p:cNvSpPr>
+          <p:nvPr>
+            <p:ph type="title"/>
+          </p:nvPr>
+        </p:nvSpPr>
+        <p:spPr>
+          <a:xfrm>
+            <a:off x="593253" y="3425294"/>
+            <a:ext cx="3397924" cy="2800478"/>
+          </a:xfrm>
+        </p:spPr>
+        <p:txBody>
+          <a:bodyPr anchor="ctr">
+            <a:normAutofit/>
+          </a:bodyPr>
+          <a:lstStyle/>
+          <a:p>
+            <a:pPr>
+              <a:lnSpc>
+                <a:spcPct val="90000"/>
+              </a:lnSpc>
+            </a:pPr>
+            <a:r>
+              <a:rPr lang="en-US" sz="2600">
+                <a:solidFill>
+                  <a:srgbClr val="FFFFFF"/>
+                </a:solidFill>
+              </a:rPr>
+              <a:t>When we look only at the non-smokers, WE SEE WOMEN’S CHARGES ARE 13% HIGHER regardless of region</a:t>
+            </a:r>
+          </a:p>
+        </p:txBody>
+      </p:sp>
+      <p:sp>
+        <p:nvSpPr>
+          <p:cNvPr id="57" name="Rectangle 51">
+            <a:extLst>
+              <a:ext uri="{FF2B5EF4-FFF2-40B4-BE49-F238E27FC236}">
+                <a16:creationId xmlns:a16="http://schemas.microsoft.com/office/drawing/2014/main" id="{978A552A-290C-474C-9CC8-401379CD133C}"/>
+              </a:ext>
+              <a:ext uri="{C183D7F6-B498-43B3-948B-1728B52AA6E4}">
+                <adec:decorative xmlns:adec="http://schemas.microsoft.com/office/drawing/2017/decorative" val="1"/>
+              </a:ext>
+            </a:extLst>
+          </p:cNvPr>
+          <p:cNvSpPr>
+            <a:spLocks noGrp="1" noRot="1" noChangeAspect="1" noMove="1" noResize="1" noEditPoints="1" noAdjustHandles="1" noChangeArrowheads="1" noChangeShapeType="1" noTextEdit="1"/>
+          </p:cNvSpPr>
+          <p:nvPr>
+            <p:extLst>
+              <p:ext uri="{386F3935-93C4-4BCD-93E2-E3B085C9AB24}">
+                <p16:designElem xmlns:p16="http://schemas.microsoft.com/office/powerpoint/2015/main" val="1"/>
+              </p:ext>
+            </p:extLst>
+          </p:nvPr>
+        </p:nvSpPr>
+        <p:spPr>
+          <a:xfrm>
+            <a:off x="446534" y="457200"/>
+            <a:ext cx="3703320" cy="94997"/>
+          </a:xfrm>
+          <a:prstGeom prst="rect">
+            <a:avLst/>
+          </a:prstGeom>
+          <a:solidFill>
+            <a:schemeClr val="accent1"/>
+          </a:solidFill>
+          <a:ln>
+            <a:noFill/>
+          </a:ln>
+          <a:effectLst/>
+        </p:spPr>
+        <p:style>
+          <a:lnRef idx="1">
+            <a:schemeClr val="accent1"/>
+          </a:lnRef>
+          <a:fillRef idx="3">
+            <a:schemeClr val="accent1"/>
+          </a:fillRef>
+          <a:effectRef idx="2">
+            <a:schemeClr val="accent1"/>
+          </a:effectRef>
+          <a:fontRef idx="minor">
+            <a:schemeClr val="lt1"/>
+          </a:fontRef>
+        </p:style>
+      </p:sp>
+      <p:sp>
+        <p:nvSpPr>
+          <p:cNvPr id="59" name="Rectangle 53">
+            <a:extLst>
+              <a:ext uri="{FF2B5EF4-FFF2-40B4-BE49-F238E27FC236}">
+                <a16:creationId xmlns:a16="http://schemas.microsoft.com/office/drawing/2014/main" id="{57D8432A-7050-43CE-AC0E-48F00C7D5232}"/>
+              </a:ext>
+              <a:ext uri="{C183D7F6-B498-43B3-948B-1728B52AA6E4}">
+                <adec:decorative xmlns:adec="http://schemas.microsoft.com/office/drawing/2017/decorative" val="1"/>
+              </a:ext>
+            </a:extLst>
+          </p:cNvPr>
+          <p:cNvSpPr>
+            <a:spLocks noGrp="1" noRot="1" noChangeAspect="1" noMove="1" noResize="1" noEditPoints="1" noAdjustHandles="1" noChangeArrowheads="1" noChangeShapeType="1" noTextEdit="1"/>
+          </p:cNvSpPr>
+          <p:nvPr>
+            <p:extLst>
+              <p:ext uri="{386F3935-93C4-4BCD-93E2-E3B085C9AB24}">
+                <p16:designElem xmlns:p16="http://schemas.microsoft.com/office/powerpoint/2015/main" val="1"/>
+              </p:ext>
+            </p:extLst>
+          </p:nvPr>
+        </p:nvSpPr>
+        <p:spPr>
+          <a:xfrm>
+            <a:off x="4241830" y="457200"/>
+            <a:ext cx="3703320" cy="91440"/>
+          </a:xfrm>
+          <a:prstGeom prst="rect">
+            <a:avLst/>
+          </a:prstGeom>
+          <a:solidFill>
+            <a:schemeClr val="accent2"/>
+          </a:solidFill>
+          <a:ln>
+            <a:noFill/>
+          </a:ln>
+          <a:effectLst/>
+        </p:spPr>
+        <p:style>
+          <a:lnRef idx="1">
+            <a:schemeClr val="accent1"/>
+          </a:lnRef>
+          <a:fillRef idx="3">
+            <a:schemeClr val="accent1"/>
+          </a:fillRef>
+          <a:effectRef idx="2">
+            <a:schemeClr val="accent1"/>
+          </a:effectRef>
+          <a:fontRef idx="minor">
+            <a:schemeClr val="lt1"/>
+          </a:fontRef>
+        </p:style>
+      </p:sp>
+      <p:sp>
+        <p:nvSpPr>
+          <p:cNvPr id="61" name="Rectangle 55">
+            <a:extLst>
+              <a:ext uri="{FF2B5EF4-FFF2-40B4-BE49-F238E27FC236}">
+                <a16:creationId xmlns:a16="http://schemas.microsoft.com/office/drawing/2014/main" id="{55B5BA19-E267-49E0-A8F7-3435C91189DE}"/>
+              </a:ext>
+              <a:ext uri="{C183D7F6-B498-43B3-948B-1728B52AA6E4}">
+                <adec:decorative xmlns:adec="http://schemas.microsoft.com/office/drawing/2017/decorative" val="1"/>
+              </a:ext>
+            </a:extLst>
+          </p:cNvPr>
+          <p:cNvSpPr>
+            <a:spLocks noGrp="1" noRot="1" noChangeAspect="1" noMove="1" noResize="1" noEditPoints="1" noAdjustHandles="1" noChangeArrowheads="1" noChangeShapeType="1" noTextEdit="1"/>
+          </p:cNvSpPr>
+          <p:nvPr>
+            <p:extLst>
+              <p:ext uri="{386F3935-93C4-4BCD-93E2-E3B085C9AB24}">
+                <p16:designElem xmlns:p16="http://schemas.microsoft.com/office/powerpoint/2015/main" val="1"/>
+              </p:ext>
+            </p:extLst>
+          </p:nvPr>
+        </p:nvSpPr>
+        <p:spPr>
+          <a:xfrm>
+            <a:off x="8042147" y="453643"/>
+            <a:ext cx="3703320" cy="98554"/>
+          </a:xfrm>
+          <a:prstGeom prst="rect">
+            <a:avLst/>
+          </a:prstGeom>
+          <a:solidFill>
+            <a:schemeClr val="accent4"/>
+          </a:solidFill>
+          <a:ln>
+            <a:noFill/>
+          </a:ln>
+          <a:effectLst/>
+        </p:spPr>
+        <p:style>
+          <a:lnRef idx="1">
+            <a:schemeClr val="accent1"/>
+          </a:lnRef>
+          <a:fillRef idx="3">
+            <a:schemeClr val="accent1"/>
+          </a:fillRef>
+          <a:effectRef idx="2">
+            <a:schemeClr val="accent1"/>
+          </a:effectRef>
+          <a:fontRef idx="minor">
+            <a:schemeClr val="lt1"/>
+          </a:fontRef>
+        </p:style>
+      </p:sp>
+      <p:sp>
+        <p:nvSpPr>
+          <p:cNvPr id="63" name="Rectangle 57">
+            <a:extLst>
+              <a:ext uri="{FF2B5EF4-FFF2-40B4-BE49-F238E27FC236}">
+                <a16:creationId xmlns:a16="http://schemas.microsoft.com/office/drawing/2014/main" id="{D19504FF-266B-4F6E-BAA1-DF9730E90020}"/>
+              </a:ext>
+              <a:ext uri="{C183D7F6-B498-43B3-948B-1728B52AA6E4}">
+                <adec:decorative xmlns:adec="http://schemas.microsoft.com/office/drawing/2017/decorative" val="1"/>
+              </a:ext>
+            </a:extLst>
+          </p:cNvPr>
+          <p:cNvSpPr>
+            <a:spLocks noGrp="1" noRot="1" noChangeAspect="1" noMove="1" noResize="1" noEditPoints="1" noAdjustHandles="1" noChangeArrowheads="1" noChangeShapeType="1" noTextEdit="1"/>
+          </p:cNvSpPr>
+          <p:nvPr>
+            <p:extLst>
+              <p:ext uri="{386F3935-93C4-4BCD-93E2-E3B085C9AB24}">
+                <p16:designElem xmlns:p16="http://schemas.microsoft.com/office/powerpoint/2015/main" val="1"/>
+              </p:ext>
+            </p:extLst>
+          </p:nvPr>
+        </p:nvSpPr>
+        <p:spPr>
+          <a:xfrm>
+            <a:off x="442377" y="654222"/>
+            <a:ext cx="3702878" cy="2437844"/>
+          </a:xfrm>
+          <a:prstGeom prst="rect">
+            <a:avLst/>
+          </a:prstGeom>
+          <a:noFill/>
+          <a:ln w="19050">
+            <a:solidFill>
+              <a:schemeClr val="accent4"/>
+            </a:solidFill>
+          </a:ln>
+        </p:spPr>
+        <p:style>
+          <a:lnRef idx="2">
+            <a:schemeClr val="accent1">
+              <a:shade val="50000"/>
+            </a:schemeClr>
+          </a:lnRef>
+          <a:fillRef idx="1">
             <a:schemeClr val="accent1"/>
           </a:fillRef>
           <a:effectRef idx="0">
             <a:schemeClr val="accent1"/>
           </a:effectRef>
           <a:fontRef idx="minor">
-            <a:schemeClr val="tx1"/>
+            <a:schemeClr val="lt1"/>
           </a:fontRef>
         </p:style>
-      </p:cxnSp>
+        <p:txBody>
+          <a:bodyPr rtlCol="0" anchor="ctr"/>
+          <a:lstStyle/>
+          <a:p>
+            <a:pPr algn="ctr"/>
+            <a:endParaRPr lang="en-US"/>
+          </a:p>
+        </p:txBody>
+      </p:sp>
       <p:pic>
         <p:nvPicPr>
           <p:cNvPr id="16" name="Picture 15" descr="A screenshot of a cell phone&#10;&#10;Description automatically generated">
@@ -6107,26 +7308,26 @@
           <p:nvPr/>
         </p:nvPicPr>
         <p:blipFill rotWithShape="1">
-          <a:blip r:embed="rId3"/>
+          <a:blip r:embed="rId2"/>
           <a:srcRect t="9209" r="2" b="4809"/>
           <a:stretch/>
         </p:blipFill>
         <p:spPr>
           <a:xfrm>
-            <a:off x="6478261" y="618985"/>
-            <a:ext cx="4497987" cy="3435892"/>
+            <a:off x="873473" y="780711"/>
+            <a:ext cx="2837481" cy="2167476"/>
           </a:xfrm>
           <a:prstGeom prst="rect">
             <a:avLst/>
           </a:prstGeom>
         </p:spPr>
       </p:pic>
-      <p:sp useBgFill="1">
-        <p:nvSpPr>
-          <p:cNvPr id="41" name="Rectangle 40">
+      <p:sp>
+        <p:nvSpPr>
+          <p:cNvPr id="64" name="Rectangle 59">
             <a:extLst>
               <a:ext uri="{FF2B5EF4-FFF2-40B4-BE49-F238E27FC236}">
-                <a16:creationId xmlns:a16="http://schemas.microsoft.com/office/drawing/2014/main" id="{36B822CC-7DA9-4417-AA94-64CEB676F0B8}"/>
+                <a16:creationId xmlns:a16="http://schemas.microsoft.com/office/drawing/2014/main" id="{6464F78D-891F-49EC-ADDE-5E581A66ACA9}"/>
               </a:ext>
               <a:ext uri="{C183D7F6-B498-43B3-948B-1728B52AA6E4}">
                 <adec:decorative xmlns:adec="http://schemas.microsoft.com/office/drawing/2017/decorative" val="1"/>
@@ -6146,38 +7347,108 @@
         </p:nvSpPr>
         <p:spPr>
           <a:xfrm>
-            <a:off x="447234" y="4219240"/>
-            <a:ext cx="11301984" cy="94997"/>
+            <a:off x="4240312" y="654222"/>
+            <a:ext cx="3702878" cy="2437844"/>
           </a:xfrm>
           <a:prstGeom prst="rect">
             <a:avLst/>
           </a:prstGeom>
-          <a:ln>
-            <a:noFill/>
+          <a:noFill/>
+          <a:ln w="19050">
+            <a:solidFill>
+              <a:schemeClr val="accent4"/>
+            </a:solidFill>
           </a:ln>
-          <a:effectLst/>
         </p:spPr>
         <p:style>
-          <a:lnRef idx="1">
-            <a:schemeClr val="accent1"/>
+          <a:lnRef idx="2">
+            <a:schemeClr val="accent1">
+              <a:shade val="50000"/>
+            </a:schemeClr>
           </a:lnRef>
-          <a:fillRef idx="3">
+          <a:fillRef idx="1">
             <a:schemeClr val="accent1"/>
           </a:fillRef>
-          <a:effectRef idx="2">
+          <a:effectRef idx="0">
             <a:schemeClr val="accent1"/>
           </a:effectRef>
           <a:fontRef idx="minor">
             <a:schemeClr val="lt1"/>
           </a:fontRef>
         </p:style>
-      </p:sp>
-      <p:sp useBgFill="1">
-        <p:nvSpPr>
-          <p:cNvPr id="43" name="Rectangle 42">
+        <p:txBody>
+          <a:bodyPr rtlCol="0" anchor="ctr"/>
+          <a:lstStyle/>
+          <a:p>
+            <a:pPr algn="ctr"/>
+            <a:endParaRPr lang="en-US"/>
+          </a:p>
+        </p:txBody>
+      </p:sp>
+      <p:pic>
+        <p:nvPicPr>
+          <p:cNvPr id="28" name="Picture 27" descr="A screenshot of a cell phone&#10;&#10;Description automatically generated">
             <a:extLst>
               <a:ext uri="{FF2B5EF4-FFF2-40B4-BE49-F238E27FC236}">
-                <a16:creationId xmlns:a16="http://schemas.microsoft.com/office/drawing/2014/main" id="{AFA01E88-71CC-4FF3-9E81-51E0C32B45E4}"/>
+                <a16:creationId xmlns:a16="http://schemas.microsoft.com/office/drawing/2014/main" id="{5218AD00-53C0-3843-9C3A-7F1857EDAE0B}"/>
+              </a:ext>
+            </a:extLst>
+          </p:cNvPr>
+          <p:cNvPicPr>
+            <a:picLocks noChangeAspect="1"/>
+          </p:cNvPicPr>
+          <p:nvPr/>
+        </p:nvPicPr>
+        <p:blipFill>
+          <a:blip r:embed="rId3"/>
+          <a:stretch>
+            <a:fillRect/>
+          </a:stretch>
+        </p:blipFill>
+        <p:spPr>
+          <a:xfrm>
+            <a:off x="4391187" y="797468"/>
+            <a:ext cx="3392496" cy="2130552"/>
+          </a:xfrm>
+          <a:prstGeom prst="rect">
+            <a:avLst/>
+          </a:prstGeom>
+        </p:spPr>
+      </p:pic>
+      <p:pic>
+        <p:nvPicPr>
+          <p:cNvPr id="23" name="Picture 22" descr="A screenshot of a cell phone&#10;&#10;Description automatically generated">
+            <a:extLst>
+              <a:ext uri="{FF2B5EF4-FFF2-40B4-BE49-F238E27FC236}">
+                <a16:creationId xmlns:a16="http://schemas.microsoft.com/office/drawing/2014/main" id="{73F9B532-B43B-3F45-BE06-979F7F3A8811}"/>
+              </a:ext>
+            </a:extLst>
+          </p:cNvPr>
+          <p:cNvPicPr>
+            <a:picLocks noChangeAspect="1"/>
+          </p:cNvPicPr>
+          <p:nvPr/>
+        </p:nvPicPr>
+        <p:blipFill>
+          <a:blip r:embed="rId4"/>
+          <a:stretch/>
+        </p:blipFill>
+        <p:spPr>
+          <a:xfrm>
+            <a:off x="8188827" y="805372"/>
+            <a:ext cx="3400442" cy="2135543"/>
+          </a:xfrm>
+          <a:prstGeom prst="rect">
+            <a:avLst/>
+          </a:prstGeom>
+        </p:spPr>
+      </p:pic>
+      <p:sp>
+        <p:nvSpPr>
+          <p:cNvPr id="65" name="Rectangle 61">
+            <a:extLst>
+              <a:ext uri="{FF2B5EF4-FFF2-40B4-BE49-F238E27FC236}">
+                <a16:creationId xmlns:a16="http://schemas.microsoft.com/office/drawing/2014/main" id="{E125488F-35F4-46B0-BDF0-AFAA3610078B}"/>
               </a:ext>
               <a:ext uri="{C183D7F6-B498-43B3-948B-1728B52AA6E4}">
                 <adec:decorative xmlns:adec="http://schemas.microsoft.com/office/drawing/2017/decorative" val="1"/>
@@ -6197,89 +7468,41 @@
         </p:nvSpPr>
         <p:spPr>
           <a:xfrm>
-            <a:off x="447234" y="4359623"/>
-            <a:ext cx="11303626" cy="2051143"/>
+            <a:off x="8036239" y="654222"/>
+            <a:ext cx="3702878" cy="2437844"/>
           </a:xfrm>
           <a:prstGeom prst="rect">
             <a:avLst/>
           </a:prstGeom>
-          <a:ln w="6350" cmpd="sng">
-            <a:noFill/>
+          <a:noFill/>
+          <a:ln w="19050">
+            <a:solidFill>
+              <a:schemeClr val="accent4"/>
+            </a:solidFill>
           </a:ln>
-          <a:effectLst/>
         </p:spPr>
         <p:style>
-          <a:lnRef idx="1">
-            <a:schemeClr val="accent1"/>
+          <a:lnRef idx="2">
+            <a:schemeClr val="accent1">
+              <a:shade val="50000"/>
+            </a:schemeClr>
           </a:lnRef>
-          <a:fillRef idx="3">
+          <a:fillRef idx="1">
             <a:schemeClr val="accent1"/>
           </a:fillRef>
-          <a:effectRef idx="2">
+          <a:effectRef idx="0">
             <a:schemeClr val="accent1"/>
           </a:effectRef>
           <a:fontRef idx="minor">
             <a:schemeClr val="lt1"/>
           </a:fontRef>
         </p:style>
-      </p:sp>
-      <p:sp>
-        <p:nvSpPr>
-          <p:cNvPr id="2" name="Title 1">
-            <a:extLst>
-              <a:ext uri="{FF2B5EF4-FFF2-40B4-BE49-F238E27FC236}">
-                <a16:creationId xmlns:a16="http://schemas.microsoft.com/office/drawing/2014/main" id="{331C21C6-7084-FE4F-8FC4-AD73E7446C3F}"/>
-              </a:ext>
-            </a:extLst>
-          </p:cNvPr>
-          <p:cNvSpPr>
-            <a:spLocks noGrp="1"/>
-          </p:cNvSpPr>
-          <p:nvPr>
-            <p:ph type="title"/>
-          </p:nvPr>
-        </p:nvSpPr>
-        <p:spPr>
-          <a:xfrm>
-            <a:off x="679600" y="4518020"/>
-            <a:ext cx="3353432" cy="1685985"/>
-          </a:xfrm>
-        </p:spPr>
-        <p:txBody>
-          <a:bodyPr anchor="ctr">
-            <a:normAutofit/>
-          </a:bodyPr>
+        <p:txBody>
+          <a:bodyPr rtlCol="0" anchor="ctr"/>
           <a:lstStyle/>
           <a:p>
-            <a:pPr>
-              <a:lnSpc>
-                <a:spcPct val="90000"/>
-              </a:lnSpc>
-            </a:pPr>
-            <a:r>
-              <a:rPr lang="en-US" sz="1600" dirty="0">
-                <a:solidFill>
-                  <a:schemeClr val="tx2"/>
-                </a:solidFill>
-              </a:rPr>
-              <a:t>When we look only at the non-smokers, WE SEE WOMEN’S CHARGES ARE 13% </a:t>
-            </a:r>
-            <a:r>
-              <a:rPr lang="en-US" sz="1600" dirty="0" err="1">
-                <a:solidFill>
-                  <a:schemeClr val="tx2"/>
-                </a:solidFill>
-              </a:rPr>
-              <a:t>HIGHERregardless</a:t>
-            </a:r>
-            <a:r>
-              <a:rPr lang="en-US" sz="1600" dirty="0">
-                <a:solidFill>
-                  <a:schemeClr val="tx2"/>
-                </a:solidFill>
-              </a:rPr>
-              <a:t> of region</a:t>
-            </a:r>
+            <a:pPr algn="ctr"/>
+            <a:endParaRPr lang="en-US"/>
           </a:p>
         </p:txBody>
       </p:sp>
@@ -6301,8 +7524,8 @@
         </p:nvSpPr>
         <p:spPr>
           <a:xfrm>
-            <a:off x="4271491" y="4596992"/>
-            <a:ext cx="7240909" cy="1607012"/>
+            <a:off x="4590077" y="3608649"/>
+            <a:ext cx="6864154" cy="2800477"/>
           </a:xfrm>
         </p:spPr>
         <p:txBody>
@@ -6352,24 +7575,36 @@
         </p:nvSpPr>
         <p:spPr>
           <a:xfrm>
-            <a:off x="1189866" y="111934"/>
-            <a:ext cx="9047748" cy="461665"/>
+            <a:off x="873473" y="2731440"/>
+            <a:ext cx="2837481" cy="216747"/>
           </a:xfrm>
           <a:prstGeom prst="rect">
             <a:avLst/>
           </a:prstGeom>
-          <a:noFill/>
+          <a:solidFill>
+            <a:srgbClr val="000000">
+              <a:alpha val="50000"/>
+            </a:srgbClr>
+          </a:solidFill>
+          <a:ln>
+            <a:noFill/>
+          </a:ln>
         </p:spPr>
         <p:txBody>
           <a:bodyPr wrap="square" rtlCol="0">
-            <a:spAutoFit/>
+            <a:noAutofit/>
           </a:bodyPr>
           <a:lstStyle/>
           <a:p>
-            <a:r>
-              <a:rPr lang="en-US" sz="2400" dirty="0">
+            <a:pPr algn="ctr">
+              <a:spcAft>
+                <a:spcPts val="600"/>
+              </a:spcAft>
+            </a:pPr>
+            <a:r>
+              <a:rPr lang="en-US" sz="800">
                 <a:solidFill>
-                  <a:schemeClr val="accent1"/>
+                  <a:srgbClr val="FFFFFF"/>
                 </a:solidFill>
               </a:rPr>
               <a:t>ARE REGION AND GENDER SIGNIFICANTLY RELATED TO COSTS?</a:t>
@@ -6385,7 +7620,7 @@
     </p:extLst>
   </p:cSld>
   <p:clrMapOvr>
-    <a:overrideClrMapping bg1="dk1" tx1="lt1" bg2="dk2" tx2="lt2" accent1="accent1" accent2="accent2" accent3="accent3" accent4="accent4" accent5="accent5" accent6="accent6" hlink="hlink" folHlink="folHlink"/>
+    <a:masterClrMapping/>
   </p:clrMapOvr>
 </p:sld>
 </file>
@@ -6757,4 +7992,594 @@
     </a:ext>
   </a:extLst>
 </a:theme>
+</file>
+
+<file path=ppt/theme/theme2.xml><?xml version="1.0" encoding="utf-8"?>
+<a:theme xmlns:a="http://schemas.openxmlformats.org/drawingml/2006/main" name="Office Theme">
+  <a:themeElements>
+    <a:clrScheme name="Office">
+      <a:dk1>
+        <a:sysClr val="windowText" lastClr="000000"/>
+      </a:dk1>
+      <a:lt1>
+        <a:sysClr val="window" lastClr="FFFFFF"/>
+      </a:lt1>
+      <a:dk2>
+        <a:srgbClr val="44546A"/>
+      </a:dk2>
+      <a:lt2>
+        <a:srgbClr val="E7E6E6"/>
+      </a:lt2>
+      <a:accent1>
+        <a:srgbClr val="4472C4"/>
+      </a:accent1>
+      <a:accent2>
+        <a:srgbClr val="ED7D31"/>
+      </a:accent2>
+      <a:accent3>
+        <a:srgbClr val="A5A5A5"/>
+      </a:accent3>
+      <a:accent4>
+        <a:srgbClr val="FFC000"/>
+      </a:accent4>
+      <a:accent5>
+        <a:srgbClr val="5B9BD5"/>
+      </a:accent5>
+      <a:accent6>
+        <a:srgbClr val="70AD47"/>
+      </a:accent6>
+      <a:hlink>
+        <a:srgbClr val="0563C1"/>
+      </a:hlink>
+      <a:folHlink>
+        <a:srgbClr val="954F72"/>
+      </a:folHlink>
+    </a:clrScheme>
+    <a:fontScheme name="Office">
+      <a:majorFont>
+        <a:latin typeface="Calibri Light" panose="020F0302020204030204"/>
+        <a:ea typeface=""/>
+        <a:cs typeface=""/>
+        <a:font script="Jpan" typeface="游ゴシック Light"/>
+        <a:font script="Hang" typeface="맑은 고딕"/>
+        <a:font script="Hans" typeface="等线 Light"/>
+        <a:font script="Hant" typeface="新細明體"/>
+        <a:font script="Arab" typeface="Times New Roman"/>
+        <a:font script="Hebr" typeface="Times New Roman"/>
+        <a:font script="Thai" typeface="Angsana New"/>
+        <a:font script="Ethi" typeface="Nyala"/>
+        <a:font script="Beng" typeface="Vrinda"/>
+        <a:font script="Gujr" typeface="Shruti"/>
+        <a:font script="Khmr" typeface="MoolBoran"/>
+        <a:font script="Knda" typeface="Tunga"/>
+        <a:font script="Guru" typeface="Raavi"/>
+        <a:font script="Cans" typeface="Euphemia"/>
+        <a:font script="Cher" typeface="Plantagenet Cherokee"/>
+        <a:font script="Yiii" typeface="Microsoft Yi Baiti"/>
+        <a:font script="Tibt" typeface="Microsoft Himalaya"/>
+        <a:font script="Thaa" typeface="MV Boli"/>
+        <a:font script="Deva" typeface="Mangal"/>
+        <a:font script="Telu" typeface="Gautami"/>
+        <a:font script="Taml" typeface="Latha"/>
+        <a:font script="Syrc" typeface="Estrangelo Edessa"/>
+        <a:font script="Orya" typeface="Kalinga"/>
+        <a:font script="Mlym" typeface="Kartika"/>
+        <a:font script="Laoo" typeface="DokChampa"/>
+        <a:font script="Sinh" typeface="Iskoola Pota"/>
+        <a:font script="Mong" typeface="Mongolian Baiti"/>
+        <a:font script="Viet" typeface="Times New Roman"/>
+        <a:font script="Uigh" typeface="Microsoft Uighur"/>
+        <a:font script="Geor" typeface="Sylfaen"/>
+        <a:font script="Armn" typeface="Arial"/>
+        <a:font script="Bugi" typeface="Leelawadee UI"/>
+        <a:font script="Bopo" typeface="Microsoft JhengHei"/>
+        <a:font script="Java" typeface="Javanese Text"/>
+        <a:font script="Lisu" typeface="Segoe UI"/>
+        <a:font script="Mymr" typeface="Myanmar Text"/>
+        <a:font script="Nkoo" typeface="Ebrima"/>
+        <a:font script="Olck" typeface="Nirmala UI"/>
+        <a:font script="Osma" typeface="Ebrima"/>
+        <a:font script="Phag" typeface="Phagspa"/>
+        <a:font script="Syrn" typeface="Estrangelo Edessa"/>
+        <a:font script="Syrj" typeface="Estrangelo Edessa"/>
+        <a:font script="Syre" typeface="Estrangelo Edessa"/>
+        <a:font script="Sora" typeface="Nirmala UI"/>
+        <a:font script="Tale" typeface="Microsoft Tai Le"/>
+        <a:font script="Talu" typeface="Microsoft New Tai Lue"/>
+        <a:font script="Tfng" typeface="Ebrima"/>
+      </a:majorFont>
+      <a:minorFont>
+        <a:latin typeface="Calibri" panose="020F0502020204030204"/>
+        <a:ea typeface=""/>
+        <a:cs typeface=""/>
+        <a:font script="Jpan" typeface="游ゴシック"/>
+        <a:font script="Hang" typeface="맑은 고딕"/>
+        <a:font script="Hans" typeface="等线"/>
+        <a:font script="Hant" typeface="新細明體"/>
+        <a:font script="Arab" typeface="Arial"/>
+        <a:font script="Hebr" typeface="Arial"/>
+        <a:font script="Thai" typeface="Cordia New"/>
+        <a:font script="Ethi" typeface="Nyala"/>
+        <a:font script="Beng" typeface="Vrinda"/>
+        <a:font script="Gujr" typeface="Shruti"/>
+        <a:font script="Khmr" typeface="DaunPenh"/>
+        <a:font script="Knda" typeface="Tunga"/>
+        <a:font script="Guru" typeface="Raavi"/>
+        <a:font script="Cans" typeface="Euphemia"/>
+        <a:font script="Cher" typeface="Plantagenet Cherokee"/>
+        <a:font script="Yiii" typeface="Microsoft Yi Baiti"/>
+        <a:font script="Tibt" typeface="Microsoft Himalaya"/>
+        <a:font script="Thaa" typeface="MV Boli"/>
+        <a:font script="Deva" typeface="Mangal"/>
+        <a:font script="Telu" typeface="Gautami"/>
+        <a:font script="Taml" typeface="Latha"/>
+        <a:font script="Syrc" typeface="Estrangelo Edessa"/>
+        <a:font script="Orya" typeface="Kalinga"/>
+        <a:font script="Mlym" typeface="Kartika"/>
+        <a:font script="Laoo" typeface="DokChampa"/>
+        <a:font script="Sinh" typeface="Iskoola Pota"/>
+        <a:font script="Mong" typeface="Mongolian Baiti"/>
+        <a:font script="Viet" typeface="Arial"/>
+        <a:font script="Uigh" typeface="Microsoft Uighur"/>
+        <a:font script="Geor" typeface="Sylfaen"/>
+        <a:font script="Armn" typeface="Arial"/>
+        <a:font script="Bugi" typeface="Leelawadee UI"/>
+        <a:font script="Bopo" typeface="Microsoft JhengHei"/>
+        <a:font script="Java" typeface="Javanese Text"/>
+        <a:font script="Lisu" typeface="Segoe UI"/>
+        <a:font script="Mymr" typeface="Myanmar Text"/>
+        <a:font script="Nkoo" typeface="Ebrima"/>
+        <a:font script="Olck" typeface="Nirmala UI"/>
+        <a:font script="Osma" typeface="Ebrima"/>
+        <a:font script="Phag" typeface="Phagspa"/>
+        <a:font script="Syrn" typeface="Estrangelo Edessa"/>
+        <a:font script="Syrj" typeface="Estrangelo Edessa"/>
+        <a:font script="Syre" typeface="Estrangelo Edessa"/>
+        <a:font script="Sora" typeface="Nirmala UI"/>
+        <a:font script="Tale" typeface="Microsoft Tai Le"/>
+        <a:font script="Talu" typeface="Microsoft New Tai Lue"/>
+        <a:font script="Tfng" typeface="Ebrima"/>
+      </a:minorFont>
+    </a:fontScheme>
+    <a:fmtScheme name="Office">
+      <a:fillStyleLst>
+        <a:solidFill>
+          <a:schemeClr val="phClr"/>
+        </a:solidFill>
+        <a:gradFill rotWithShape="1">
+          <a:gsLst>
+            <a:gs pos="0">
+              <a:schemeClr val="phClr">
+                <a:lumMod val="110000"/>
+                <a:satMod val="105000"/>
+                <a:tint val="67000"/>
+              </a:schemeClr>
+            </a:gs>
+            <a:gs pos="50000">
+              <a:schemeClr val="phClr">
+                <a:lumMod val="105000"/>
+                <a:satMod val="103000"/>
+                <a:tint val="73000"/>
+              </a:schemeClr>
+            </a:gs>
+            <a:gs pos="100000">
+              <a:schemeClr val="phClr">
+                <a:lumMod val="105000"/>
+                <a:satMod val="109000"/>
+                <a:tint val="81000"/>
+              </a:schemeClr>
+            </a:gs>
+          </a:gsLst>
+          <a:lin ang="5400000" scaled="0"/>
+        </a:gradFill>
+        <a:gradFill rotWithShape="1">
+          <a:gsLst>
+            <a:gs pos="0">
+              <a:schemeClr val="phClr">
+                <a:satMod val="103000"/>
+                <a:lumMod val="102000"/>
+                <a:tint val="94000"/>
+              </a:schemeClr>
+            </a:gs>
+            <a:gs pos="50000">
+              <a:schemeClr val="phClr">
+                <a:satMod val="110000"/>
+                <a:lumMod val="100000"/>
+                <a:shade val="100000"/>
+              </a:schemeClr>
+            </a:gs>
+            <a:gs pos="100000">
+              <a:schemeClr val="phClr">
+                <a:lumMod val="99000"/>
+                <a:satMod val="120000"/>
+                <a:shade val="78000"/>
+              </a:schemeClr>
+            </a:gs>
+          </a:gsLst>
+          <a:lin ang="5400000" scaled="0"/>
+        </a:gradFill>
+      </a:fillStyleLst>
+      <a:lnStyleLst>
+        <a:ln w="6350" cap="flat" cmpd="sng" algn="ctr">
+          <a:solidFill>
+            <a:schemeClr val="phClr"/>
+          </a:solidFill>
+          <a:prstDash val="solid"/>
+          <a:miter lim="800000"/>
+        </a:ln>
+        <a:ln w="12700" cap="flat" cmpd="sng" algn="ctr">
+          <a:solidFill>
+            <a:schemeClr val="phClr"/>
+          </a:solidFill>
+          <a:prstDash val="solid"/>
+          <a:miter lim="800000"/>
+        </a:ln>
+        <a:ln w="19050" cap="flat" cmpd="sng" algn="ctr">
+          <a:solidFill>
+            <a:schemeClr val="phClr"/>
+          </a:solidFill>
+          <a:prstDash val="solid"/>
+          <a:miter lim="800000"/>
+        </a:ln>
+      </a:lnStyleLst>
+      <a:effectStyleLst>
+        <a:effectStyle>
+          <a:effectLst/>
+        </a:effectStyle>
+        <a:effectStyle>
+          <a:effectLst/>
+        </a:effectStyle>
+        <a:effectStyle>
+          <a:effectLst>
+            <a:outerShdw blurRad="57150" dist="19050" dir="5400000" algn="ctr" rotWithShape="0">
+              <a:srgbClr val="000000">
+                <a:alpha val="63000"/>
+              </a:srgbClr>
+            </a:outerShdw>
+          </a:effectLst>
+        </a:effectStyle>
+      </a:effectStyleLst>
+      <a:bgFillStyleLst>
+        <a:solidFill>
+          <a:schemeClr val="phClr"/>
+        </a:solidFill>
+        <a:solidFill>
+          <a:schemeClr val="phClr">
+            <a:tint val="95000"/>
+            <a:satMod val="170000"/>
+          </a:schemeClr>
+        </a:solidFill>
+        <a:gradFill rotWithShape="1">
+          <a:gsLst>
+            <a:gs pos="0">
+              <a:schemeClr val="phClr">
+                <a:tint val="93000"/>
+                <a:satMod val="150000"/>
+                <a:shade val="98000"/>
+                <a:lumMod val="102000"/>
+              </a:schemeClr>
+            </a:gs>
+            <a:gs pos="50000">
+              <a:schemeClr val="phClr">
+                <a:tint val="98000"/>
+                <a:satMod val="130000"/>
+                <a:shade val="90000"/>
+                <a:lumMod val="103000"/>
+              </a:schemeClr>
+            </a:gs>
+            <a:gs pos="100000">
+              <a:schemeClr val="phClr">
+                <a:shade val="63000"/>
+                <a:satMod val="120000"/>
+              </a:schemeClr>
+            </a:gs>
+          </a:gsLst>
+          <a:lin ang="5400000" scaled="0"/>
+        </a:gradFill>
+      </a:bgFillStyleLst>
+    </a:fmtScheme>
+  </a:themeElements>
+  <a:objectDefaults/>
+  <a:extraClrSchemeLst/>
+  <a:extLst>
+    <a:ext uri="{05A4C25C-085E-4340-85A3-A5531E510DB2}">
+      <thm15:themeFamily xmlns:thm15="http://schemas.microsoft.com/office/thememl/2012/main" name="Office Theme" id="{62F939B6-93AF-4DB8-9C6B-D6C7DFDC589F}" vid="{4A3C46E8-61CC-4603-A589-7422A47A8E4A}"/>
+    </a:ext>
+  </a:extLst>
+</a:theme>
+</file>
+
+<file path=ppt/theme/theme3.xml><?xml version="1.0" encoding="utf-8"?>
+<a:theme xmlns:a="http://schemas.openxmlformats.org/drawingml/2006/main" name="Office Theme">
+  <a:themeElements>
+    <a:clrScheme name="Office">
+      <a:dk1>
+        <a:sysClr val="windowText" lastClr="000000"/>
+      </a:dk1>
+      <a:lt1>
+        <a:sysClr val="window" lastClr="FFFFFF"/>
+      </a:lt1>
+      <a:dk2>
+        <a:srgbClr val="44546A"/>
+      </a:dk2>
+      <a:lt2>
+        <a:srgbClr val="E7E6E6"/>
+      </a:lt2>
+      <a:accent1>
+        <a:srgbClr val="4472C4"/>
+      </a:accent1>
+      <a:accent2>
+        <a:srgbClr val="ED7D31"/>
+      </a:accent2>
+      <a:accent3>
+        <a:srgbClr val="A5A5A5"/>
+      </a:accent3>
+      <a:accent4>
+        <a:srgbClr val="FFC000"/>
+      </a:accent4>
+      <a:accent5>
+        <a:srgbClr val="5B9BD5"/>
+      </a:accent5>
+      <a:accent6>
+        <a:srgbClr val="70AD47"/>
+      </a:accent6>
+      <a:hlink>
+        <a:srgbClr val="0563C1"/>
+      </a:hlink>
+      <a:folHlink>
+        <a:srgbClr val="954F72"/>
+      </a:folHlink>
+    </a:clrScheme>
+    <a:fontScheme name="Office">
+      <a:majorFont>
+        <a:latin typeface="Calibri Light" panose="020F0302020204030204"/>
+        <a:ea typeface=""/>
+        <a:cs typeface=""/>
+        <a:font script="Jpan" typeface="游ゴシック Light"/>
+        <a:font script="Hang" typeface="맑은 고딕"/>
+        <a:font script="Hans" typeface="等线 Light"/>
+        <a:font script="Hant" typeface="新細明體"/>
+        <a:font script="Arab" typeface="Times New Roman"/>
+        <a:font script="Hebr" typeface="Times New Roman"/>
+        <a:font script="Thai" typeface="Angsana New"/>
+        <a:font script="Ethi" typeface="Nyala"/>
+        <a:font script="Beng" typeface="Vrinda"/>
+        <a:font script="Gujr" typeface="Shruti"/>
+        <a:font script="Khmr" typeface="MoolBoran"/>
+        <a:font script="Knda" typeface="Tunga"/>
+        <a:font script="Guru" typeface="Raavi"/>
+        <a:font script="Cans" typeface="Euphemia"/>
+        <a:font script="Cher" typeface="Plantagenet Cherokee"/>
+        <a:font script="Yiii" typeface="Microsoft Yi Baiti"/>
+        <a:font script="Tibt" typeface="Microsoft Himalaya"/>
+        <a:font script="Thaa" typeface="MV Boli"/>
+        <a:font script="Deva" typeface="Mangal"/>
+        <a:font script="Telu" typeface="Gautami"/>
+        <a:font script="Taml" typeface="Latha"/>
+        <a:font script="Syrc" typeface="Estrangelo Edessa"/>
+        <a:font script="Orya" typeface="Kalinga"/>
+        <a:font script="Mlym" typeface="Kartika"/>
+        <a:font script="Laoo" typeface="DokChampa"/>
+        <a:font script="Sinh" typeface="Iskoola Pota"/>
+        <a:font script="Mong" typeface="Mongolian Baiti"/>
+        <a:font script="Viet" typeface="Times New Roman"/>
+        <a:font script="Uigh" typeface="Microsoft Uighur"/>
+        <a:font script="Geor" typeface="Sylfaen"/>
+        <a:font script="Armn" typeface="Arial"/>
+        <a:font script="Bugi" typeface="Leelawadee UI"/>
+        <a:font script="Bopo" typeface="Microsoft JhengHei"/>
+        <a:font script="Java" typeface="Javanese Text"/>
+        <a:font script="Lisu" typeface="Segoe UI"/>
+        <a:font script="Mymr" typeface="Myanmar Text"/>
+        <a:font script="Nkoo" typeface="Ebrima"/>
+        <a:font script="Olck" typeface="Nirmala UI"/>
+        <a:font script="Osma" typeface="Ebrima"/>
+        <a:font script="Phag" typeface="Phagspa"/>
+        <a:font script="Syrn" typeface="Estrangelo Edessa"/>
+        <a:font script="Syrj" typeface="Estrangelo Edessa"/>
+        <a:font script="Syre" typeface="Estrangelo Edessa"/>
+        <a:font script="Sora" typeface="Nirmala UI"/>
+        <a:font script="Tale" typeface="Microsoft Tai Le"/>
+        <a:font script="Talu" typeface="Microsoft New Tai Lue"/>
+        <a:font script="Tfng" typeface="Ebrima"/>
+      </a:majorFont>
+      <a:minorFont>
+        <a:latin typeface="Calibri" panose="020F0502020204030204"/>
+        <a:ea typeface=""/>
+        <a:cs typeface=""/>
+        <a:font script="Jpan" typeface="游ゴシック"/>
+        <a:font script="Hang" typeface="맑은 고딕"/>
+        <a:font script="Hans" typeface="等线"/>
+        <a:font script="Hant" typeface="新細明體"/>
+        <a:font script="Arab" typeface="Arial"/>
+        <a:font script="Hebr" typeface="Arial"/>
+        <a:font script="Thai" typeface="Cordia New"/>
+        <a:font script="Ethi" typeface="Nyala"/>
+        <a:font script="Beng" typeface="Vrinda"/>
+        <a:font script="Gujr" typeface="Shruti"/>
+        <a:font script="Khmr" typeface="DaunPenh"/>
+        <a:font script="Knda" typeface="Tunga"/>
+        <a:font script="Guru" typeface="Raavi"/>
+        <a:font script="Cans" typeface="Euphemia"/>
+        <a:font script="Cher" typeface="Plantagenet Cherokee"/>
+        <a:font script="Yiii" typeface="Microsoft Yi Baiti"/>
+        <a:font script="Tibt" typeface="Microsoft Himalaya"/>
+        <a:font script="Thaa" typeface="MV Boli"/>
+        <a:font script="Deva" typeface="Mangal"/>
+        <a:font script="Telu" typeface="Gautami"/>
+        <a:font script="Taml" typeface="Latha"/>
+        <a:font script="Syrc" typeface="Estrangelo Edessa"/>
+        <a:font script="Orya" typeface="Kalinga"/>
+        <a:font script="Mlym" typeface="Kartika"/>
+        <a:font script="Laoo" typeface="DokChampa"/>
+        <a:font script="Sinh" typeface="Iskoola Pota"/>
+        <a:font script="Mong" typeface="Mongolian Baiti"/>
+        <a:font script="Viet" typeface="Arial"/>
+        <a:font script="Uigh" typeface="Microsoft Uighur"/>
+        <a:font script="Geor" typeface="Sylfaen"/>
+        <a:font script="Armn" typeface="Arial"/>
+        <a:font script="Bugi" typeface="Leelawadee UI"/>
+        <a:font script="Bopo" typeface="Microsoft JhengHei"/>
+        <a:font script="Java" typeface="Javanese Text"/>
+        <a:font script="Lisu" typeface="Segoe UI"/>
+        <a:font script="Mymr" typeface="Myanmar Text"/>
+        <a:font script="Nkoo" typeface="Ebrima"/>
+        <a:font script="Olck" typeface="Nirmala UI"/>
+        <a:font script="Osma" typeface="Ebrima"/>
+        <a:font script="Phag" typeface="Phagspa"/>
+        <a:font script="Syrn" typeface="Estrangelo Edessa"/>
+        <a:font script="Syrj" typeface="Estrangelo Edessa"/>
+        <a:font script="Syre" typeface="Estrangelo Edessa"/>
+        <a:font script="Sora" typeface="Nirmala UI"/>
+        <a:font script="Tale" typeface="Microsoft Tai Le"/>
+        <a:font script="Talu" typeface="Microsoft New Tai Lue"/>
+        <a:font script="Tfng" typeface="Ebrima"/>
+      </a:minorFont>
+    </a:fontScheme>
+    <a:fmtScheme name="Office">
+      <a:fillStyleLst>
+        <a:solidFill>
+          <a:schemeClr val="phClr"/>
+        </a:solidFill>
+        <a:gradFill rotWithShape="1">
+          <a:gsLst>
+            <a:gs pos="0">
+              <a:schemeClr val="phClr">
+                <a:lumMod val="110000"/>
+                <a:satMod val="105000"/>
+                <a:tint val="67000"/>
+              </a:schemeClr>
+            </a:gs>
+            <a:gs pos="50000">
+              <a:schemeClr val="phClr">
+                <a:lumMod val="105000"/>
+                <a:satMod val="103000"/>
+                <a:tint val="73000"/>
+              </a:schemeClr>
+            </a:gs>
+            <a:gs pos="100000">
+              <a:schemeClr val="phClr">
+                <a:lumMod val="105000"/>
+                <a:satMod val="109000"/>
+                <a:tint val="81000"/>
+              </a:schemeClr>
+            </a:gs>
+          </a:gsLst>
+          <a:lin ang="5400000" scaled="0"/>
+        </a:gradFill>
+        <a:gradFill rotWithShape="1">
+          <a:gsLst>
+            <a:gs pos="0">
+              <a:schemeClr val="phClr">
+                <a:satMod val="103000"/>
+                <a:lumMod val="102000"/>
+                <a:tint val="94000"/>
+              </a:schemeClr>
+            </a:gs>
+            <a:gs pos="50000">
+              <a:schemeClr val="phClr">
+                <a:satMod val="110000"/>
+                <a:lumMod val="100000"/>
+                <a:shade val="100000"/>
+              </a:schemeClr>
+            </a:gs>
+            <a:gs pos="100000">
+              <a:schemeClr val="phClr">
+                <a:lumMod val="99000"/>
+                <a:satMod val="120000"/>
+                <a:shade val="78000"/>
+              </a:schemeClr>
+            </a:gs>
+          </a:gsLst>
+          <a:lin ang="5400000" scaled="0"/>
+        </a:gradFill>
+      </a:fillStyleLst>
+      <a:lnStyleLst>
+        <a:ln w="6350" cap="flat" cmpd="sng" algn="ctr">
+          <a:solidFill>
+            <a:schemeClr val="phClr"/>
+          </a:solidFill>
+          <a:prstDash val="solid"/>
+          <a:miter lim="800000"/>
+        </a:ln>
+        <a:ln w="12700" cap="flat" cmpd="sng" algn="ctr">
+          <a:solidFill>
+            <a:schemeClr val="phClr"/>
+          </a:solidFill>
+          <a:prstDash val="solid"/>
+          <a:miter lim="800000"/>
+        </a:ln>
+        <a:ln w="19050" cap="flat" cmpd="sng" algn="ctr">
+          <a:solidFill>
+            <a:schemeClr val="phClr"/>
+          </a:solidFill>
+          <a:prstDash val="solid"/>
+          <a:miter lim="800000"/>
+        </a:ln>
+      </a:lnStyleLst>
+      <a:effectStyleLst>
+        <a:effectStyle>
+          <a:effectLst/>
+        </a:effectStyle>
+        <a:effectStyle>
+          <a:effectLst/>
+        </a:effectStyle>
+        <a:effectStyle>
+          <a:effectLst>
+            <a:outerShdw blurRad="57150" dist="19050" dir="5400000" algn="ctr" rotWithShape="0">
+              <a:srgbClr val="000000">
+                <a:alpha val="63000"/>
+              </a:srgbClr>
+            </a:outerShdw>
+          </a:effectLst>
+        </a:effectStyle>
+      </a:effectStyleLst>
+      <a:bgFillStyleLst>
+        <a:solidFill>
+          <a:schemeClr val="phClr"/>
+        </a:solidFill>
+        <a:solidFill>
+          <a:schemeClr val="phClr">
+            <a:tint val="95000"/>
+            <a:satMod val="170000"/>
+          </a:schemeClr>
+        </a:solidFill>
+        <a:gradFill rotWithShape="1">
+          <a:gsLst>
+            <a:gs pos="0">
+              <a:schemeClr val="phClr">
+                <a:tint val="93000"/>
+                <a:satMod val="150000"/>
+                <a:shade val="98000"/>
+                <a:lumMod val="102000"/>
+              </a:schemeClr>
+            </a:gs>
+            <a:gs pos="50000">
+              <a:schemeClr val="phClr">
+                <a:tint val="98000"/>
+                <a:satMod val="130000"/>
+                <a:shade val="90000"/>
+                <a:lumMod val="103000"/>
+              </a:schemeClr>
+            </a:gs>
+            <a:gs pos="100000">
+              <a:schemeClr val="phClr">
+                <a:shade val="63000"/>
+                <a:satMod val="120000"/>
+              </a:schemeClr>
+            </a:gs>
+          </a:gsLst>
+          <a:lin ang="5400000" scaled="0"/>
+        </a:gradFill>
+      </a:bgFillStyleLst>
+    </a:fmtScheme>
+  </a:themeElements>
+  <a:objectDefaults/>
+  <a:extraClrSchemeLst/>
+  <a:extLst>
+    <a:ext uri="{05A4C25C-085E-4340-85A3-A5531E510DB2}">
+      <thm15:themeFamily xmlns:thm15="http://schemas.microsoft.com/office/thememl/2012/main" name="Office Theme" id="{62F939B6-93AF-4DB8-9C6B-D6C7DFDC589F}" vid="{4A3C46E8-61CC-4603-A589-7422A47A8E4A}"/>
+    </a:ext>
+  </a:extLst>
+</a:theme>
 </file>
</xml_diff>

<commit_message>
updated images and presentation
</commit_message>
<xml_diff>
--- a/Presentation6.pptx
+++ b/Presentation6.pptx
@@ -5,23 +5,25 @@
     <p:sldMasterId id="2147483648" r:id="rId1"/>
   </p:sldMasterIdLst>
   <p:notesMasterIdLst>
-    <p:notesMasterId r:id="rId13"/>
+    <p:notesMasterId r:id="rId15"/>
   </p:notesMasterIdLst>
   <p:handoutMasterIdLst>
-    <p:handoutMasterId r:id="rId14"/>
+    <p:handoutMasterId r:id="rId16"/>
   </p:handoutMasterIdLst>
   <p:sldIdLst>
     <p:sldId id="256" r:id="rId2"/>
-    <p:sldId id="262" r:id="rId3"/>
-    <p:sldId id="270" r:id="rId4"/>
-    <p:sldId id="272" r:id="rId5"/>
-    <p:sldId id="265" r:id="rId6"/>
-    <p:sldId id="261" r:id="rId7"/>
-    <p:sldId id="258" r:id="rId8"/>
-    <p:sldId id="264" r:id="rId9"/>
-    <p:sldId id="266" r:id="rId10"/>
+    <p:sldId id="270" r:id="rId3"/>
+    <p:sldId id="272" r:id="rId4"/>
+    <p:sldId id="275" r:id="rId5"/>
+    <p:sldId id="276" r:id="rId6"/>
+    <p:sldId id="277" r:id="rId7"/>
+    <p:sldId id="266" r:id="rId8"/>
+    <p:sldId id="268" r:id="rId9"/>
+    <p:sldId id="262" r:id="rId10"/>
     <p:sldId id="269" r:id="rId11"/>
-    <p:sldId id="268" r:id="rId12"/>
+    <p:sldId id="265" r:id="rId12"/>
+    <p:sldId id="261" r:id="rId13"/>
+    <p:sldId id="258" r:id="rId14"/>
   </p:sldIdLst>
   <p:sldSz cx="12192000" cy="6858000"/>
   <p:notesSz cx="6858000" cy="9144000"/>
@@ -120,6 +122,29 @@
       </a:defRPr>
     </a:lvl9pPr>
   </p:defaultTextStyle>
+  <p:extLst>
+    <p:ext uri="{521415D9-36F7-43E2-AB2F-B90AF26B5E84}">
+      <p14:sectionLst xmlns:p14="http://schemas.microsoft.com/office/powerpoint/2010/main">
+        <p14:section name="Default Section" id="{38DE4253-38F6-B448-9261-BCF1A8BDB741}">
+          <p14:sldIdLst>
+            <p14:sldId id="256"/>
+            <p14:sldId id="270"/>
+            <p14:sldId id="272"/>
+            <p14:sldId id="275"/>
+            <p14:sldId id="276"/>
+            <p14:sldId id="277"/>
+            <p14:sldId id="266"/>
+            <p14:sldId id="268"/>
+            <p14:sldId id="262"/>
+            <p14:sldId id="269"/>
+            <p14:sldId id="265"/>
+            <p14:sldId id="261"/>
+            <p14:sldId id="258"/>
+          </p14:sldIdLst>
+        </p14:section>
+      </p14:sectionLst>
+    </p:ext>
+  </p:extLst>
 </p:presentation>
 </file>
 
@@ -792,7 +817,18 @@
           <a:bodyPr/>
           <a:lstStyle/>
           <a:p>
-            <a:endParaRPr lang="en-US" dirty="0"/>
+            <a:r>
+              <a:rPr lang="en-US" dirty="0"/>
+              <a:t>There are many unexplained outliers for both smokers and non-smokers regardless of gender and age. Given the limited details of the dataset, I can not say if the outliers are due to chronic illness, accident </a:t>
+            </a:r>
+            <a:r>
+              <a:rPr lang="en-US" dirty="0" err="1"/>
+              <a:t>etc</a:t>
+            </a:r>
+            <a:r>
+              <a:rPr lang="en-US" dirty="0"/>
+              <a:t> that might result in very high insurance charges</a:t>
+            </a:r>
           </a:p>
         </p:txBody>
       </p:sp>
@@ -813,7 +849,7 @@
           <a:p>
             <a:fld id="{3CFD093F-147C-534F-828E-C80044553B62}" type="slidenum">
               <a:rPr lang="en-US" smtClean="0"/>
-              <a:t>2</a:t>
+              <a:t>3</a:t>
             </a:fld>
             <a:endParaRPr lang="en-US"/>
           </a:p>
@@ -822,7 +858,7 @@
     </p:spTree>
     <p:extLst>
       <p:ext uri="{BB962C8B-B14F-4D97-AF65-F5344CB8AC3E}">
-        <p14:creationId xmlns:p14="http://schemas.microsoft.com/office/powerpoint/2010/main" val="3958077032"/>
+        <p14:creationId xmlns:p14="http://schemas.microsoft.com/office/powerpoint/2010/main" val="2289001831"/>
       </p:ext>
     </p:extLst>
   </p:cSld>
@@ -897,7 +933,482 @@
           <a:p>
             <a:fld id="{3CFD093F-147C-534F-828E-C80044553B62}" type="slidenum">
               <a:rPr lang="en-US" smtClean="0"/>
+              <a:t>4</a:t>
+            </a:fld>
+            <a:endParaRPr lang="en-US"/>
+          </a:p>
+        </p:txBody>
+      </p:sp>
+    </p:spTree>
+    <p:extLst>
+      <p:ext uri="{BB962C8B-B14F-4D97-AF65-F5344CB8AC3E}">
+        <p14:creationId xmlns:p14="http://schemas.microsoft.com/office/powerpoint/2010/main" val="3700504261"/>
+      </p:ext>
+    </p:extLst>
+  </p:cSld>
+  <p:clrMapOvr>
+    <a:masterClrMapping/>
+  </p:clrMapOvr>
+</p:notes>
+</file>
+
+<file path=ppt/notesSlides/notesSlide4.xml><?xml version="1.0" encoding="utf-8"?>
+<p:notes xmlns:a="http://schemas.openxmlformats.org/drawingml/2006/main" xmlns:r="http://schemas.openxmlformats.org/officeDocument/2006/relationships" xmlns:p="http://schemas.openxmlformats.org/presentationml/2006/main">
+  <p:cSld>
+    <p:spTree>
+      <p:nvGrpSpPr>
+        <p:cNvPr id="1" name=""/>
+        <p:cNvGrpSpPr/>
+        <p:nvPr/>
+      </p:nvGrpSpPr>
+      <p:grpSpPr>
+        <a:xfrm>
+          <a:off x="0" y="0"/>
+          <a:ext cx="0" cy="0"/>
+          <a:chOff x="0" y="0"/>
+          <a:chExt cx="0" cy="0"/>
+        </a:xfrm>
+      </p:grpSpPr>
+      <p:sp>
+        <p:nvSpPr>
+          <p:cNvPr id="2" name="Slide Image Placeholder 1"/>
+          <p:cNvSpPr>
+            <a:spLocks noGrp="1" noRot="1" noChangeAspect="1"/>
+          </p:cNvSpPr>
+          <p:nvPr>
+            <p:ph type="sldImg"/>
+          </p:nvPr>
+        </p:nvSpPr>
+        <p:spPr/>
+      </p:sp>
+      <p:sp>
+        <p:nvSpPr>
+          <p:cNvPr id="3" name="Notes Placeholder 2"/>
+          <p:cNvSpPr>
+            <a:spLocks noGrp="1"/>
+          </p:cNvSpPr>
+          <p:nvPr>
+            <p:ph type="body" idx="1"/>
+          </p:nvPr>
+        </p:nvSpPr>
+        <p:spPr/>
+        <p:txBody>
+          <a:bodyPr/>
+          <a:lstStyle/>
+          <a:p>
+            <a:r>
+              <a:rPr lang="en-US" dirty="0"/>
+              <a:t>To examine the data more deeply too a look at Non-smokers as a separate group. </a:t>
+            </a:r>
+          </a:p>
+          <a:p>
+            <a:r>
+              <a:rPr lang="en-US" dirty="0"/>
+              <a:t>We can see a very linear relationship between age and charges. There are both males and females whose charges don’t</a:t>
+            </a:r>
+          </a:p>
+          <a:p>
+            <a:r>
+              <a:rPr lang="en-US" sz="1200" dirty="0">
+                <a:solidFill>
+                  <a:schemeClr val="accent2"/>
+                </a:solidFill>
+              </a:rPr>
+              <a:t>After removing 24% of outlier we created a DATA SET  that is applicable to 74% of cases</a:t>
+            </a:r>
+            <a:endParaRPr lang="en-US" dirty="0"/>
+          </a:p>
+        </p:txBody>
+      </p:sp>
+      <p:sp>
+        <p:nvSpPr>
+          <p:cNvPr id="4" name="Slide Number Placeholder 3"/>
+          <p:cNvSpPr>
+            <a:spLocks noGrp="1"/>
+          </p:cNvSpPr>
+          <p:nvPr>
+            <p:ph type="sldNum" sz="quarter" idx="5"/>
+          </p:nvPr>
+        </p:nvSpPr>
+        <p:spPr/>
+        <p:txBody>
+          <a:bodyPr/>
+          <a:lstStyle/>
+          <a:p>
+            <a:fld id="{3CFD093F-147C-534F-828E-C80044553B62}" type="slidenum">
+              <a:rPr lang="en-US" smtClean="0"/>
+              <a:t>5</a:t>
+            </a:fld>
+            <a:endParaRPr lang="en-US"/>
+          </a:p>
+        </p:txBody>
+      </p:sp>
+    </p:spTree>
+    <p:extLst>
+      <p:ext uri="{BB962C8B-B14F-4D97-AF65-F5344CB8AC3E}">
+        <p14:creationId xmlns:p14="http://schemas.microsoft.com/office/powerpoint/2010/main" val="530099488"/>
+      </p:ext>
+    </p:extLst>
+  </p:cSld>
+  <p:clrMapOvr>
+    <a:masterClrMapping/>
+  </p:clrMapOvr>
+</p:notes>
+</file>
+
+<file path=ppt/notesSlides/notesSlide5.xml><?xml version="1.0" encoding="utf-8"?>
+<p:notes xmlns:a="http://schemas.openxmlformats.org/drawingml/2006/main" xmlns:r="http://schemas.openxmlformats.org/officeDocument/2006/relationships" xmlns:p="http://schemas.openxmlformats.org/presentationml/2006/main">
+  <p:cSld>
+    <p:spTree>
+      <p:nvGrpSpPr>
+        <p:cNvPr id="1" name=""/>
+        <p:cNvGrpSpPr/>
+        <p:nvPr/>
+      </p:nvGrpSpPr>
+      <p:grpSpPr>
+        <a:xfrm>
+          <a:off x="0" y="0"/>
+          <a:ext cx="0" cy="0"/>
+          <a:chOff x="0" y="0"/>
+          <a:chExt cx="0" cy="0"/>
+        </a:xfrm>
+      </p:grpSpPr>
+      <p:sp>
+        <p:nvSpPr>
+          <p:cNvPr id="2" name="Slide Image Placeholder 1"/>
+          <p:cNvSpPr>
+            <a:spLocks noGrp="1" noRot="1" noChangeAspect="1"/>
+          </p:cNvSpPr>
+          <p:nvPr>
+            <p:ph type="sldImg"/>
+          </p:nvPr>
+        </p:nvSpPr>
+        <p:spPr/>
+      </p:sp>
+      <p:sp>
+        <p:nvSpPr>
+          <p:cNvPr id="3" name="Notes Placeholder 2"/>
+          <p:cNvSpPr>
+            <a:spLocks noGrp="1"/>
+          </p:cNvSpPr>
+          <p:nvPr>
+            <p:ph type="body" idx="1"/>
+          </p:nvPr>
+        </p:nvSpPr>
+        <p:spPr/>
+        <p:txBody>
+          <a:bodyPr/>
+          <a:lstStyle/>
+          <a:p>
+            <a:r>
+              <a:rPr lang="en-US" dirty="0"/>
+              <a:t>Even if you don’t smoke, where you live can significantly effect your charges</a:t>
+            </a:r>
+          </a:p>
+          <a:p>
+            <a:r>
+              <a:rPr lang="en-US" dirty="0"/>
+              <a:t>If you are a woman, gender and where you live effect your charges</a:t>
+            </a:r>
+          </a:p>
+        </p:txBody>
+      </p:sp>
+      <p:sp>
+        <p:nvSpPr>
+          <p:cNvPr id="4" name="Slide Number Placeholder 3"/>
+          <p:cNvSpPr>
+            <a:spLocks noGrp="1"/>
+          </p:cNvSpPr>
+          <p:nvPr>
+            <p:ph type="sldNum" sz="quarter" idx="5"/>
+          </p:nvPr>
+        </p:nvSpPr>
+        <p:spPr/>
+        <p:txBody>
+          <a:bodyPr/>
+          <a:lstStyle/>
+          <a:p>
+            <a:fld id="{3CFD093F-147C-534F-828E-C80044553B62}" type="slidenum">
+              <a:rPr lang="en-US" smtClean="0"/>
               <a:t>6</a:t>
+            </a:fld>
+            <a:endParaRPr lang="en-US"/>
+          </a:p>
+        </p:txBody>
+      </p:sp>
+    </p:spTree>
+    <p:extLst>
+      <p:ext uri="{BB962C8B-B14F-4D97-AF65-F5344CB8AC3E}">
+        <p14:creationId xmlns:p14="http://schemas.microsoft.com/office/powerpoint/2010/main" val="569036597"/>
+      </p:ext>
+    </p:extLst>
+  </p:cSld>
+  <p:clrMapOvr>
+    <a:masterClrMapping/>
+  </p:clrMapOvr>
+</p:notes>
+</file>
+
+<file path=ppt/notesSlides/notesSlide6.xml><?xml version="1.0" encoding="utf-8"?>
+<p:notes xmlns:a="http://schemas.openxmlformats.org/drawingml/2006/main" xmlns:r="http://schemas.openxmlformats.org/officeDocument/2006/relationships" xmlns:p="http://schemas.openxmlformats.org/presentationml/2006/main">
+  <p:cSld>
+    <p:spTree>
+      <p:nvGrpSpPr>
+        <p:cNvPr id="1" name=""/>
+        <p:cNvGrpSpPr/>
+        <p:nvPr/>
+      </p:nvGrpSpPr>
+      <p:grpSpPr>
+        <a:xfrm>
+          <a:off x="0" y="0"/>
+          <a:ext cx="0" cy="0"/>
+          <a:chOff x="0" y="0"/>
+          <a:chExt cx="0" cy="0"/>
+        </a:xfrm>
+      </p:grpSpPr>
+      <p:sp>
+        <p:nvSpPr>
+          <p:cNvPr id="2" name="Slide Image Placeholder 1"/>
+          <p:cNvSpPr>
+            <a:spLocks noGrp="1" noRot="1" noChangeAspect="1"/>
+          </p:cNvSpPr>
+          <p:nvPr>
+            <p:ph type="sldImg"/>
+          </p:nvPr>
+        </p:nvSpPr>
+        <p:spPr/>
+      </p:sp>
+      <p:sp>
+        <p:nvSpPr>
+          <p:cNvPr id="3" name="Notes Placeholder 2"/>
+          <p:cNvSpPr>
+            <a:spLocks noGrp="1"/>
+          </p:cNvSpPr>
+          <p:nvPr>
+            <p:ph type="body" idx="1"/>
+          </p:nvPr>
+        </p:nvSpPr>
+        <p:spPr/>
+        <p:txBody>
+          <a:bodyPr/>
+          <a:lstStyle/>
+          <a:p>
+            <a:endParaRPr lang="en-US" dirty="0"/>
+          </a:p>
+        </p:txBody>
+      </p:sp>
+      <p:sp>
+        <p:nvSpPr>
+          <p:cNvPr id="4" name="Slide Number Placeholder 3"/>
+          <p:cNvSpPr>
+            <a:spLocks noGrp="1"/>
+          </p:cNvSpPr>
+          <p:nvPr>
+            <p:ph type="sldNum" sz="quarter" idx="5"/>
+          </p:nvPr>
+        </p:nvSpPr>
+        <p:spPr/>
+        <p:txBody>
+          <a:bodyPr/>
+          <a:lstStyle/>
+          <a:p>
+            <a:fld id="{3CFD093F-147C-534F-828E-C80044553B62}" type="slidenum">
+              <a:rPr lang="en-US" smtClean="0"/>
+              <a:t>9</a:t>
+            </a:fld>
+            <a:endParaRPr lang="en-US"/>
+          </a:p>
+        </p:txBody>
+      </p:sp>
+    </p:spTree>
+    <p:extLst>
+      <p:ext uri="{BB962C8B-B14F-4D97-AF65-F5344CB8AC3E}">
+        <p14:creationId xmlns:p14="http://schemas.microsoft.com/office/powerpoint/2010/main" val="3958077032"/>
+      </p:ext>
+    </p:extLst>
+  </p:cSld>
+  <p:clrMapOvr>
+    <a:masterClrMapping/>
+  </p:clrMapOvr>
+</p:notes>
+</file>
+
+<file path=ppt/notesSlides/notesSlide7.xml><?xml version="1.0" encoding="utf-8"?>
+<p:notes xmlns:a="http://schemas.openxmlformats.org/drawingml/2006/main" xmlns:r="http://schemas.openxmlformats.org/officeDocument/2006/relationships" xmlns:p="http://schemas.openxmlformats.org/presentationml/2006/main">
+  <p:cSld>
+    <p:spTree>
+      <p:nvGrpSpPr>
+        <p:cNvPr id="1" name=""/>
+        <p:cNvGrpSpPr/>
+        <p:nvPr/>
+      </p:nvGrpSpPr>
+      <p:grpSpPr>
+        <a:xfrm>
+          <a:off x="0" y="0"/>
+          <a:ext cx="0" cy="0"/>
+          <a:chOff x="0" y="0"/>
+          <a:chExt cx="0" cy="0"/>
+        </a:xfrm>
+      </p:grpSpPr>
+      <p:sp>
+        <p:nvSpPr>
+          <p:cNvPr id="2" name="Slide Image Placeholder 1"/>
+          <p:cNvSpPr>
+            <a:spLocks noGrp="1" noRot="1" noChangeAspect="1"/>
+          </p:cNvSpPr>
+          <p:nvPr>
+            <p:ph type="sldImg"/>
+          </p:nvPr>
+        </p:nvSpPr>
+        <p:spPr/>
+      </p:sp>
+      <p:sp>
+        <p:nvSpPr>
+          <p:cNvPr id="3" name="Notes Placeholder 2"/>
+          <p:cNvSpPr>
+            <a:spLocks noGrp="1"/>
+          </p:cNvSpPr>
+          <p:nvPr>
+            <p:ph type="body" idx="1"/>
+          </p:nvPr>
+        </p:nvSpPr>
+        <p:spPr/>
+        <p:txBody>
+          <a:bodyPr/>
+          <a:lstStyle/>
+          <a:p>
+            <a:endParaRPr lang="en-US" dirty="0"/>
+          </a:p>
+          <a:p>
+            <a:r>
+              <a:rPr lang="en-US" dirty="0"/>
+              <a:t>When you look at the smoker and non-smokers as a single data set, you don’t see a very strong correlation between age and the charges.</a:t>
+            </a:r>
+          </a:p>
+          <a:p>
+            <a:r>
+              <a:rPr lang="en-US" dirty="0"/>
+              <a:t>Smoking is such a determining factor that is obscures other stories this data might tell</a:t>
+            </a:r>
+          </a:p>
+        </p:txBody>
+      </p:sp>
+      <p:sp>
+        <p:nvSpPr>
+          <p:cNvPr id="4" name="Slide Number Placeholder 3"/>
+          <p:cNvSpPr>
+            <a:spLocks noGrp="1"/>
+          </p:cNvSpPr>
+          <p:nvPr>
+            <p:ph type="sldNum" sz="quarter" idx="5"/>
+          </p:nvPr>
+        </p:nvSpPr>
+        <p:spPr/>
+        <p:txBody>
+          <a:bodyPr/>
+          <a:lstStyle/>
+          <a:p>
+            <a:fld id="{3CFD093F-147C-534F-828E-C80044553B62}" type="slidenum">
+              <a:rPr lang="en-US" smtClean="0"/>
+              <a:t>11</a:t>
+            </a:fld>
+            <a:endParaRPr lang="en-US"/>
+          </a:p>
+        </p:txBody>
+      </p:sp>
+    </p:spTree>
+    <p:extLst>
+      <p:ext uri="{BB962C8B-B14F-4D97-AF65-F5344CB8AC3E}">
+        <p14:creationId xmlns:p14="http://schemas.microsoft.com/office/powerpoint/2010/main" val="3589214684"/>
+      </p:ext>
+    </p:extLst>
+  </p:cSld>
+  <p:clrMapOvr>
+    <a:masterClrMapping/>
+  </p:clrMapOvr>
+</p:notes>
+</file>
+
+<file path=ppt/notesSlides/notesSlide8.xml><?xml version="1.0" encoding="utf-8"?>
+<p:notes xmlns:a="http://schemas.openxmlformats.org/drawingml/2006/main" xmlns:r="http://schemas.openxmlformats.org/officeDocument/2006/relationships" xmlns:p="http://schemas.openxmlformats.org/presentationml/2006/main">
+  <p:cSld>
+    <p:spTree>
+      <p:nvGrpSpPr>
+        <p:cNvPr id="1" name=""/>
+        <p:cNvGrpSpPr/>
+        <p:nvPr/>
+      </p:nvGrpSpPr>
+      <p:grpSpPr>
+        <a:xfrm>
+          <a:off x="0" y="0"/>
+          <a:ext cx="0" cy="0"/>
+          <a:chOff x="0" y="0"/>
+          <a:chExt cx="0" cy="0"/>
+        </a:xfrm>
+      </p:grpSpPr>
+      <p:sp>
+        <p:nvSpPr>
+          <p:cNvPr id="2" name="Slide Image Placeholder 1"/>
+          <p:cNvSpPr>
+            <a:spLocks noGrp="1" noRot="1" noChangeAspect="1"/>
+          </p:cNvSpPr>
+          <p:nvPr>
+            <p:ph type="sldImg"/>
+          </p:nvPr>
+        </p:nvSpPr>
+        <p:spPr/>
+      </p:sp>
+      <p:sp>
+        <p:nvSpPr>
+          <p:cNvPr id="3" name="Notes Placeholder 2"/>
+          <p:cNvSpPr>
+            <a:spLocks noGrp="1"/>
+          </p:cNvSpPr>
+          <p:nvPr>
+            <p:ph type="body" idx="1"/>
+          </p:nvPr>
+        </p:nvSpPr>
+        <p:spPr/>
+        <p:txBody>
+          <a:bodyPr/>
+          <a:lstStyle/>
+          <a:p>
+            <a:r>
+              <a:rPr lang="en-US" dirty="0"/>
+              <a:t>To examine the data more deeply too a look at Non-smokers as a separate group. </a:t>
+            </a:r>
+          </a:p>
+          <a:p>
+            <a:r>
+              <a:rPr lang="en-US" dirty="0"/>
+              <a:t>We can see a very linear relationship between age and charges. There are both males and females whose charges </a:t>
+            </a:r>
+            <a:r>
+              <a:rPr lang="en-US" dirty="0" err="1"/>
+              <a:t>dont</a:t>
+            </a:r>
+            <a:endParaRPr lang="en-US" dirty="0"/>
+          </a:p>
+        </p:txBody>
+      </p:sp>
+      <p:sp>
+        <p:nvSpPr>
+          <p:cNvPr id="4" name="Slide Number Placeholder 3"/>
+          <p:cNvSpPr>
+            <a:spLocks noGrp="1"/>
+          </p:cNvSpPr>
+          <p:nvPr>
+            <p:ph type="sldNum" sz="quarter" idx="5"/>
+          </p:nvPr>
+        </p:nvSpPr>
+        <p:spPr/>
+        <p:txBody>
+          <a:bodyPr/>
+          <a:lstStyle/>
+          <a:p>
+            <a:fld id="{3CFD093F-147C-534F-828E-C80044553B62}" type="slidenum">
+              <a:rPr lang="en-US" smtClean="0"/>
+              <a:t>12</a:t>
             </a:fld>
             <a:endParaRPr lang="en-US"/>
           </a:p>
@@ -907,6 +1418,93 @@
     <p:extLst>
       <p:ext uri="{BB962C8B-B14F-4D97-AF65-F5344CB8AC3E}">
         <p14:creationId xmlns:p14="http://schemas.microsoft.com/office/powerpoint/2010/main" val="3405891204"/>
+      </p:ext>
+    </p:extLst>
+  </p:cSld>
+  <p:clrMapOvr>
+    <a:masterClrMapping/>
+  </p:clrMapOvr>
+</p:notes>
+</file>
+
+<file path=ppt/notesSlides/notesSlide9.xml><?xml version="1.0" encoding="utf-8"?>
+<p:notes xmlns:a="http://schemas.openxmlformats.org/drawingml/2006/main" xmlns:r="http://schemas.openxmlformats.org/officeDocument/2006/relationships" xmlns:p="http://schemas.openxmlformats.org/presentationml/2006/main">
+  <p:cSld>
+    <p:spTree>
+      <p:nvGrpSpPr>
+        <p:cNvPr id="1" name=""/>
+        <p:cNvGrpSpPr/>
+        <p:nvPr/>
+      </p:nvGrpSpPr>
+      <p:grpSpPr>
+        <a:xfrm>
+          <a:off x="0" y="0"/>
+          <a:ext cx="0" cy="0"/>
+          <a:chOff x="0" y="0"/>
+          <a:chExt cx="0" cy="0"/>
+        </a:xfrm>
+      </p:grpSpPr>
+      <p:sp>
+        <p:nvSpPr>
+          <p:cNvPr id="2" name="Slide Image Placeholder 1"/>
+          <p:cNvSpPr>
+            <a:spLocks noGrp="1" noRot="1" noChangeAspect="1"/>
+          </p:cNvSpPr>
+          <p:nvPr>
+            <p:ph type="sldImg"/>
+          </p:nvPr>
+        </p:nvSpPr>
+        <p:spPr/>
+      </p:sp>
+      <p:sp>
+        <p:nvSpPr>
+          <p:cNvPr id="3" name="Notes Placeholder 2"/>
+          <p:cNvSpPr>
+            <a:spLocks noGrp="1"/>
+          </p:cNvSpPr>
+          <p:nvPr>
+            <p:ph type="body" idx="1"/>
+          </p:nvPr>
+        </p:nvSpPr>
+        <p:spPr/>
+        <p:txBody>
+          <a:bodyPr/>
+          <a:lstStyle/>
+          <a:p>
+            <a:r>
+              <a:rPr lang="en-US" dirty="0"/>
+              <a:t>WHAT WAS ONLY A WEAK CORRELATION WHEN I EXAMINED SMOKERS AND NON-SMOKERS TOGETHER, THE  RELATIONSHIP BETWEEN AGE AND CHARGES  IS MUCH MORE HIGHLY CORRELATED  AND CLEARER CLEARER WHEN NON-SMOKERS ARE VIEWED INDEPENDENTLY. THE RELATIONSHIP BETWEEN AGE AND CHARGES IS ALMOST IDENTICAL FOR MEN AND WOMEN</a:t>
+            </a:r>
+          </a:p>
+        </p:txBody>
+      </p:sp>
+      <p:sp>
+        <p:nvSpPr>
+          <p:cNvPr id="4" name="Slide Number Placeholder 3"/>
+          <p:cNvSpPr>
+            <a:spLocks noGrp="1"/>
+          </p:cNvSpPr>
+          <p:nvPr>
+            <p:ph type="sldNum" sz="quarter" idx="5"/>
+          </p:nvPr>
+        </p:nvSpPr>
+        <p:spPr/>
+        <p:txBody>
+          <a:bodyPr/>
+          <a:lstStyle/>
+          <a:p>
+            <a:fld id="{3CFD093F-147C-534F-828E-C80044553B62}" type="slidenum">
+              <a:rPr lang="en-US" smtClean="0"/>
+              <a:t>13</a:t>
+            </a:fld>
+            <a:endParaRPr lang="en-US"/>
+          </a:p>
+        </p:txBody>
+      </p:sp>
+    </p:spTree>
+    <p:extLst>
+      <p:ext uri="{BB962C8B-B14F-4D97-AF65-F5344CB8AC3E}">
+        <p14:creationId xmlns:p14="http://schemas.microsoft.com/office/powerpoint/2010/main" val="2557258611"/>
       </p:ext>
     </p:extLst>
   </p:cSld>
@@ -4879,908 +5477,6 @@
           <p:cNvPr id="2" name="Title 1">
             <a:extLst>
               <a:ext uri="{FF2B5EF4-FFF2-40B4-BE49-F238E27FC236}">
-                <a16:creationId xmlns:a16="http://schemas.microsoft.com/office/drawing/2014/main" id="{5711F0C9-5508-FA40-84B9-72BE20D837C5}"/>
-              </a:ext>
-            </a:extLst>
-          </p:cNvPr>
-          <p:cNvSpPr>
-            <a:spLocks noGrp="1"/>
-          </p:cNvSpPr>
-          <p:nvPr>
-            <p:ph type="title"/>
-          </p:nvPr>
-        </p:nvSpPr>
-        <p:spPr/>
-        <p:txBody>
-          <a:bodyPr/>
-          <a:lstStyle/>
-          <a:p>
-            <a:r>
-              <a:rPr lang="en-US" dirty="0"/>
-              <a:t>SUMMARY AND NEXT STEPS</a:t>
-            </a:r>
-          </a:p>
-        </p:txBody>
-      </p:sp>
-      <p:sp>
-        <p:nvSpPr>
-          <p:cNvPr id="3" name="Content Placeholder 2">
-            <a:extLst>
-              <a:ext uri="{FF2B5EF4-FFF2-40B4-BE49-F238E27FC236}">
-                <a16:creationId xmlns:a16="http://schemas.microsoft.com/office/drawing/2014/main" id="{A987A90A-01B4-D24B-9E4D-132228FE1AEC}"/>
-              </a:ext>
-            </a:extLst>
-          </p:cNvPr>
-          <p:cNvSpPr>
-            <a:spLocks noGrp="1"/>
-          </p:cNvSpPr>
-          <p:nvPr>
-            <p:ph idx="1"/>
-          </p:nvPr>
-        </p:nvSpPr>
-        <p:spPr/>
-        <p:txBody>
-          <a:bodyPr anchor="t"/>
-          <a:lstStyle/>
-          <a:p>
-            <a:endParaRPr lang="en-US" dirty="0"/>
-          </a:p>
-          <a:p>
-            <a:r>
-              <a:rPr lang="en-US" dirty="0"/>
-              <a:t>EXPLORE OTHER TYPES OF STATISTICAL MODELS  THAT MIGHT FIT THE DATA BETTER</a:t>
-            </a:r>
-          </a:p>
-          <a:p>
-            <a:r>
-              <a:rPr lang="en-US" dirty="0"/>
-              <a:t>THE DATA SET WAS LIMITED IN SIZE AND SCOPE, REPEAT PROJECT WITH MORE DETAILED AND LARGER DATA SETS</a:t>
-            </a:r>
-          </a:p>
-          <a:p>
-            <a:r>
-              <a:rPr lang="en-US" dirty="0"/>
-              <a:t>EXPLORE UNEXPLAINED DATA ANOMOLIES AND BIMODAL ACTIVITY </a:t>
-            </a:r>
-          </a:p>
-        </p:txBody>
-      </p:sp>
-    </p:spTree>
-    <p:extLst>
-      <p:ext uri="{BB962C8B-B14F-4D97-AF65-F5344CB8AC3E}">
-        <p14:creationId xmlns:p14="http://schemas.microsoft.com/office/powerpoint/2010/main" val="82148327"/>
-      </p:ext>
-    </p:extLst>
-  </p:cSld>
-  <p:clrMapOvr>
-    <a:masterClrMapping/>
-  </p:clrMapOvr>
-</p:sld>
-</file>
-
-<file path=ppt/slides/slide2.xml><?xml version="1.0" encoding="utf-8"?>
-<p:sld xmlns:a="http://schemas.openxmlformats.org/drawingml/2006/main" xmlns:r="http://schemas.openxmlformats.org/officeDocument/2006/relationships" xmlns:p="http://schemas.openxmlformats.org/presentationml/2006/main">
-  <p:cSld>
-    <p:spTree>
-      <p:nvGrpSpPr>
-        <p:cNvPr id="1" name=""/>
-        <p:cNvGrpSpPr/>
-        <p:nvPr/>
-      </p:nvGrpSpPr>
-      <p:grpSpPr>
-        <a:xfrm>
-          <a:off x="0" y="0"/>
-          <a:ext cx="0" cy="0"/>
-          <a:chOff x="0" y="0"/>
-          <a:chExt cx="0" cy="0"/>
-        </a:xfrm>
-      </p:grpSpPr>
-      <p:sp>
-        <p:nvSpPr>
-          <p:cNvPr id="2" name="Title 1">
-            <a:extLst>
-              <a:ext uri="{FF2B5EF4-FFF2-40B4-BE49-F238E27FC236}">
-                <a16:creationId xmlns:a16="http://schemas.microsoft.com/office/drawing/2014/main" id="{71BD1667-0455-594F-AB36-C17B22BE530A}"/>
-              </a:ext>
-            </a:extLst>
-          </p:cNvPr>
-          <p:cNvSpPr>
-            <a:spLocks noGrp="1"/>
-          </p:cNvSpPr>
-          <p:nvPr>
-            <p:ph type="title"/>
-          </p:nvPr>
-        </p:nvSpPr>
-        <p:spPr>
-          <a:xfrm>
-            <a:off x="581192" y="702156"/>
-            <a:ext cx="11029616" cy="1140932"/>
-          </a:xfrm>
-        </p:spPr>
-        <p:txBody>
-          <a:bodyPr anchor="t"/>
-          <a:lstStyle/>
-          <a:p>
-            <a:br>
-              <a:rPr lang="en-US" dirty="0"/>
-            </a:br>
-            <a:endParaRPr lang="en-US" dirty="0"/>
-          </a:p>
-        </p:txBody>
-      </p:sp>
-      <p:sp>
-        <p:nvSpPr>
-          <p:cNvPr id="3" name="Content Placeholder 2">
-            <a:extLst>
-              <a:ext uri="{FF2B5EF4-FFF2-40B4-BE49-F238E27FC236}">
-                <a16:creationId xmlns:a16="http://schemas.microsoft.com/office/drawing/2014/main" id="{CD723FF6-03FF-4B49-A8EF-E97D5FD4C2C6}"/>
-              </a:ext>
-            </a:extLst>
-          </p:cNvPr>
-          <p:cNvSpPr>
-            <a:spLocks noGrp="1"/>
-          </p:cNvSpPr>
-          <p:nvPr>
-            <p:ph idx="1"/>
-          </p:nvPr>
-        </p:nvSpPr>
-        <p:spPr>
-          <a:xfrm>
-            <a:off x="6734175" y="2451958"/>
-            <a:ext cx="4876633" cy="3434492"/>
-          </a:xfrm>
-        </p:spPr>
-        <p:txBody>
-          <a:bodyPr/>
-          <a:lstStyle/>
-          <a:p>
-            <a:r>
-              <a:rPr lang="en-US" dirty="0"/>
-              <a:t>Can gender be used to predict insurance charges?</a:t>
-            </a:r>
-          </a:p>
-          <a:p>
-            <a:r>
-              <a:rPr lang="en-US" dirty="0"/>
-              <a:t>Is the difference in charges between men and women in this data set statistically significant?</a:t>
-            </a:r>
-          </a:p>
-          <a:p>
-            <a:r>
-              <a:rPr lang="en-US" dirty="0"/>
-              <a:t>Does the region in which you live effect your charges?</a:t>
-            </a:r>
-          </a:p>
-        </p:txBody>
-      </p:sp>
-      <p:sp>
-        <p:nvSpPr>
-          <p:cNvPr id="4" name="TextBox 3">
-            <a:extLst>
-              <a:ext uri="{FF2B5EF4-FFF2-40B4-BE49-F238E27FC236}">
-                <a16:creationId xmlns:a16="http://schemas.microsoft.com/office/drawing/2014/main" id="{4A3DD61A-D5EC-2F45-8574-EA3D6EF6EF48}"/>
-              </a:ext>
-            </a:extLst>
-          </p:cNvPr>
-          <p:cNvSpPr txBox="1"/>
-          <p:nvPr/>
-        </p:nvSpPr>
-        <p:spPr>
-          <a:xfrm>
-            <a:off x="328613" y="3015042"/>
-            <a:ext cx="5924382" cy="2308324"/>
-          </a:xfrm>
-          <a:prstGeom prst="rect">
-            <a:avLst/>
-          </a:prstGeom>
-          <a:noFill/>
-        </p:spPr>
-        <p:txBody>
-          <a:bodyPr wrap="square" rtlCol="0" anchor="ctr">
-            <a:spAutoFit/>
-          </a:bodyPr>
-          <a:lstStyle/>
-          <a:p>
-            <a:r>
-              <a:rPr lang="en-US" dirty="0"/>
-              <a:t>“While women and men both feel the impact of health costs, such as insurance premiums, co-payments, and deductibles, they can be particularly burdensome for women who on average earn lower wages, have fewer financial assets, accumulate less wealth, and have higher rates of poverty than men.” - </a:t>
-            </a:r>
-            <a:r>
-              <a:rPr lang="en-US" sz="1400" b="1" i="1" dirty="0"/>
-              <a:t>Women's Coverage, Access, and Affordability: Key Findings from the 2017 Kaiser Women’s Health Survey</a:t>
-            </a:r>
-          </a:p>
-          <a:p>
-            <a:endParaRPr lang="en-US" dirty="0"/>
-          </a:p>
-        </p:txBody>
-      </p:sp>
-    </p:spTree>
-    <p:extLst>
-      <p:ext uri="{BB962C8B-B14F-4D97-AF65-F5344CB8AC3E}">
-        <p14:creationId xmlns:p14="http://schemas.microsoft.com/office/powerpoint/2010/main" val="2365626266"/>
-      </p:ext>
-    </p:extLst>
-  </p:cSld>
-  <p:clrMapOvr>
-    <a:masterClrMapping/>
-  </p:clrMapOvr>
-</p:sld>
-</file>
-
-<file path=ppt/slides/slide3.xml><?xml version="1.0" encoding="utf-8"?>
-<p:sld xmlns:a="http://schemas.openxmlformats.org/drawingml/2006/main" xmlns:r="http://schemas.openxmlformats.org/officeDocument/2006/relationships" xmlns:p="http://schemas.openxmlformats.org/presentationml/2006/main">
-  <p:cSld>
-    <p:spTree>
-      <p:nvGrpSpPr>
-        <p:cNvPr id="1" name=""/>
-        <p:cNvGrpSpPr/>
-        <p:nvPr/>
-      </p:nvGrpSpPr>
-      <p:grpSpPr>
-        <a:xfrm>
-          <a:off x="0" y="0"/>
-          <a:ext cx="0" cy="0"/>
-          <a:chOff x="0" y="0"/>
-          <a:chExt cx="0" cy="0"/>
-        </a:xfrm>
-      </p:grpSpPr>
-      <p:sp>
-        <p:nvSpPr>
-          <p:cNvPr id="2" name="Title 1">
-            <a:extLst>
-              <a:ext uri="{FF2B5EF4-FFF2-40B4-BE49-F238E27FC236}">
-                <a16:creationId xmlns:a16="http://schemas.microsoft.com/office/drawing/2014/main" id="{E952DAF5-3E11-E640-BABB-9C5F65800E88}"/>
-              </a:ext>
-            </a:extLst>
-          </p:cNvPr>
-          <p:cNvSpPr>
-            <a:spLocks noGrp="1"/>
-          </p:cNvSpPr>
-          <p:nvPr>
-            <p:ph type="title"/>
-          </p:nvPr>
-        </p:nvSpPr>
-        <p:spPr>
-          <a:xfrm>
-            <a:off x="424447" y="824092"/>
-            <a:ext cx="11029616" cy="988666"/>
-          </a:xfrm>
-        </p:spPr>
-        <p:txBody>
-          <a:bodyPr/>
-          <a:lstStyle/>
-          <a:p>
-            <a:r>
-              <a:rPr lang="en-US" b="1" dirty="0">
-                <a:solidFill>
-                  <a:schemeClr val="accent1"/>
-                </a:solidFill>
-              </a:rPr>
-              <a:t>THE SAMPLE DATA SET</a:t>
-            </a:r>
-            <a:br>
-              <a:rPr lang="en-US" sz="3200" b="1" dirty="0">
-                <a:solidFill>
-                  <a:schemeClr val="accent1"/>
-                </a:solidFill>
-              </a:rPr>
-            </a:br>
-            <a:r>
-              <a:rPr lang="en-US" sz="2400" b="1" dirty="0"/>
-              <a:t>ONE  YEAR OF insurance charges for 1,338 people</a:t>
-            </a:r>
-            <a:br>
-              <a:rPr lang="en-US" sz="2400" b="1" dirty="0"/>
-            </a:br>
-            <a:endParaRPr lang="en-US" sz="2400" b="1" dirty="0">
-              <a:solidFill>
-                <a:schemeClr val="accent1"/>
-              </a:solidFill>
-            </a:endParaRPr>
-          </a:p>
-        </p:txBody>
-      </p:sp>
-      <p:sp>
-        <p:nvSpPr>
-          <p:cNvPr id="11" name="Content Placeholder 10">
-            <a:extLst>
-              <a:ext uri="{FF2B5EF4-FFF2-40B4-BE49-F238E27FC236}">
-                <a16:creationId xmlns:a16="http://schemas.microsoft.com/office/drawing/2014/main" id="{AE544CB2-EF18-B846-9DD3-9E955C2169A9}"/>
-              </a:ext>
-            </a:extLst>
-          </p:cNvPr>
-          <p:cNvSpPr>
-            <a:spLocks noGrp="1"/>
-          </p:cNvSpPr>
-          <p:nvPr>
-            <p:ph idx="1"/>
-          </p:nvPr>
-        </p:nvSpPr>
-        <p:spPr>
-          <a:xfrm>
-            <a:off x="424448" y="1989221"/>
-            <a:ext cx="11186360" cy="4283242"/>
-          </a:xfrm>
-        </p:spPr>
-        <p:txBody>
-          <a:bodyPr/>
-          <a:lstStyle/>
-          <a:p>
-            <a:pPr marL="0" indent="0">
-              <a:buNone/>
-            </a:pPr>
-            <a:r>
-              <a:rPr lang="en-US" sz="2400" b="1" dirty="0">
-                <a:solidFill>
-                  <a:schemeClr val="accent1"/>
-                </a:solidFill>
-              </a:rPr>
-              <a:t> </a:t>
-            </a:r>
-          </a:p>
-          <a:p>
-            <a:r>
-              <a:rPr lang="en-US" sz="2400" b="1" dirty="0">
-                <a:solidFill>
-                  <a:schemeClr val="accent1"/>
-                </a:solidFill>
-              </a:rPr>
-              <a:t>TOTAL CHARGES FOR THE YEAR</a:t>
-            </a:r>
-          </a:p>
-          <a:p>
-            <a:r>
-              <a:rPr lang="en-US" sz="2400" b="1" dirty="0">
-                <a:solidFill>
-                  <a:schemeClr val="accent1"/>
-                </a:solidFill>
-              </a:rPr>
-              <a:t>676 MALES, 662 FEMALES</a:t>
-            </a:r>
-          </a:p>
-          <a:p>
-            <a:r>
-              <a:rPr lang="en-US" sz="2400" b="1" dirty="0">
-                <a:solidFill>
-                  <a:schemeClr val="accent1"/>
-                </a:solidFill>
-              </a:rPr>
-              <a:t>AVERAGE AGE OF 39 </a:t>
-            </a:r>
-          </a:p>
-          <a:p>
-            <a:r>
-              <a:rPr lang="en-US" sz="2400" b="1" dirty="0">
-                <a:solidFill>
-                  <a:schemeClr val="accent1"/>
-                </a:solidFill>
-              </a:rPr>
-              <a:t>BMI,  NUMBER OF CHILDREN,  REGION</a:t>
-            </a:r>
-          </a:p>
-          <a:p>
-            <a:r>
-              <a:rPr lang="en-US" sz="2400" b="1" dirty="0">
-                <a:solidFill>
-                  <a:schemeClr val="accent1"/>
-                </a:solidFill>
-              </a:rPr>
-              <a:t>AS EXPECTED, CHARGES INCREASE FOR WOMEN AND MEN AS THEY GET OLDER</a:t>
-            </a:r>
-          </a:p>
-          <a:p>
-            <a:r>
-              <a:rPr lang="en-US" sz="2400" b="1" dirty="0">
-                <a:solidFill>
-                  <a:schemeClr val="accent1"/>
-                </a:solidFill>
-              </a:rPr>
-              <a:t>THE CHARGES OUTLIERS IN THIS DATA SET ARE NOT EXPLAINED. IT IS UNKOWN IF THEY REPRESENT CHRONIC ILLNESSES, ACCIDENTS ETC</a:t>
-            </a:r>
-          </a:p>
-          <a:p>
-            <a:endParaRPr lang="en-US" dirty="0"/>
-          </a:p>
-        </p:txBody>
-      </p:sp>
-    </p:spTree>
-    <p:extLst>
-      <p:ext uri="{BB962C8B-B14F-4D97-AF65-F5344CB8AC3E}">
-        <p14:creationId xmlns:p14="http://schemas.microsoft.com/office/powerpoint/2010/main" val="2874590467"/>
-      </p:ext>
-    </p:extLst>
-  </p:cSld>
-  <p:clrMapOvr>
-    <a:masterClrMapping/>
-  </p:clrMapOvr>
-</p:sld>
-</file>
-
-<file path=ppt/slides/slide4.xml><?xml version="1.0" encoding="utf-8"?>
-<p:sld xmlns:a="http://schemas.openxmlformats.org/drawingml/2006/main" xmlns:r="http://schemas.openxmlformats.org/officeDocument/2006/relationships" xmlns:p="http://schemas.openxmlformats.org/presentationml/2006/main">
-  <p:cSld>
-    <p:spTree>
-      <p:nvGrpSpPr>
-        <p:cNvPr id="1" name=""/>
-        <p:cNvGrpSpPr/>
-        <p:nvPr/>
-      </p:nvGrpSpPr>
-      <p:grpSpPr>
-        <a:xfrm>
-          <a:off x="0" y="0"/>
-          <a:ext cx="0" cy="0"/>
-          <a:chOff x="0" y="0"/>
-          <a:chExt cx="0" cy="0"/>
-        </a:xfrm>
-      </p:grpSpPr>
-      <p:pic>
-        <p:nvPicPr>
-          <p:cNvPr id="2" name="Picture 1">
-            <a:extLst>
-              <a:ext uri="{FF2B5EF4-FFF2-40B4-BE49-F238E27FC236}">
-                <a16:creationId xmlns:a16="http://schemas.microsoft.com/office/drawing/2014/main" id="{86E2E6AF-BDEA-934D-8E96-05FF342E83BE}"/>
-              </a:ext>
-            </a:extLst>
-          </p:cNvPr>
-          <p:cNvPicPr>
-            <a:picLocks noChangeAspect="1"/>
-          </p:cNvPicPr>
-          <p:nvPr/>
-        </p:nvPicPr>
-        <p:blipFill>
-          <a:blip r:embed="rId2"/>
-          <a:srcRect/>
-          <a:stretch/>
-        </p:blipFill>
-        <p:spPr>
-          <a:xfrm>
-            <a:off x="0" y="1989221"/>
-            <a:ext cx="6469995" cy="4237277"/>
-          </a:xfrm>
-          <a:prstGeom prst="rect">
-            <a:avLst/>
-          </a:prstGeom>
-        </p:spPr>
-      </p:pic>
-      <p:sp>
-        <p:nvSpPr>
-          <p:cNvPr id="4" name="TextBox 3">
-            <a:extLst>
-              <a:ext uri="{FF2B5EF4-FFF2-40B4-BE49-F238E27FC236}">
-                <a16:creationId xmlns:a16="http://schemas.microsoft.com/office/drawing/2014/main" id="{9CEB39A4-E6FD-2449-A5B8-0CE6284D33EB}"/>
-              </a:ext>
-            </a:extLst>
-          </p:cNvPr>
-          <p:cNvSpPr txBox="1"/>
-          <p:nvPr/>
-        </p:nvSpPr>
-        <p:spPr>
-          <a:xfrm>
-            <a:off x="1106908" y="788892"/>
-            <a:ext cx="5197640" cy="1477328"/>
-          </a:xfrm>
-          <a:prstGeom prst="rect">
-            <a:avLst/>
-          </a:prstGeom>
-          <a:noFill/>
-        </p:spPr>
-        <p:txBody>
-          <a:bodyPr wrap="square" rtlCol="0">
-            <a:spAutoFit/>
-          </a:bodyPr>
-          <a:lstStyle/>
-          <a:p>
-            <a:pPr marL="285750" indent="-285750">
-              <a:buFont typeface="Wingdings" pitchFamily="2" charset="2"/>
-              <a:buChar char="§"/>
-            </a:pPr>
-            <a:r>
-              <a:rPr lang="en-US" b="1" dirty="0">
-                <a:solidFill>
-                  <a:schemeClr val="accent1"/>
-                </a:solidFill>
-              </a:rPr>
-              <a:t>BIMODAL, 2 DISTINCT DATA SETS?</a:t>
-            </a:r>
-          </a:p>
-          <a:p>
-            <a:pPr marL="285750" indent="-285750">
-              <a:buFont typeface="Wingdings" pitchFamily="2" charset="2"/>
-              <a:buChar char="§"/>
-            </a:pPr>
-            <a:r>
-              <a:rPr lang="en-US" b="1" dirty="0">
-                <a:solidFill>
-                  <a:schemeClr val="accent1"/>
-                </a:solidFill>
-              </a:rPr>
-              <a:t>UNEXPLAINABLE OUTLIERS</a:t>
-            </a:r>
-          </a:p>
-          <a:p>
-            <a:pPr marL="285750" indent="-285750">
-              <a:buFont typeface="Wingdings" pitchFamily="2" charset="2"/>
-              <a:buChar char="§"/>
-            </a:pPr>
-            <a:r>
-              <a:rPr lang="en-US" b="1" dirty="0">
-                <a:solidFill>
-                  <a:schemeClr val="accent1"/>
-                </a:solidFill>
-              </a:rPr>
-              <a:t>CHARGES INCREASE WITH AGE</a:t>
-            </a:r>
-          </a:p>
-          <a:p>
-            <a:pPr marL="285750" indent="-285750">
-              <a:buFont typeface="Wingdings" pitchFamily="2" charset="2"/>
-              <a:buChar char="§"/>
-            </a:pPr>
-            <a:endParaRPr lang="en-US" b="1" dirty="0">
-              <a:solidFill>
-                <a:schemeClr val="accent1"/>
-              </a:solidFill>
-            </a:endParaRPr>
-          </a:p>
-          <a:p>
-            <a:endParaRPr lang="en-US" dirty="0"/>
-          </a:p>
-        </p:txBody>
-      </p:sp>
-      <p:pic>
-        <p:nvPicPr>
-          <p:cNvPr id="6" name="Picture 5" descr="A screenshot of a cell phone&#10;&#10;Description automatically generated">
-            <a:extLst>
-              <a:ext uri="{FF2B5EF4-FFF2-40B4-BE49-F238E27FC236}">
-                <a16:creationId xmlns:a16="http://schemas.microsoft.com/office/drawing/2014/main" id="{94ECF8B9-B051-3647-B6E3-17E282959682}"/>
-              </a:ext>
-            </a:extLst>
-          </p:cNvPr>
-          <p:cNvPicPr>
-            <a:picLocks noChangeAspect="1"/>
-          </p:cNvPicPr>
-          <p:nvPr/>
-        </p:nvPicPr>
-        <p:blipFill>
-          <a:blip r:embed="rId3"/>
-          <a:stretch>
-            <a:fillRect/>
-          </a:stretch>
-        </p:blipFill>
-        <p:spPr>
-          <a:xfrm>
-            <a:off x="6469995" y="1989221"/>
-            <a:ext cx="5703231" cy="3735113"/>
-          </a:xfrm>
-          <a:prstGeom prst="rect">
-            <a:avLst/>
-          </a:prstGeom>
-        </p:spPr>
-      </p:pic>
-      <p:sp>
-        <p:nvSpPr>
-          <p:cNvPr id="7" name="TextBox 6">
-            <a:extLst>
-              <a:ext uri="{FF2B5EF4-FFF2-40B4-BE49-F238E27FC236}">
-                <a16:creationId xmlns:a16="http://schemas.microsoft.com/office/drawing/2014/main" id="{9C361D79-BEB6-AE46-8600-C268459ED428}"/>
-              </a:ext>
-            </a:extLst>
-          </p:cNvPr>
-          <p:cNvSpPr txBox="1"/>
-          <p:nvPr/>
-        </p:nvSpPr>
-        <p:spPr>
-          <a:xfrm>
-            <a:off x="7218947" y="788892"/>
-            <a:ext cx="4828674" cy="1200329"/>
-          </a:xfrm>
-          <a:prstGeom prst="rect">
-            <a:avLst/>
-          </a:prstGeom>
-          <a:noFill/>
-        </p:spPr>
-        <p:txBody>
-          <a:bodyPr wrap="square" rtlCol="0">
-            <a:spAutoFit/>
-          </a:bodyPr>
-          <a:lstStyle/>
-          <a:p>
-            <a:r>
-              <a:rPr lang="en-US" b="1" dirty="0">
-                <a:solidFill>
-                  <a:schemeClr val="accent1"/>
-                </a:solidFill>
-              </a:rPr>
-              <a:t>NON-SMOKERS: 1064</a:t>
-            </a:r>
-          </a:p>
-          <a:p>
-            <a:endParaRPr lang="en-US" b="1" dirty="0">
-              <a:solidFill>
-                <a:schemeClr val="accent1"/>
-              </a:solidFill>
-            </a:endParaRPr>
-          </a:p>
-          <a:p>
-            <a:r>
-              <a:rPr lang="en-US" b="1" dirty="0">
-                <a:solidFill>
-                  <a:schemeClr val="accent1"/>
-                </a:solidFill>
-              </a:rPr>
-              <a:t>SMOKERS: 274</a:t>
-            </a:r>
-          </a:p>
-          <a:p>
-            <a:r>
-              <a:rPr lang="en-US" dirty="0">
-                <a:solidFill>
-                  <a:schemeClr val="tx2"/>
-                </a:solidFill>
-              </a:rPr>
-              <a:t>26% of the data, but 49.5% of the charges</a:t>
-            </a:r>
-            <a:endParaRPr lang="en-US" b="1" dirty="0">
-              <a:solidFill>
-                <a:schemeClr val="accent1"/>
-              </a:solidFill>
-            </a:endParaRPr>
-          </a:p>
-        </p:txBody>
-      </p:sp>
-    </p:spTree>
-    <p:extLst>
-      <p:ext uri="{BB962C8B-B14F-4D97-AF65-F5344CB8AC3E}">
-        <p14:creationId xmlns:p14="http://schemas.microsoft.com/office/powerpoint/2010/main" val="3928363096"/>
-      </p:ext>
-    </p:extLst>
-  </p:cSld>
-  <p:clrMapOvr>
-    <a:masterClrMapping/>
-  </p:clrMapOvr>
-</p:sld>
-</file>
-
-<file path=ppt/slides/slide5.xml><?xml version="1.0" encoding="utf-8"?>
-<p:sld xmlns:a="http://schemas.openxmlformats.org/drawingml/2006/main" xmlns:r="http://schemas.openxmlformats.org/officeDocument/2006/relationships" xmlns:p="http://schemas.openxmlformats.org/presentationml/2006/main">
-  <p:cSld>
-    <p:spTree>
-      <p:nvGrpSpPr>
-        <p:cNvPr id="1" name=""/>
-        <p:cNvGrpSpPr/>
-        <p:nvPr/>
-      </p:nvGrpSpPr>
-      <p:grpSpPr>
-        <a:xfrm>
-          <a:off x="0" y="0"/>
-          <a:ext cx="0" cy="0"/>
-          <a:chOff x="0" y="0"/>
-          <a:chExt cx="0" cy="0"/>
-        </a:xfrm>
-      </p:grpSpPr>
-      <p:sp>
-        <p:nvSpPr>
-          <p:cNvPr id="21" name="Rectangle 23">
-            <a:extLst>
-              <a:ext uri="{FF2B5EF4-FFF2-40B4-BE49-F238E27FC236}">
-                <a16:creationId xmlns:a16="http://schemas.microsoft.com/office/drawing/2014/main" id="{00401440-1DC9-4C9E-A3BA-4DECEEB46503}"/>
-              </a:ext>
-              <a:ext uri="{C183D7F6-B498-43B3-948B-1728B52AA6E4}">
-                <adec:decorative xmlns:adec="http://schemas.microsoft.com/office/drawing/2017/decorative" val="1"/>
-              </a:ext>
-            </a:extLst>
-          </p:cNvPr>
-          <p:cNvSpPr>
-            <a:spLocks noGrp="1" noRot="1" noChangeAspect="1" noMove="1" noResize="1" noEditPoints="1" noAdjustHandles="1" noChangeArrowheads="1" noChangeShapeType="1" noTextEdit="1"/>
-          </p:cNvSpPr>
-          <p:nvPr>
-            <p:extLst>
-              <p:ext uri="{386F3935-93C4-4BCD-93E2-E3B085C9AB24}">
-                <p16:designElem xmlns:p16="http://schemas.microsoft.com/office/powerpoint/2015/main" val="1"/>
-              </p:ext>
-            </p:extLst>
-          </p:nvPr>
-        </p:nvSpPr>
-        <p:spPr>
-          <a:xfrm>
-            <a:off x="0" y="0"/>
-            <a:ext cx="12192000" cy="6858000"/>
-          </a:xfrm>
-          <a:prstGeom prst="rect">
-            <a:avLst/>
-          </a:prstGeom>
-          <a:solidFill>
-            <a:srgbClr val="FFFFFF"/>
-          </a:solidFill>
-          <a:ln>
-            <a:noFill/>
-          </a:ln>
-        </p:spPr>
-        <p:style>
-          <a:lnRef idx="2">
-            <a:schemeClr val="accent1">
-              <a:shade val="50000"/>
-            </a:schemeClr>
-          </a:lnRef>
-          <a:fillRef idx="1">
-            <a:schemeClr val="accent1"/>
-          </a:fillRef>
-          <a:effectRef idx="0">
-            <a:schemeClr val="accent1"/>
-          </a:effectRef>
-          <a:fontRef idx="minor">
-            <a:schemeClr val="lt1"/>
-          </a:fontRef>
-        </p:style>
-        <p:txBody>
-          <a:bodyPr rtlCol="0" anchor="ctr"/>
-          <a:lstStyle/>
-          <a:p>
-            <a:pPr algn="ctr"/>
-            <a:endParaRPr lang="en-US" dirty="0"/>
-          </a:p>
-        </p:txBody>
-      </p:sp>
-      <p:cxnSp>
-        <p:nvCxnSpPr>
-          <p:cNvPr id="22" name="Straight Connector 25">
-            <a:extLst>
-              <a:ext uri="{FF2B5EF4-FFF2-40B4-BE49-F238E27FC236}">
-                <a16:creationId xmlns:a16="http://schemas.microsoft.com/office/drawing/2014/main" id="{EEE3F140-02CB-4BBC-ABC0-8BF046C9D1B8}"/>
-              </a:ext>
-              <a:ext uri="{C183D7F6-B498-43B3-948B-1728B52AA6E4}">
-                <adec:decorative xmlns:adec="http://schemas.microsoft.com/office/drawing/2017/decorative" val="1"/>
-              </a:ext>
-            </a:extLst>
-          </p:cNvPr>
-          <p:cNvCxnSpPr>
-            <a:cxnSpLocks noGrp="1" noRot="1" noChangeAspect="1" noMove="1" noResize="1" noEditPoints="1" noAdjustHandles="1" noChangeArrowheads="1" noChangeShapeType="1"/>
-          </p:cNvCxnSpPr>
-          <p:nvPr>
-            <p:extLst>
-              <p:ext uri="{386F3935-93C4-4BCD-93E2-E3B085C9AB24}">
-                <p16:designElem xmlns:p16="http://schemas.microsoft.com/office/powerpoint/2015/main" val="1"/>
-              </p:ext>
-            </p:extLst>
-          </p:nvPr>
-        </p:nvCxnSpPr>
-        <p:spPr>
-          <a:xfrm>
-            <a:off x="6096000" y="1436050"/>
-            <a:ext cx="0" cy="1645920"/>
-          </a:xfrm>
-          <a:prstGeom prst="line">
-            <a:avLst/>
-          </a:prstGeom>
-          <a:ln w="19050">
-            <a:solidFill>
-              <a:srgbClr val="465359"/>
-            </a:solidFill>
-          </a:ln>
-        </p:spPr>
-        <p:style>
-          <a:lnRef idx="1">
-            <a:schemeClr val="accent1"/>
-          </a:lnRef>
-          <a:fillRef idx="0">
-            <a:schemeClr val="accent1"/>
-          </a:fillRef>
-          <a:effectRef idx="0">
-            <a:schemeClr val="accent1"/>
-          </a:effectRef>
-          <a:fontRef idx="minor">
-            <a:schemeClr val="tx1"/>
-          </a:fontRef>
-        </p:style>
-      </p:cxnSp>
-      <p:sp useBgFill="1">
-        <p:nvSpPr>
-          <p:cNvPr id="23" name="Rectangle 27">
-            <a:extLst>
-              <a:ext uri="{FF2B5EF4-FFF2-40B4-BE49-F238E27FC236}">
-                <a16:creationId xmlns:a16="http://schemas.microsoft.com/office/drawing/2014/main" id="{36B822CC-7DA9-4417-AA94-64CEB676F0B8}"/>
-              </a:ext>
-              <a:ext uri="{C183D7F6-B498-43B3-948B-1728B52AA6E4}">
-                <adec:decorative xmlns:adec="http://schemas.microsoft.com/office/drawing/2017/decorative" val="1"/>
-              </a:ext>
-            </a:extLst>
-          </p:cNvPr>
-          <p:cNvSpPr>
-            <a:spLocks noGrp="1" noRot="1" noChangeAspect="1" noMove="1" noResize="1" noEditPoints="1" noAdjustHandles="1" noChangeArrowheads="1" noChangeShapeType="1" noTextEdit="1"/>
-          </p:cNvSpPr>
-          <p:nvPr>
-            <p:extLst>
-              <p:ext uri="{386F3935-93C4-4BCD-93E2-E3B085C9AB24}">
-                <p16:designElem xmlns:p16="http://schemas.microsoft.com/office/powerpoint/2015/main" val="1"/>
-              </p:ext>
-            </p:extLst>
-          </p:nvPr>
-        </p:nvSpPr>
-        <p:spPr>
-          <a:xfrm>
-            <a:off x="447234" y="4219240"/>
-            <a:ext cx="11301984" cy="94997"/>
-          </a:xfrm>
-          <a:prstGeom prst="rect">
-            <a:avLst/>
-          </a:prstGeom>
-          <a:ln>
-            <a:noFill/>
-          </a:ln>
-          <a:effectLst/>
-        </p:spPr>
-        <p:style>
-          <a:lnRef idx="1">
-            <a:schemeClr val="accent1"/>
-          </a:lnRef>
-          <a:fillRef idx="3">
-            <a:schemeClr val="accent1"/>
-          </a:fillRef>
-          <a:effectRef idx="2">
-            <a:schemeClr val="accent1"/>
-          </a:effectRef>
-          <a:fontRef idx="minor">
-            <a:schemeClr val="lt1"/>
-          </a:fontRef>
-        </p:style>
-      </p:sp>
-      <p:sp useBgFill="1">
-        <p:nvSpPr>
-          <p:cNvPr id="25" name="Rectangle 29">
-            <a:extLst>
-              <a:ext uri="{FF2B5EF4-FFF2-40B4-BE49-F238E27FC236}">
-                <a16:creationId xmlns:a16="http://schemas.microsoft.com/office/drawing/2014/main" id="{AFA01E88-71CC-4FF3-9E81-51E0C32B45E4}"/>
-              </a:ext>
-              <a:ext uri="{C183D7F6-B498-43B3-948B-1728B52AA6E4}">
-                <adec:decorative xmlns:adec="http://schemas.microsoft.com/office/drawing/2017/decorative" val="1"/>
-              </a:ext>
-            </a:extLst>
-          </p:cNvPr>
-          <p:cNvSpPr>
-            <a:spLocks noGrp="1" noRot="1" noChangeAspect="1" noMove="1" noResize="1" noEditPoints="1" noAdjustHandles="1" noChangeArrowheads="1" noChangeShapeType="1" noTextEdit="1"/>
-          </p:cNvSpPr>
-          <p:nvPr>
-            <p:extLst>
-              <p:ext uri="{386F3935-93C4-4BCD-93E2-E3B085C9AB24}">
-                <p16:designElem xmlns:p16="http://schemas.microsoft.com/office/powerpoint/2015/main" val="1"/>
-              </p:ext>
-            </p:extLst>
-          </p:nvPr>
-        </p:nvSpPr>
-        <p:spPr>
-          <a:xfrm>
-            <a:off x="447234" y="4359623"/>
-            <a:ext cx="11303626" cy="2051143"/>
-          </a:xfrm>
-          <a:prstGeom prst="rect">
-            <a:avLst/>
-          </a:prstGeom>
-          <a:ln w="6350" cmpd="sng">
-            <a:noFill/>
-          </a:ln>
-          <a:effectLst/>
-        </p:spPr>
-        <p:style>
-          <a:lnRef idx="1">
-            <a:schemeClr val="accent1"/>
-          </a:lnRef>
-          <a:fillRef idx="3">
-            <a:schemeClr val="accent1"/>
-          </a:fillRef>
-          <a:effectRef idx="2">
-            <a:schemeClr val="accent1"/>
-          </a:effectRef>
-          <a:fontRef idx="minor">
-            <a:schemeClr val="lt1"/>
-          </a:fontRef>
-        </p:style>
-      </p:sp>
-      <p:sp>
-        <p:nvSpPr>
-          <p:cNvPr id="2" name="Title 1">
-            <a:extLst>
-              <a:ext uri="{FF2B5EF4-FFF2-40B4-BE49-F238E27FC236}">
                 <a16:creationId xmlns:a16="http://schemas.microsoft.com/office/drawing/2014/main" id="{7E0E4C79-55A7-344B-A0E5-2EB7903112A9}"/>
               </a:ext>
             </a:extLst>
@@ -5794,8 +5490,8 @@
         </p:nvSpPr>
         <p:spPr>
           <a:xfrm>
-            <a:off x="2772062" y="265910"/>
-            <a:ext cx="5759193" cy="924907"/>
+            <a:off x="209751" y="609600"/>
+            <a:ext cx="5759193" cy="409281"/>
           </a:xfrm>
         </p:spPr>
         <p:txBody>
@@ -5834,8 +5530,8 @@
         </p:nvSpPr>
         <p:spPr>
           <a:xfrm>
-            <a:off x="2475545" y="1064267"/>
-            <a:ext cx="7240909" cy="1256611"/>
+            <a:off x="217628" y="1027109"/>
+            <a:ext cx="6171150" cy="1864101"/>
           </a:xfrm>
         </p:spPr>
         <p:txBody>
@@ -5850,6 +5546,16 @@
             </a:pPr>
             <a:r>
               <a:rPr lang="en-US" dirty="0"/>
+              <a:t>Smokers are 26% of the data, but 49.5% of the charges</a:t>
+            </a:r>
+          </a:p>
+          <a:p>
+            <a:pPr>
+              <a:buFont typeface="Wingdings" pitchFamily="2" charset="2"/>
+              <a:buChar char="§"/>
+            </a:pPr>
+            <a:r>
+              <a:rPr lang="en-US" dirty="0"/>
               <a:t>Slight relationship between charges and age, much weaker correlation </a:t>
             </a:r>
           </a:p>
@@ -5864,6 +5570,9 @@
               <a:rPr lang="en-US" dirty="0"/>
               <a:t>But for non-smokers, the charges look almost flat</a:t>
             </a:r>
+          </a:p>
+          <a:p>
+            <a:endParaRPr lang="en-US" dirty="0"/>
           </a:p>
         </p:txBody>
       </p:sp>
@@ -5882,14 +5591,14 @@
           <p:nvPr/>
         </p:nvPicPr>
         <p:blipFill>
-          <a:blip r:embed="rId2"/>
+          <a:blip r:embed="rId3"/>
           <a:stretch>
             <a:fillRect/>
           </a:stretch>
         </p:blipFill>
         <p:spPr>
           <a:xfrm>
-            <a:off x="637463" y="2973754"/>
+            <a:off x="6642891" y="90304"/>
             <a:ext cx="5331481" cy="2624979"/>
           </a:xfrm>
           <a:prstGeom prst="rect">
@@ -5912,15 +5621,45 @@
           <p:nvPr/>
         </p:nvPicPr>
         <p:blipFill>
-          <a:blip r:embed="rId3"/>
+          <a:blip r:embed="rId4"/>
           <a:stretch>
             <a:fillRect/>
           </a:stretch>
         </p:blipFill>
         <p:spPr>
           <a:xfrm>
-            <a:off x="6223056" y="2973754"/>
-            <a:ext cx="5086605" cy="3444056"/>
+            <a:off x="0" y="3005276"/>
+            <a:ext cx="5521708" cy="3738657"/>
+          </a:xfrm>
+          <a:prstGeom prst="rect">
+            <a:avLst/>
+          </a:prstGeom>
+        </p:spPr>
+      </p:pic>
+      <p:pic>
+        <p:nvPicPr>
+          <p:cNvPr id="35" name="Picture 34" descr="A screenshot of a cell phone&#10;&#10;Description automatically generated">
+            <a:extLst>
+              <a:ext uri="{FF2B5EF4-FFF2-40B4-BE49-F238E27FC236}">
+                <a16:creationId xmlns:a16="http://schemas.microsoft.com/office/drawing/2014/main" id="{0E997EFA-D5D8-ED4B-A0AE-3F515FF3AF21}"/>
+              </a:ext>
+            </a:extLst>
+          </p:cNvPr>
+          <p:cNvPicPr>
+            <a:picLocks noChangeAspect="1"/>
+          </p:cNvPicPr>
+          <p:nvPr/>
+        </p:nvPicPr>
+        <p:blipFill>
+          <a:blip r:embed="rId5"/>
+          <a:stretch>
+            <a:fillRect/>
+          </a:stretch>
+        </p:blipFill>
+        <p:spPr>
+          <a:xfrm>
+            <a:off x="6368056" y="3186266"/>
+            <a:ext cx="5376710" cy="3376676"/>
           </a:xfrm>
           <a:prstGeom prst="rect">
             <a:avLst/>
@@ -5940,7 +5679,7 @@
 </p:sld>
 </file>
 
-<file path=ppt/slides/slide6.xml><?xml version="1.0" encoding="utf-8"?>
+<file path=ppt/slides/slide12.xml><?xml version="1.0" encoding="utf-8"?>
 <p:sld xmlns:a="http://schemas.openxmlformats.org/drawingml/2006/main" xmlns:r="http://schemas.openxmlformats.org/officeDocument/2006/relationships" xmlns:p="http://schemas.openxmlformats.org/presentationml/2006/main">
   <p:cSld>
     <p:bg>
@@ -5965,243 +5704,83 @@
           <a:chExt cx="0" cy="0"/>
         </a:xfrm>
       </p:grpSpPr>
-      <p:sp useBgFill="1">
-        <p:nvSpPr>
-          <p:cNvPr id="33" name="Rectangle 27">
+      <p:sp>
+        <p:nvSpPr>
+          <p:cNvPr id="2" name="Title 1">
             <a:extLst>
               <a:ext uri="{FF2B5EF4-FFF2-40B4-BE49-F238E27FC236}">
-                <a16:creationId xmlns:a16="http://schemas.microsoft.com/office/drawing/2014/main" id="{B1CC0937-4B54-4AB8-9605-7DEED999380B}"/>
-              </a:ext>
-              <a:ext uri="{C183D7F6-B498-43B3-948B-1728B52AA6E4}">
-                <adec:decorative xmlns:adec="http://schemas.microsoft.com/office/drawing/2017/decorative" val="1"/>
+                <a16:creationId xmlns:a16="http://schemas.microsoft.com/office/drawing/2014/main" id="{9901A9B4-B103-744A-9D25-8AEFEAE1BEF2}"/>
               </a:ext>
             </a:extLst>
           </p:cNvPr>
           <p:cNvSpPr>
-            <a:spLocks noGrp="1" noRot="1" noChangeAspect="1" noMove="1" noResize="1" noEditPoints="1" noAdjustHandles="1" noChangeArrowheads="1" noChangeShapeType="1" noTextEdit="1"/>
-          </p:cNvSpPr>
-          <p:nvPr>
-            <p:extLst>
-              <p:ext uri="{386F3935-93C4-4BCD-93E2-E3B085C9AB24}">
-                <p16:designElem xmlns:p16="http://schemas.microsoft.com/office/powerpoint/2015/main" val="1"/>
-              </p:ext>
-            </p:extLst>
-          </p:nvPr>
-        </p:nvSpPr>
-        <p:spPr>
-          <a:xfrm>
-            <a:off x="0" y="548640"/>
-            <a:ext cx="12192000" cy="6309360"/>
-          </a:xfrm>
-          <a:prstGeom prst="rect">
-            <a:avLst/>
-          </a:prstGeom>
-          <a:ln>
-            <a:noFill/>
-          </a:ln>
-        </p:spPr>
-        <p:style>
-          <a:lnRef idx="2">
-            <a:schemeClr val="accent1">
-              <a:shade val="50000"/>
-            </a:schemeClr>
-          </a:lnRef>
-          <a:fillRef idx="1">
-            <a:schemeClr val="accent1"/>
-          </a:fillRef>
-          <a:effectRef idx="0">
-            <a:schemeClr val="accent1"/>
-          </a:effectRef>
-          <a:fontRef idx="minor">
-            <a:schemeClr val="lt1"/>
-          </a:fontRef>
-        </p:style>
-        <p:txBody>
-          <a:bodyPr rtlCol="0" anchor="ctr"/>
+            <a:spLocks noGrp="1"/>
+          </p:cNvSpPr>
+          <p:nvPr>
+            <p:ph type="title"/>
+          </p:nvPr>
+        </p:nvSpPr>
+        <p:spPr>
+          <a:xfrm>
+            <a:off x="581194" y="3705725"/>
+            <a:ext cx="3310504" cy="2502967"/>
+          </a:xfrm>
+        </p:spPr>
+        <p:txBody>
+          <a:bodyPr anchor="t">
+            <a:normAutofit/>
+          </a:bodyPr>
           <a:lstStyle/>
           <a:p>
-            <a:pPr algn="ctr"/>
-            <a:endParaRPr lang="en-US"/>
-          </a:p>
-        </p:txBody>
-      </p:sp>
-      <p:sp>
-        <p:nvSpPr>
-          <p:cNvPr id="30" name="Rectangle 29">
-            <a:extLst>
-              <a:ext uri="{FF2B5EF4-FFF2-40B4-BE49-F238E27FC236}">
-                <a16:creationId xmlns:a16="http://schemas.microsoft.com/office/drawing/2014/main" id="{BE3EDEA1-97CC-41C2-BE54-EA64ACE7F97E}"/>
-              </a:ext>
-              <a:ext uri="{C183D7F6-B498-43B3-948B-1728B52AA6E4}">
-                <adec:decorative xmlns:adec="http://schemas.microsoft.com/office/drawing/2017/decorative" val="1"/>
-              </a:ext>
-            </a:extLst>
-          </p:cNvPr>
-          <p:cNvSpPr>
-            <a:spLocks noGrp="1" noRot="1" noChangeAspect="1" noMove="1" noResize="1" noEditPoints="1" noAdjustHandles="1" noChangeArrowheads="1" noChangeShapeType="1" noTextEdit="1"/>
-          </p:cNvSpPr>
-          <p:nvPr>
-            <p:extLst>
-              <p:ext uri="{386F3935-93C4-4BCD-93E2-E3B085C9AB24}">
-                <p16:designElem xmlns:p16="http://schemas.microsoft.com/office/powerpoint/2015/main" val="1"/>
-              </p:ext>
-            </p:extLst>
-          </p:nvPr>
-        </p:nvSpPr>
-        <p:spPr>
-          <a:xfrm>
-            <a:off x="4241830" y="614407"/>
-            <a:ext cx="7507794" cy="1189298"/>
-          </a:xfrm>
-          <a:prstGeom prst="rect">
-            <a:avLst/>
-          </a:prstGeom>
-          <a:solidFill>
-            <a:schemeClr val="accent1"/>
-          </a:solidFill>
-          <a:ln>
-            <a:noFill/>
-          </a:ln>
-          <a:effectLst/>
-        </p:spPr>
-        <p:style>
-          <a:lnRef idx="1">
-            <a:schemeClr val="accent1"/>
-          </a:lnRef>
-          <a:fillRef idx="3">
-            <a:schemeClr val="accent1"/>
-          </a:fillRef>
-          <a:effectRef idx="2">
-            <a:schemeClr val="accent1"/>
-          </a:effectRef>
-          <a:fontRef idx="minor">
-            <a:schemeClr val="lt1"/>
-          </a:fontRef>
-        </p:style>
-      </p:sp>
-      <p:sp>
-        <p:nvSpPr>
-          <p:cNvPr id="35" name="Rectangle 31">
-            <a:extLst>
-              <a:ext uri="{FF2B5EF4-FFF2-40B4-BE49-F238E27FC236}">
-                <a16:creationId xmlns:a16="http://schemas.microsoft.com/office/drawing/2014/main" id="{9926A5DB-A90A-4941-81F5-DF0E44A29719}"/>
-              </a:ext>
-              <a:ext uri="{C183D7F6-B498-43B3-948B-1728B52AA6E4}">
-                <adec:decorative xmlns:adec="http://schemas.microsoft.com/office/drawing/2017/decorative" val="1"/>
-              </a:ext>
-            </a:extLst>
-          </p:cNvPr>
-          <p:cNvSpPr>
-            <a:spLocks noGrp="1" noRot="1" noChangeAspect="1" noMove="1" noResize="1" noEditPoints="1" noAdjustHandles="1" noChangeArrowheads="1" noChangeShapeType="1" noTextEdit="1"/>
-          </p:cNvSpPr>
-          <p:nvPr>
-            <p:extLst>
-              <p:ext uri="{386F3935-93C4-4BCD-93E2-E3B085C9AB24}">
-                <p16:designElem xmlns:p16="http://schemas.microsoft.com/office/powerpoint/2015/main" val="1"/>
-              </p:ext>
-            </p:extLst>
-          </p:nvPr>
-        </p:nvSpPr>
-        <p:spPr>
-          <a:xfrm>
-            <a:off x="454391" y="641102"/>
-            <a:ext cx="3695019" cy="2827037"/>
-          </a:xfrm>
-          <a:prstGeom prst="rect">
-            <a:avLst/>
-          </a:prstGeom>
-          <a:noFill/>
-          <a:ln w="19050">
-            <a:solidFill>
-              <a:schemeClr val="tx2"/>
-            </a:solidFill>
-          </a:ln>
-        </p:spPr>
-        <p:style>
-          <a:lnRef idx="2">
-            <a:schemeClr val="accent1">
-              <a:shade val="50000"/>
-            </a:schemeClr>
-          </a:lnRef>
-          <a:fillRef idx="1">
-            <a:schemeClr val="accent1"/>
-          </a:fillRef>
-          <a:effectRef idx="0">
-            <a:schemeClr val="accent1"/>
-          </a:effectRef>
-          <a:fontRef idx="minor">
-            <a:schemeClr val="lt1"/>
-          </a:fontRef>
-        </p:style>
-        <p:txBody>
-          <a:bodyPr rtlCol="0" anchor="ctr"/>
-          <a:lstStyle/>
-          <a:p>
-            <a:pPr algn="ctr"/>
-            <a:endParaRPr lang="en-US"/>
-          </a:p>
-        </p:txBody>
-      </p:sp>
-      <p:sp>
-        <p:nvSpPr>
-          <p:cNvPr id="34" name="Rectangle 33">
-            <a:extLst>
-              <a:ext uri="{FF2B5EF4-FFF2-40B4-BE49-F238E27FC236}">
-                <a16:creationId xmlns:a16="http://schemas.microsoft.com/office/drawing/2014/main" id="{AB1B71B9-532D-4BBD-BEBA-D028ACC08316}"/>
-              </a:ext>
-              <a:ext uri="{C183D7F6-B498-43B3-948B-1728B52AA6E4}">
-                <adec:decorative xmlns:adec="http://schemas.microsoft.com/office/drawing/2017/decorative" val="1"/>
-              </a:ext>
-            </a:extLst>
-          </p:cNvPr>
-          <p:cNvSpPr>
-            <a:spLocks noGrp="1" noRot="1" noChangeAspect="1" noMove="1" noResize="1" noEditPoints="1" noAdjustHandles="1" noChangeArrowheads="1" noChangeShapeType="1" noTextEdit="1"/>
-          </p:cNvSpPr>
-          <p:nvPr>
-            <p:extLst>
-              <p:ext uri="{386F3935-93C4-4BCD-93E2-E3B085C9AB24}">
-                <p16:designElem xmlns:p16="http://schemas.microsoft.com/office/powerpoint/2015/main" val="1"/>
-              </p:ext>
-            </p:extLst>
-          </p:nvPr>
-        </p:nvSpPr>
-        <p:spPr>
-          <a:xfrm>
-            <a:off x="455134" y="3557674"/>
-            <a:ext cx="3695019" cy="2827037"/>
-          </a:xfrm>
-          <a:prstGeom prst="rect">
-            <a:avLst/>
-          </a:prstGeom>
-          <a:noFill/>
-          <a:ln w="19050">
-            <a:solidFill>
-              <a:schemeClr val="tx2"/>
-            </a:solidFill>
-          </a:ln>
-        </p:spPr>
-        <p:style>
-          <a:lnRef idx="2">
-            <a:schemeClr val="accent1">
-              <a:shade val="50000"/>
-            </a:schemeClr>
-          </a:lnRef>
-          <a:fillRef idx="1">
-            <a:schemeClr val="accent1"/>
-          </a:fillRef>
-          <a:effectRef idx="0">
-            <a:schemeClr val="accent1"/>
-          </a:effectRef>
-          <a:fontRef idx="minor">
-            <a:schemeClr val="lt1"/>
-          </a:fontRef>
-        </p:style>
-        <p:txBody>
-          <a:bodyPr rtlCol="0" anchor="ctr"/>
-          <a:lstStyle/>
-          <a:p>
-            <a:pPr algn="ctr"/>
-            <a:endParaRPr lang="en-US"/>
+            <a:pPr marL="285750" indent="-285750" algn="l">
+              <a:lnSpc>
+                <a:spcPct val="90000"/>
+              </a:lnSpc>
+              <a:buFont typeface="Wingdings" pitchFamily="2" charset="2"/>
+              <a:buChar char="§"/>
+            </a:pPr>
+            <a:r>
+              <a:rPr lang="en-US" sz="1800" dirty="0">
+                <a:solidFill>
+                  <a:schemeClr val="accent2"/>
+                </a:solidFill>
+              </a:rPr>
+              <a:t>REMOVE OUTLIERS: TOTAL CHARGES &gt; 22,500</a:t>
+            </a:r>
+            <a:br>
+              <a:rPr lang="en-US" sz="1800" dirty="0">
+                <a:solidFill>
+                  <a:schemeClr val="accent2"/>
+                </a:solidFill>
+              </a:rPr>
+            </a:br>
+            <a:br>
+              <a:rPr lang="en-US" sz="2200" dirty="0">
+                <a:solidFill>
+                  <a:schemeClr val="accent2"/>
+                </a:solidFill>
+              </a:rPr>
+            </a:br>
+            <a:r>
+              <a:rPr lang="en-US" sz="1800" dirty="0">
+                <a:solidFill>
+                  <a:schemeClr val="accent2"/>
+                </a:solidFill>
+              </a:rPr>
+              <a:t>After removing 24% of outlier we created a DATA SET  that is applicable to 74% of cases</a:t>
+            </a:r>
+            <a:br>
+              <a:rPr lang="en-US" sz="1800" dirty="0">
+                <a:solidFill>
+                  <a:schemeClr val="accent2"/>
+                </a:solidFill>
+              </a:rPr>
+            </a:br>
+            <a:endParaRPr lang="en-US" sz="1800" dirty="0">
+              <a:solidFill>
+                <a:schemeClr val="accent2"/>
+              </a:solidFill>
+            </a:endParaRPr>
           </a:p>
         </p:txBody>
       </p:sp>
@@ -6266,86 +5845,6 @@
           </a:prstGeom>
         </p:spPr>
       </p:pic>
-      <p:sp>
-        <p:nvSpPr>
-          <p:cNvPr id="2" name="Title 1">
-            <a:extLst>
-              <a:ext uri="{FF2B5EF4-FFF2-40B4-BE49-F238E27FC236}">
-                <a16:creationId xmlns:a16="http://schemas.microsoft.com/office/drawing/2014/main" id="{9901A9B4-B103-744A-9D25-8AEFEAE1BEF2}"/>
-              </a:ext>
-            </a:extLst>
-          </p:cNvPr>
-          <p:cNvSpPr>
-            <a:spLocks noGrp="1"/>
-          </p:cNvSpPr>
-          <p:nvPr>
-            <p:ph type="title"/>
-          </p:nvPr>
-        </p:nvSpPr>
-        <p:spPr>
-          <a:xfrm>
-            <a:off x="581194" y="3705725"/>
-            <a:ext cx="3310504" cy="2502967"/>
-          </a:xfrm>
-        </p:spPr>
-        <p:txBody>
-          <a:bodyPr anchor="t">
-            <a:normAutofit/>
-          </a:bodyPr>
-          <a:lstStyle/>
-          <a:p>
-            <a:pPr marL="285750" indent="-285750" algn="l">
-              <a:lnSpc>
-                <a:spcPct val="90000"/>
-              </a:lnSpc>
-              <a:buFont typeface="Wingdings" pitchFamily="2" charset="2"/>
-              <a:buChar char="§"/>
-            </a:pPr>
-            <a:r>
-              <a:rPr lang="en-US" sz="1800" dirty="0">
-                <a:solidFill>
-                  <a:schemeClr val="accent2"/>
-                </a:solidFill>
-              </a:rPr>
-              <a:t>REMOVE OUTLIERS: TOTAL CHARGES &gt; 22,500</a:t>
-            </a:r>
-            <a:br>
-              <a:rPr lang="en-US" sz="1800" dirty="0">
-                <a:solidFill>
-                  <a:schemeClr val="accent2"/>
-                </a:solidFill>
-              </a:rPr>
-            </a:br>
-            <a:br>
-              <a:rPr lang="en-US" sz="2200" dirty="0">
-                <a:solidFill>
-                  <a:schemeClr val="accent2"/>
-                </a:solidFill>
-              </a:rPr>
-            </a:br>
-            <a:r>
-              <a:rPr lang="en-US" sz="1800" dirty="0">
-                <a:solidFill>
-                  <a:schemeClr val="accent2"/>
-                </a:solidFill>
-              </a:rPr>
-              <a:t>After removing 24% of outlier we created a DATA SET  that is applicable to 74% of cases</a:t>
-            </a:r>
-            <a:br>
-              <a:rPr lang="en-US" sz="1800" dirty="0">
-                <a:solidFill>
-                  <a:schemeClr val="accent2"/>
-                </a:solidFill>
-              </a:rPr>
-            </a:br>
-            <a:endParaRPr lang="en-US" sz="1800" dirty="0">
-              <a:solidFill>
-                <a:schemeClr val="accent2"/>
-              </a:solidFill>
-            </a:endParaRPr>
-          </a:p>
-        </p:txBody>
-      </p:sp>
       <p:pic>
         <p:nvPicPr>
           <p:cNvPr id="39" name="Picture 38" descr="A picture containing door, clock, drawing&#10;&#10;Description automatically generated">
@@ -6429,7 +5928,7 @@
 </p:sld>
 </file>
 
-<file path=ppt/slides/slide7.xml><?xml version="1.0" encoding="utf-8"?>
+<file path=ppt/slides/slide13.xml><?xml version="1.0" encoding="utf-8"?>
 <p:sld xmlns:a="http://schemas.openxmlformats.org/drawingml/2006/main" xmlns:r="http://schemas.openxmlformats.org/officeDocument/2006/relationships" xmlns:p="http://schemas.openxmlformats.org/presentationml/2006/main">
   <p:cSld>
     <p:bg>
@@ -6653,7 +6152,7 @@
             <p:nvPr/>
           </p:nvPicPr>
           <p:blipFill>
-            <a:blip r:embed="rId2"/>
+            <a:blip r:embed="rId3"/>
             <a:srcRect/>
             <a:stretch/>
           </p:blipFill>
@@ -6753,7 +6252,7 @@
             <p:nvPr/>
           </p:nvPicPr>
           <p:blipFill>
-            <a:blip r:embed="rId3"/>
+            <a:blip r:embed="rId4"/>
             <a:srcRect/>
             <a:stretch/>
           </p:blipFill>
@@ -6885,7 +6384,562 @@
 </p:sld>
 </file>
 
-<file path=ppt/slides/slide8.xml><?xml version="1.0" encoding="utf-8"?>
+<file path=ppt/slides/slide2.xml><?xml version="1.0" encoding="utf-8"?>
+<p:sld xmlns:a="http://schemas.openxmlformats.org/drawingml/2006/main" xmlns:r="http://schemas.openxmlformats.org/officeDocument/2006/relationships" xmlns:p="http://schemas.openxmlformats.org/presentationml/2006/main">
+  <p:cSld>
+    <p:spTree>
+      <p:nvGrpSpPr>
+        <p:cNvPr id="1" name=""/>
+        <p:cNvGrpSpPr/>
+        <p:nvPr/>
+      </p:nvGrpSpPr>
+      <p:grpSpPr>
+        <a:xfrm>
+          <a:off x="0" y="0"/>
+          <a:ext cx="0" cy="0"/>
+          <a:chOff x="0" y="0"/>
+          <a:chExt cx="0" cy="0"/>
+        </a:xfrm>
+      </p:grpSpPr>
+      <p:sp>
+        <p:nvSpPr>
+          <p:cNvPr id="2" name="Title 1">
+            <a:extLst>
+              <a:ext uri="{FF2B5EF4-FFF2-40B4-BE49-F238E27FC236}">
+                <a16:creationId xmlns:a16="http://schemas.microsoft.com/office/drawing/2014/main" id="{E952DAF5-3E11-E640-BABB-9C5F65800E88}"/>
+              </a:ext>
+            </a:extLst>
+          </p:cNvPr>
+          <p:cNvSpPr>
+            <a:spLocks noGrp="1"/>
+          </p:cNvSpPr>
+          <p:nvPr>
+            <p:ph type="title"/>
+          </p:nvPr>
+        </p:nvSpPr>
+        <p:spPr>
+          <a:xfrm>
+            <a:off x="424447" y="824092"/>
+            <a:ext cx="11029616" cy="988666"/>
+          </a:xfrm>
+        </p:spPr>
+        <p:txBody>
+          <a:bodyPr/>
+          <a:lstStyle/>
+          <a:p>
+            <a:r>
+              <a:rPr lang="en-US" b="1" dirty="0">
+                <a:solidFill>
+                  <a:schemeClr val="accent1"/>
+                </a:solidFill>
+              </a:rPr>
+              <a:t>THE SAMPLE DATA SET</a:t>
+            </a:r>
+            <a:br>
+              <a:rPr lang="en-US" sz="3200" b="1" dirty="0">
+                <a:solidFill>
+                  <a:schemeClr val="accent1"/>
+                </a:solidFill>
+              </a:rPr>
+            </a:br>
+            <a:r>
+              <a:rPr lang="en-US" sz="2400" b="1" dirty="0"/>
+              <a:t>ONE  YEAR OF insurance charges for 1,338 people</a:t>
+            </a:r>
+            <a:br>
+              <a:rPr lang="en-US" sz="2400" b="1" dirty="0"/>
+            </a:br>
+            <a:endParaRPr lang="en-US" sz="2400" b="1" dirty="0">
+              <a:solidFill>
+                <a:schemeClr val="accent1"/>
+              </a:solidFill>
+            </a:endParaRPr>
+          </a:p>
+        </p:txBody>
+      </p:sp>
+      <p:sp>
+        <p:nvSpPr>
+          <p:cNvPr id="11" name="Content Placeholder 10">
+            <a:extLst>
+              <a:ext uri="{FF2B5EF4-FFF2-40B4-BE49-F238E27FC236}">
+                <a16:creationId xmlns:a16="http://schemas.microsoft.com/office/drawing/2014/main" id="{AE544CB2-EF18-B846-9DD3-9E955C2169A9}"/>
+              </a:ext>
+            </a:extLst>
+          </p:cNvPr>
+          <p:cNvSpPr>
+            <a:spLocks noGrp="1"/>
+          </p:cNvSpPr>
+          <p:nvPr>
+            <p:ph idx="1"/>
+          </p:nvPr>
+        </p:nvSpPr>
+        <p:spPr>
+          <a:xfrm>
+            <a:off x="424448" y="1989221"/>
+            <a:ext cx="11186360" cy="4283242"/>
+          </a:xfrm>
+        </p:spPr>
+        <p:txBody>
+          <a:bodyPr anchor="t"/>
+          <a:lstStyle/>
+          <a:p>
+            <a:pPr>
+              <a:buFont typeface="Wingdings" pitchFamily="2" charset="2"/>
+              <a:buChar char="§"/>
+            </a:pPr>
+            <a:r>
+              <a:rPr lang="en-US" sz="2400" b="1" dirty="0">
+                <a:solidFill>
+                  <a:schemeClr val="accent1"/>
+                </a:solidFill>
+              </a:rPr>
+              <a:t> TOTAL CHARGES FOR THE YEAR</a:t>
+            </a:r>
+          </a:p>
+          <a:p>
+            <a:r>
+              <a:rPr lang="en-US" sz="2400" b="1" dirty="0">
+                <a:solidFill>
+                  <a:schemeClr val="accent1"/>
+                </a:solidFill>
+              </a:rPr>
+              <a:t>676 MALES, 662 FEMALES</a:t>
+            </a:r>
+          </a:p>
+          <a:p>
+            <a:r>
+              <a:rPr lang="en-US" sz="2400" b="1" dirty="0">
+                <a:solidFill>
+                  <a:schemeClr val="accent1"/>
+                </a:solidFill>
+              </a:rPr>
+              <a:t>AVERAGE AGE OF 39 </a:t>
+            </a:r>
+          </a:p>
+          <a:p>
+            <a:r>
+              <a:rPr lang="en-US" sz="2400" b="1" dirty="0">
+                <a:solidFill>
+                  <a:schemeClr val="accent1"/>
+                </a:solidFill>
+              </a:rPr>
+              <a:t>BMI,  NUMBER OF CHILDREN,  REGION</a:t>
+            </a:r>
+          </a:p>
+          <a:p>
+            <a:endParaRPr lang="en-US" dirty="0"/>
+          </a:p>
+        </p:txBody>
+      </p:sp>
+    </p:spTree>
+    <p:extLst>
+      <p:ext uri="{BB962C8B-B14F-4D97-AF65-F5344CB8AC3E}">
+        <p14:creationId xmlns:p14="http://schemas.microsoft.com/office/powerpoint/2010/main" val="2874590467"/>
+      </p:ext>
+    </p:extLst>
+  </p:cSld>
+  <p:clrMapOvr>
+    <a:masterClrMapping/>
+  </p:clrMapOvr>
+</p:sld>
+</file>
+
+<file path=ppt/slides/slide3.xml><?xml version="1.0" encoding="utf-8"?>
+<p:sld xmlns:a="http://schemas.openxmlformats.org/drawingml/2006/main" xmlns:r="http://schemas.openxmlformats.org/officeDocument/2006/relationships" xmlns:p="http://schemas.openxmlformats.org/presentationml/2006/main">
+  <p:cSld>
+    <p:spTree>
+      <p:nvGrpSpPr>
+        <p:cNvPr id="1" name=""/>
+        <p:cNvGrpSpPr/>
+        <p:nvPr/>
+      </p:nvGrpSpPr>
+      <p:grpSpPr>
+        <a:xfrm>
+          <a:off x="0" y="0"/>
+          <a:ext cx="0" cy="0"/>
+          <a:chOff x="0" y="0"/>
+          <a:chExt cx="0" cy="0"/>
+        </a:xfrm>
+      </p:grpSpPr>
+      <p:sp>
+        <p:nvSpPr>
+          <p:cNvPr id="4" name="TextBox 3">
+            <a:extLst>
+              <a:ext uri="{FF2B5EF4-FFF2-40B4-BE49-F238E27FC236}">
+                <a16:creationId xmlns:a16="http://schemas.microsoft.com/office/drawing/2014/main" id="{9CEB39A4-E6FD-2449-A5B8-0CE6284D33EB}"/>
+              </a:ext>
+            </a:extLst>
+          </p:cNvPr>
+          <p:cNvSpPr txBox="1"/>
+          <p:nvPr/>
+        </p:nvSpPr>
+        <p:spPr>
+          <a:xfrm>
+            <a:off x="1106908" y="788892"/>
+            <a:ext cx="4828674" cy="1200329"/>
+          </a:xfrm>
+          <a:prstGeom prst="rect">
+            <a:avLst/>
+          </a:prstGeom>
+          <a:noFill/>
+        </p:spPr>
+        <p:txBody>
+          <a:bodyPr wrap="square" rtlCol="0">
+            <a:spAutoFit/>
+          </a:bodyPr>
+          <a:lstStyle/>
+          <a:p>
+            <a:pPr marL="285750" indent="-285750">
+              <a:buFont typeface="Wingdings" pitchFamily="2" charset="2"/>
+              <a:buChar char="§"/>
+            </a:pPr>
+            <a:r>
+              <a:rPr lang="en-US" b="1" dirty="0">
+                <a:solidFill>
+                  <a:schemeClr val="accent1"/>
+                </a:solidFill>
+              </a:rPr>
+              <a:t>BIMODAL, 2 DISTINCT DATA SETS?</a:t>
+            </a:r>
+          </a:p>
+          <a:p>
+            <a:pPr marL="285750" indent="-285750">
+              <a:buFont typeface="Wingdings" pitchFamily="2" charset="2"/>
+              <a:buChar char="§"/>
+            </a:pPr>
+            <a:r>
+              <a:rPr lang="en-US" b="1" dirty="0">
+                <a:solidFill>
+                  <a:schemeClr val="accent1"/>
+                </a:solidFill>
+              </a:rPr>
+              <a:t>UNEXPLAINABLE OUTLIERS</a:t>
+            </a:r>
+          </a:p>
+          <a:p>
+            <a:pPr marL="285750" indent="-285750">
+              <a:buFont typeface="Wingdings" pitchFamily="2" charset="2"/>
+              <a:buChar char="§"/>
+            </a:pPr>
+            <a:r>
+              <a:rPr lang="en-US" b="1" dirty="0">
+                <a:solidFill>
+                  <a:schemeClr val="accent1"/>
+                </a:solidFill>
+              </a:rPr>
+              <a:t>CHARGES INCREASE WITH AGE</a:t>
+            </a:r>
+          </a:p>
+          <a:p>
+            <a:pPr marL="285750" indent="-285750">
+              <a:buFont typeface="Wingdings" pitchFamily="2" charset="2"/>
+              <a:buChar char="§"/>
+            </a:pPr>
+            <a:r>
+              <a:rPr lang="en-US" b="1" dirty="0">
+                <a:solidFill>
+                  <a:schemeClr val="accent1"/>
+                </a:solidFill>
+              </a:rPr>
+              <a:t>SMOKERS PAY MORE</a:t>
+            </a:r>
+          </a:p>
+        </p:txBody>
+      </p:sp>
+      <p:sp>
+        <p:nvSpPr>
+          <p:cNvPr id="7" name="TextBox 6">
+            <a:extLst>
+              <a:ext uri="{FF2B5EF4-FFF2-40B4-BE49-F238E27FC236}">
+                <a16:creationId xmlns:a16="http://schemas.microsoft.com/office/drawing/2014/main" id="{9C361D79-BEB6-AE46-8600-C268459ED428}"/>
+              </a:ext>
+            </a:extLst>
+          </p:cNvPr>
+          <p:cNvSpPr txBox="1"/>
+          <p:nvPr/>
+        </p:nvSpPr>
+        <p:spPr>
+          <a:xfrm>
+            <a:off x="6613489" y="791721"/>
+            <a:ext cx="5085347" cy="1200329"/>
+          </a:xfrm>
+          <a:prstGeom prst="rect">
+            <a:avLst/>
+          </a:prstGeom>
+          <a:noFill/>
+        </p:spPr>
+        <p:txBody>
+          <a:bodyPr wrap="square" rtlCol="0">
+            <a:spAutoFit/>
+          </a:bodyPr>
+          <a:lstStyle/>
+          <a:p>
+            <a:r>
+              <a:rPr lang="en-US" b="1" dirty="0">
+                <a:solidFill>
+                  <a:schemeClr val="accent1"/>
+                </a:solidFill>
+              </a:rPr>
+              <a:t>NON-SMOKERS: 1064</a:t>
+            </a:r>
+          </a:p>
+          <a:p>
+            <a:endParaRPr lang="en-US" b="1" dirty="0">
+              <a:solidFill>
+                <a:schemeClr val="accent1"/>
+              </a:solidFill>
+            </a:endParaRPr>
+          </a:p>
+          <a:p>
+            <a:r>
+              <a:rPr lang="en-US" b="1" dirty="0">
+                <a:solidFill>
+                  <a:schemeClr val="accent1"/>
+                </a:solidFill>
+              </a:rPr>
+              <a:t>SMOKERS: 274</a:t>
+            </a:r>
+          </a:p>
+          <a:p>
+            <a:r>
+              <a:rPr lang="en-US" dirty="0">
+                <a:solidFill>
+                  <a:schemeClr val="tx2"/>
+                </a:solidFill>
+              </a:rPr>
+              <a:t>26% of the data, but 49.5% of the charges</a:t>
+            </a:r>
+            <a:endParaRPr lang="en-US" b="1" dirty="0">
+              <a:solidFill>
+                <a:schemeClr val="accent1"/>
+              </a:solidFill>
+            </a:endParaRPr>
+          </a:p>
+        </p:txBody>
+      </p:sp>
+      <p:pic>
+        <p:nvPicPr>
+          <p:cNvPr id="9" name="Picture 8" descr="Chart, scatter chart&#10;&#10;Description automatically generated">
+            <a:extLst>
+              <a:ext uri="{FF2B5EF4-FFF2-40B4-BE49-F238E27FC236}">
+                <a16:creationId xmlns:a16="http://schemas.microsoft.com/office/drawing/2014/main" id="{9AEBF577-0540-1341-998B-6FFD7BFF9346}"/>
+              </a:ext>
+            </a:extLst>
+          </p:cNvPr>
+          <p:cNvPicPr>
+            <a:picLocks noChangeAspect="1"/>
+          </p:cNvPicPr>
+          <p:nvPr/>
+        </p:nvPicPr>
+        <p:blipFill>
+          <a:blip r:embed="rId3"/>
+          <a:stretch>
+            <a:fillRect/>
+          </a:stretch>
+        </p:blipFill>
+        <p:spPr>
+          <a:xfrm>
+            <a:off x="184221" y="2718079"/>
+            <a:ext cx="6429268" cy="3739660"/>
+          </a:xfrm>
+          <a:prstGeom prst="rect">
+            <a:avLst/>
+          </a:prstGeom>
+        </p:spPr>
+      </p:pic>
+      <p:pic>
+        <p:nvPicPr>
+          <p:cNvPr id="11" name="Picture 10" descr="A picture containing text&#10;&#10;Description automatically generated">
+            <a:extLst>
+              <a:ext uri="{FF2B5EF4-FFF2-40B4-BE49-F238E27FC236}">
+                <a16:creationId xmlns:a16="http://schemas.microsoft.com/office/drawing/2014/main" id="{D3012FB8-A69F-0A4C-A9A3-4A7D56EACDBC}"/>
+              </a:ext>
+            </a:extLst>
+          </p:cNvPr>
+          <p:cNvPicPr>
+            <a:picLocks noChangeAspect="1"/>
+          </p:cNvPicPr>
+          <p:nvPr/>
+        </p:nvPicPr>
+        <p:blipFill>
+          <a:blip r:embed="rId4"/>
+          <a:stretch>
+            <a:fillRect/>
+          </a:stretch>
+        </p:blipFill>
+        <p:spPr>
+          <a:xfrm>
+            <a:off x="713611" y="2715250"/>
+            <a:ext cx="1447800" cy="863600"/>
+          </a:xfrm>
+          <a:prstGeom prst="rect">
+            <a:avLst/>
+          </a:prstGeom>
+        </p:spPr>
+      </p:pic>
+      <p:pic>
+        <p:nvPicPr>
+          <p:cNvPr id="13" name="Picture 12">
+            <a:extLst>
+              <a:ext uri="{FF2B5EF4-FFF2-40B4-BE49-F238E27FC236}">
+                <a16:creationId xmlns:a16="http://schemas.microsoft.com/office/drawing/2014/main" id="{F8A7CEE1-27C9-9A42-8F91-EB21BAD363B8}"/>
+              </a:ext>
+            </a:extLst>
+          </p:cNvPr>
+          <p:cNvPicPr>
+            <a:picLocks noChangeAspect="1"/>
+          </p:cNvPicPr>
+          <p:nvPr/>
+        </p:nvPicPr>
+        <p:blipFill>
+          <a:blip r:embed="rId5"/>
+          <a:srcRect/>
+          <a:stretch/>
+        </p:blipFill>
+        <p:spPr>
+          <a:xfrm>
+            <a:off x="6613489" y="2924955"/>
+            <a:ext cx="5394290" cy="3532784"/>
+          </a:xfrm>
+          <a:prstGeom prst="rect">
+            <a:avLst/>
+          </a:prstGeom>
+        </p:spPr>
+      </p:pic>
+    </p:spTree>
+    <p:extLst>
+      <p:ext uri="{BB962C8B-B14F-4D97-AF65-F5344CB8AC3E}">
+        <p14:creationId xmlns:p14="http://schemas.microsoft.com/office/powerpoint/2010/main" val="3928363096"/>
+      </p:ext>
+    </p:extLst>
+  </p:cSld>
+  <p:clrMapOvr>
+    <a:masterClrMapping/>
+  </p:clrMapOvr>
+</p:sld>
+</file>
+
+<file path=ppt/slides/slide4.xml><?xml version="1.0" encoding="utf-8"?>
+<p:sld xmlns:a="http://schemas.openxmlformats.org/drawingml/2006/main" xmlns:r="http://schemas.openxmlformats.org/officeDocument/2006/relationships" xmlns:p="http://schemas.openxmlformats.org/presentationml/2006/main">
+  <p:cSld>
+    <p:spTree>
+      <p:nvGrpSpPr>
+        <p:cNvPr id="1" name=""/>
+        <p:cNvGrpSpPr/>
+        <p:nvPr/>
+      </p:nvGrpSpPr>
+      <p:grpSpPr>
+        <a:xfrm>
+          <a:off x="0" y="0"/>
+          <a:ext cx="0" cy="0"/>
+          <a:chOff x="0" y="0"/>
+          <a:chExt cx="0" cy="0"/>
+        </a:xfrm>
+      </p:grpSpPr>
+      <p:pic>
+        <p:nvPicPr>
+          <p:cNvPr id="16" name="Picture 15" descr="Chart, bar chart&#10;&#10;Description automatically generated">
+            <a:extLst>
+              <a:ext uri="{FF2B5EF4-FFF2-40B4-BE49-F238E27FC236}">
+                <a16:creationId xmlns:a16="http://schemas.microsoft.com/office/drawing/2014/main" id="{3BCDF3E5-EEF5-2E4C-9C11-2EE3DC3936FA}"/>
+              </a:ext>
+            </a:extLst>
+          </p:cNvPr>
+          <p:cNvPicPr>
+            <a:picLocks noChangeAspect="1"/>
+          </p:cNvPicPr>
+          <p:nvPr/>
+        </p:nvPicPr>
+        <p:blipFill>
+          <a:blip r:embed="rId3"/>
+          <a:stretch>
+            <a:fillRect/>
+          </a:stretch>
+        </p:blipFill>
+        <p:spPr>
+          <a:xfrm>
+            <a:off x="2294020" y="590247"/>
+            <a:ext cx="9420663" cy="5994163"/>
+          </a:xfrm>
+          <a:prstGeom prst="rect">
+            <a:avLst/>
+          </a:prstGeom>
+        </p:spPr>
+      </p:pic>
+      <p:pic>
+        <p:nvPicPr>
+          <p:cNvPr id="6" name="Picture 5" descr="A screenshot of a cell phone&#10;&#10;Description automatically generated">
+            <a:extLst>
+              <a:ext uri="{FF2B5EF4-FFF2-40B4-BE49-F238E27FC236}">
+                <a16:creationId xmlns:a16="http://schemas.microsoft.com/office/drawing/2014/main" id="{9D180E8B-1EF2-494F-9C2D-2F63DAAFB343}"/>
+              </a:ext>
+            </a:extLst>
+          </p:cNvPr>
+          <p:cNvPicPr>
+            <a:picLocks noChangeAspect="1"/>
+          </p:cNvPicPr>
+          <p:nvPr/>
+        </p:nvPicPr>
+        <p:blipFill>
+          <a:blip r:embed="rId4"/>
+          <a:stretch>
+            <a:fillRect/>
+          </a:stretch>
+        </p:blipFill>
+        <p:spPr>
+          <a:xfrm>
+            <a:off x="3656215" y="1909010"/>
+            <a:ext cx="3027233" cy="1490472"/>
+          </a:xfrm>
+          <a:prstGeom prst="rect">
+            <a:avLst/>
+          </a:prstGeom>
+        </p:spPr>
+      </p:pic>
+      <p:pic>
+        <p:nvPicPr>
+          <p:cNvPr id="36" name="Picture 35" descr="A picture containing chart&#10;&#10;Description automatically generated">
+            <a:extLst>
+              <a:ext uri="{FF2B5EF4-FFF2-40B4-BE49-F238E27FC236}">
+                <a16:creationId xmlns:a16="http://schemas.microsoft.com/office/drawing/2014/main" id="{74132C26-58C8-6840-9EB6-893AD60F9C53}"/>
+              </a:ext>
+            </a:extLst>
+          </p:cNvPr>
+          <p:cNvPicPr>
+            <a:picLocks noChangeAspect="1"/>
+          </p:cNvPicPr>
+          <p:nvPr/>
+        </p:nvPicPr>
+        <p:blipFill>
+          <a:blip r:embed="rId5"/>
+          <a:stretch>
+            <a:fillRect/>
+          </a:stretch>
+        </p:blipFill>
+        <p:spPr>
+          <a:xfrm>
+            <a:off x="10889183" y="1145005"/>
+            <a:ext cx="825500" cy="876300"/>
+          </a:xfrm>
+          <a:prstGeom prst="rect">
+            <a:avLst/>
+          </a:prstGeom>
+        </p:spPr>
+      </p:pic>
+    </p:spTree>
+    <p:extLst>
+      <p:ext uri="{BB962C8B-B14F-4D97-AF65-F5344CB8AC3E}">
+        <p14:creationId xmlns:p14="http://schemas.microsoft.com/office/powerpoint/2010/main" val="3230281857"/>
+      </p:ext>
+    </p:extLst>
+  </p:cSld>
+  <p:clrMapOvr>
+    <a:masterClrMapping/>
+  </p:clrMapOvr>
+</p:sld>
+</file>
+
+<file path=ppt/slides/slide5.xml><?xml version="1.0" encoding="utf-8"?>
 <p:sld xmlns:a="http://schemas.openxmlformats.org/drawingml/2006/main" xmlns:r="http://schemas.openxmlformats.org/officeDocument/2006/relationships" xmlns:p="http://schemas.openxmlformats.org/presentationml/2006/main">
   <p:cSld>
     <p:bg>
@@ -6910,487 +6964,12 @@
           <a:chExt cx="0" cy="0"/>
         </a:xfrm>
       </p:grpSpPr>
-      <p:sp useBgFill="1">
-        <p:nvSpPr>
-          <p:cNvPr id="53" name="Rectangle 47">
+      <p:pic>
+        <p:nvPicPr>
+          <p:cNvPr id="19" name="Picture 18" descr="Chart, scatter chart&#10;&#10;Description automatically generated">
             <a:extLst>
               <a:ext uri="{FF2B5EF4-FFF2-40B4-BE49-F238E27FC236}">
-                <a16:creationId xmlns:a16="http://schemas.microsoft.com/office/drawing/2014/main" id="{A21E7785-3D2D-4FF8-9C82-42CE9DBD7BB9}"/>
-              </a:ext>
-              <a:ext uri="{C183D7F6-B498-43B3-948B-1728B52AA6E4}">
-                <adec:decorative xmlns:adec="http://schemas.microsoft.com/office/drawing/2017/decorative" val="1"/>
-              </a:ext>
-            </a:extLst>
-          </p:cNvPr>
-          <p:cNvSpPr>
-            <a:spLocks noGrp="1" noRot="1" noChangeAspect="1" noMove="1" noResize="1" noEditPoints="1" noAdjustHandles="1" noChangeArrowheads="1" noChangeShapeType="1" noTextEdit="1"/>
-          </p:cNvSpPr>
-          <p:nvPr>
-            <p:extLst>
-              <p:ext uri="{386F3935-93C4-4BCD-93E2-E3B085C9AB24}">
-                <p16:designElem xmlns:p16="http://schemas.microsoft.com/office/powerpoint/2015/main" val="1"/>
-              </p:ext>
-            </p:extLst>
-          </p:nvPr>
-        </p:nvSpPr>
-        <p:spPr>
-          <a:xfrm>
-            <a:off x="0" y="548641"/>
-            <a:ext cx="12191999" cy="6309360"/>
-          </a:xfrm>
-          <a:prstGeom prst="rect">
-            <a:avLst/>
-          </a:prstGeom>
-          <a:ln>
-            <a:noFill/>
-          </a:ln>
-        </p:spPr>
-        <p:style>
-          <a:lnRef idx="2">
-            <a:schemeClr val="accent1">
-              <a:shade val="50000"/>
-            </a:schemeClr>
-          </a:lnRef>
-          <a:fillRef idx="1">
-            <a:schemeClr val="accent1"/>
-          </a:fillRef>
-          <a:effectRef idx="0">
-            <a:schemeClr val="accent1"/>
-          </a:effectRef>
-          <a:fontRef idx="minor">
-            <a:schemeClr val="lt1"/>
-          </a:fontRef>
-        </p:style>
-        <p:txBody>
-          <a:bodyPr rtlCol="0" anchor="ctr"/>
-          <a:lstStyle/>
-          <a:p>
-            <a:pPr algn="ctr"/>
-            <a:endParaRPr lang="en-US"/>
-          </a:p>
-        </p:txBody>
-      </p:sp>
-      <p:sp>
-        <p:nvSpPr>
-          <p:cNvPr id="55" name="Rectangle 49">
-            <a:extLst>
-              <a:ext uri="{FF2B5EF4-FFF2-40B4-BE49-F238E27FC236}">
-                <a16:creationId xmlns:a16="http://schemas.microsoft.com/office/drawing/2014/main" id="{9911E146-5AE8-4892-B0B5-42052873B9E5}"/>
-              </a:ext>
-              <a:ext uri="{C183D7F6-B498-43B3-948B-1728B52AA6E4}">
-                <adec:decorative xmlns:adec="http://schemas.microsoft.com/office/drawing/2017/decorative" val="1"/>
-              </a:ext>
-            </a:extLst>
-          </p:cNvPr>
-          <p:cNvSpPr>
-            <a:spLocks noGrp="1" noRot="1" noChangeAspect="1" noMove="1" noResize="1" noEditPoints="1" noAdjustHandles="1" noChangeArrowheads="1" noChangeShapeType="1" noTextEdit="1"/>
-          </p:cNvSpPr>
-          <p:nvPr>
-            <p:extLst>
-              <p:ext uri="{386F3935-93C4-4BCD-93E2-E3B085C9AB24}">
-                <p16:designElem xmlns:p16="http://schemas.microsoft.com/office/powerpoint/2015/main" val="1"/>
-              </p:ext>
-            </p:extLst>
-          </p:nvPr>
-        </p:nvSpPr>
-        <p:spPr>
-          <a:xfrm>
-            <a:off x="442377" y="3194092"/>
-            <a:ext cx="3705323" cy="3206708"/>
-          </a:xfrm>
-          <a:prstGeom prst="rect">
-            <a:avLst/>
-          </a:prstGeom>
-          <a:solidFill>
-            <a:schemeClr val="accent1"/>
-          </a:solidFill>
-          <a:ln>
-            <a:noFill/>
-          </a:ln>
-          <a:effectLst/>
-        </p:spPr>
-        <p:style>
-          <a:lnRef idx="1">
-            <a:schemeClr val="accent1"/>
-          </a:lnRef>
-          <a:fillRef idx="3">
-            <a:schemeClr val="accent1"/>
-          </a:fillRef>
-          <a:effectRef idx="2">
-            <a:schemeClr val="accent1"/>
-          </a:effectRef>
-          <a:fontRef idx="minor">
-            <a:schemeClr val="lt1"/>
-          </a:fontRef>
-        </p:style>
-      </p:sp>
-      <p:sp>
-        <p:nvSpPr>
-          <p:cNvPr id="2" name="Title 1">
-            <a:extLst>
-              <a:ext uri="{FF2B5EF4-FFF2-40B4-BE49-F238E27FC236}">
-                <a16:creationId xmlns:a16="http://schemas.microsoft.com/office/drawing/2014/main" id="{331C21C6-7084-FE4F-8FC4-AD73E7446C3F}"/>
-              </a:ext>
-            </a:extLst>
-          </p:cNvPr>
-          <p:cNvSpPr>
-            <a:spLocks noGrp="1"/>
-          </p:cNvSpPr>
-          <p:nvPr>
-            <p:ph type="title"/>
-          </p:nvPr>
-        </p:nvSpPr>
-        <p:spPr>
-          <a:xfrm>
-            <a:off x="593253" y="3425294"/>
-            <a:ext cx="3397924" cy="2800478"/>
-          </a:xfrm>
-        </p:spPr>
-        <p:txBody>
-          <a:bodyPr anchor="ctr">
-            <a:normAutofit/>
-          </a:bodyPr>
-          <a:lstStyle/>
-          <a:p>
-            <a:pPr>
-              <a:lnSpc>
-                <a:spcPct val="90000"/>
-              </a:lnSpc>
-            </a:pPr>
-            <a:r>
-              <a:rPr lang="en-US" sz="2600">
-                <a:solidFill>
-                  <a:srgbClr val="FFFFFF"/>
-                </a:solidFill>
-              </a:rPr>
-              <a:t>When we look only at the non-smokers, WE SEE WOMEN’S CHARGES ARE 13% HIGHER regardless of region</a:t>
-            </a:r>
-          </a:p>
-        </p:txBody>
-      </p:sp>
-      <p:sp>
-        <p:nvSpPr>
-          <p:cNvPr id="57" name="Rectangle 51">
-            <a:extLst>
-              <a:ext uri="{FF2B5EF4-FFF2-40B4-BE49-F238E27FC236}">
-                <a16:creationId xmlns:a16="http://schemas.microsoft.com/office/drawing/2014/main" id="{978A552A-290C-474C-9CC8-401379CD133C}"/>
-              </a:ext>
-              <a:ext uri="{C183D7F6-B498-43B3-948B-1728B52AA6E4}">
-                <adec:decorative xmlns:adec="http://schemas.microsoft.com/office/drawing/2017/decorative" val="1"/>
-              </a:ext>
-            </a:extLst>
-          </p:cNvPr>
-          <p:cNvSpPr>
-            <a:spLocks noGrp="1" noRot="1" noChangeAspect="1" noMove="1" noResize="1" noEditPoints="1" noAdjustHandles="1" noChangeArrowheads="1" noChangeShapeType="1" noTextEdit="1"/>
-          </p:cNvSpPr>
-          <p:nvPr>
-            <p:extLst>
-              <p:ext uri="{386F3935-93C4-4BCD-93E2-E3B085C9AB24}">
-                <p16:designElem xmlns:p16="http://schemas.microsoft.com/office/powerpoint/2015/main" val="1"/>
-              </p:ext>
-            </p:extLst>
-          </p:nvPr>
-        </p:nvSpPr>
-        <p:spPr>
-          <a:xfrm>
-            <a:off x="446534" y="457200"/>
-            <a:ext cx="3703320" cy="94997"/>
-          </a:xfrm>
-          <a:prstGeom prst="rect">
-            <a:avLst/>
-          </a:prstGeom>
-          <a:solidFill>
-            <a:schemeClr val="accent1"/>
-          </a:solidFill>
-          <a:ln>
-            <a:noFill/>
-          </a:ln>
-          <a:effectLst/>
-        </p:spPr>
-        <p:style>
-          <a:lnRef idx="1">
-            <a:schemeClr val="accent1"/>
-          </a:lnRef>
-          <a:fillRef idx="3">
-            <a:schemeClr val="accent1"/>
-          </a:fillRef>
-          <a:effectRef idx="2">
-            <a:schemeClr val="accent1"/>
-          </a:effectRef>
-          <a:fontRef idx="minor">
-            <a:schemeClr val="lt1"/>
-          </a:fontRef>
-        </p:style>
-      </p:sp>
-      <p:sp>
-        <p:nvSpPr>
-          <p:cNvPr id="59" name="Rectangle 53">
-            <a:extLst>
-              <a:ext uri="{FF2B5EF4-FFF2-40B4-BE49-F238E27FC236}">
-                <a16:creationId xmlns:a16="http://schemas.microsoft.com/office/drawing/2014/main" id="{57D8432A-7050-43CE-AC0E-48F00C7D5232}"/>
-              </a:ext>
-              <a:ext uri="{C183D7F6-B498-43B3-948B-1728B52AA6E4}">
-                <adec:decorative xmlns:adec="http://schemas.microsoft.com/office/drawing/2017/decorative" val="1"/>
-              </a:ext>
-            </a:extLst>
-          </p:cNvPr>
-          <p:cNvSpPr>
-            <a:spLocks noGrp="1" noRot="1" noChangeAspect="1" noMove="1" noResize="1" noEditPoints="1" noAdjustHandles="1" noChangeArrowheads="1" noChangeShapeType="1" noTextEdit="1"/>
-          </p:cNvSpPr>
-          <p:nvPr>
-            <p:extLst>
-              <p:ext uri="{386F3935-93C4-4BCD-93E2-E3B085C9AB24}">
-                <p16:designElem xmlns:p16="http://schemas.microsoft.com/office/powerpoint/2015/main" val="1"/>
-              </p:ext>
-            </p:extLst>
-          </p:nvPr>
-        </p:nvSpPr>
-        <p:spPr>
-          <a:xfrm>
-            <a:off x="4241830" y="457200"/>
-            <a:ext cx="3703320" cy="91440"/>
-          </a:xfrm>
-          <a:prstGeom prst="rect">
-            <a:avLst/>
-          </a:prstGeom>
-          <a:solidFill>
-            <a:schemeClr val="accent2"/>
-          </a:solidFill>
-          <a:ln>
-            <a:noFill/>
-          </a:ln>
-          <a:effectLst/>
-        </p:spPr>
-        <p:style>
-          <a:lnRef idx="1">
-            <a:schemeClr val="accent1"/>
-          </a:lnRef>
-          <a:fillRef idx="3">
-            <a:schemeClr val="accent1"/>
-          </a:fillRef>
-          <a:effectRef idx="2">
-            <a:schemeClr val="accent1"/>
-          </a:effectRef>
-          <a:fontRef idx="minor">
-            <a:schemeClr val="lt1"/>
-          </a:fontRef>
-        </p:style>
-      </p:sp>
-      <p:sp>
-        <p:nvSpPr>
-          <p:cNvPr id="61" name="Rectangle 55">
-            <a:extLst>
-              <a:ext uri="{FF2B5EF4-FFF2-40B4-BE49-F238E27FC236}">
-                <a16:creationId xmlns:a16="http://schemas.microsoft.com/office/drawing/2014/main" id="{55B5BA19-E267-49E0-A8F7-3435C91189DE}"/>
-              </a:ext>
-              <a:ext uri="{C183D7F6-B498-43B3-948B-1728B52AA6E4}">
-                <adec:decorative xmlns:adec="http://schemas.microsoft.com/office/drawing/2017/decorative" val="1"/>
-              </a:ext>
-            </a:extLst>
-          </p:cNvPr>
-          <p:cNvSpPr>
-            <a:spLocks noGrp="1" noRot="1" noChangeAspect="1" noMove="1" noResize="1" noEditPoints="1" noAdjustHandles="1" noChangeArrowheads="1" noChangeShapeType="1" noTextEdit="1"/>
-          </p:cNvSpPr>
-          <p:nvPr>
-            <p:extLst>
-              <p:ext uri="{386F3935-93C4-4BCD-93E2-E3B085C9AB24}">
-                <p16:designElem xmlns:p16="http://schemas.microsoft.com/office/powerpoint/2015/main" val="1"/>
-              </p:ext>
-            </p:extLst>
-          </p:nvPr>
-        </p:nvSpPr>
-        <p:spPr>
-          <a:xfrm>
-            <a:off x="8042147" y="453643"/>
-            <a:ext cx="3703320" cy="98554"/>
-          </a:xfrm>
-          <a:prstGeom prst="rect">
-            <a:avLst/>
-          </a:prstGeom>
-          <a:solidFill>
-            <a:schemeClr val="accent4"/>
-          </a:solidFill>
-          <a:ln>
-            <a:noFill/>
-          </a:ln>
-          <a:effectLst/>
-        </p:spPr>
-        <p:style>
-          <a:lnRef idx="1">
-            <a:schemeClr val="accent1"/>
-          </a:lnRef>
-          <a:fillRef idx="3">
-            <a:schemeClr val="accent1"/>
-          </a:fillRef>
-          <a:effectRef idx="2">
-            <a:schemeClr val="accent1"/>
-          </a:effectRef>
-          <a:fontRef idx="minor">
-            <a:schemeClr val="lt1"/>
-          </a:fontRef>
-        </p:style>
-      </p:sp>
-      <p:sp>
-        <p:nvSpPr>
-          <p:cNvPr id="63" name="Rectangle 57">
-            <a:extLst>
-              <a:ext uri="{FF2B5EF4-FFF2-40B4-BE49-F238E27FC236}">
-                <a16:creationId xmlns:a16="http://schemas.microsoft.com/office/drawing/2014/main" id="{D19504FF-266B-4F6E-BAA1-DF9730E90020}"/>
-              </a:ext>
-              <a:ext uri="{C183D7F6-B498-43B3-948B-1728B52AA6E4}">
-                <adec:decorative xmlns:adec="http://schemas.microsoft.com/office/drawing/2017/decorative" val="1"/>
-              </a:ext>
-            </a:extLst>
-          </p:cNvPr>
-          <p:cNvSpPr>
-            <a:spLocks noGrp="1" noRot="1" noChangeAspect="1" noMove="1" noResize="1" noEditPoints="1" noAdjustHandles="1" noChangeArrowheads="1" noChangeShapeType="1" noTextEdit="1"/>
-          </p:cNvSpPr>
-          <p:nvPr>
-            <p:extLst>
-              <p:ext uri="{386F3935-93C4-4BCD-93E2-E3B085C9AB24}">
-                <p16:designElem xmlns:p16="http://schemas.microsoft.com/office/powerpoint/2015/main" val="1"/>
-              </p:ext>
-            </p:extLst>
-          </p:nvPr>
-        </p:nvSpPr>
-        <p:spPr>
-          <a:xfrm>
-            <a:off x="442377" y="654222"/>
-            <a:ext cx="3702878" cy="2437844"/>
-          </a:xfrm>
-          <a:prstGeom prst="rect">
-            <a:avLst/>
-          </a:prstGeom>
-          <a:noFill/>
-          <a:ln w="19050">
-            <a:solidFill>
-              <a:schemeClr val="accent4"/>
-            </a:solidFill>
-          </a:ln>
-        </p:spPr>
-        <p:style>
-          <a:lnRef idx="2">
-            <a:schemeClr val="accent1">
-              <a:shade val="50000"/>
-            </a:schemeClr>
-          </a:lnRef>
-          <a:fillRef idx="1">
-            <a:schemeClr val="accent1"/>
-          </a:fillRef>
-          <a:effectRef idx="0">
-            <a:schemeClr val="accent1"/>
-          </a:effectRef>
-          <a:fontRef idx="minor">
-            <a:schemeClr val="lt1"/>
-          </a:fontRef>
-        </p:style>
-        <p:txBody>
-          <a:bodyPr rtlCol="0" anchor="ctr"/>
-          <a:lstStyle/>
-          <a:p>
-            <a:pPr algn="ctr"/>
-            <a:endParaRPr lang="en-US"/>
-          </a:p>
-        </p:txBody>
-      </p:sp>
-      <p:pic>
-        <p:nvPicPr>
-          <p:cNvPr id="16" name="Picture 15" descr="A screenshot of a cell phone&#10;&#10;Description automatically generated">
-            <a:extLst>
-              <a:ext uri="{FF2B5EF4-FFF2-40B4-BE49-F238E27FC236}">
-                <a16:creationId xmlns:a16="http://schemas.microsoft.com/office/drawing/2014/main" id="{435AF26C-8AA4-D245-8478-DC929CCF3A03}"/>
-              </a:ext>
-            </a:extLst>
-          </p:cNvPr>
-          <p:cNvPicPr>
-            <a:picLocks noChangeAspect="1"/>
-          </p:cNvPicPr>
-          <p:nvPr/>
-        </p:nvPicPr>
-        <p:blipFill rotWithShape="1">
-          <a:blip r:embed="rId2"/>
-          <a:srcRect t="9209" r="2" b="4809"/>
-          <a:stretch/>
-        </p:blipFill>
-        <p:spPr>
-          <a:xfrm>
-            <a:off x="873473" y="780711"/>
-            <a:ext cx="2837481" cy="2167476"/>
-          </a:xfrm>
-          <a:prstGeom prst="rect">
-            <a:avLst/>
-          </a:prstGeom>
-        </p:spPr>
-      </p:pic>
-      <p:sp>
-        <p:nvSpPr>
-          <p:cNvPr id="64" name="Rectangle 59">
-            <a:extLst>
-              <a:ext uri="{FF2B5EF4-FFF2-40B4-BE49-F238E27FC236}">
-                <a16:creationId xmlns:a16="http://schemas.microsoft.com/office/drawing/2014/main" id="{6464F78D-891F-49EC-ADDE-5E581A66ACA9}"/>
-              </a:ext>
-              <a:ext uri="{C183D7F6-B498-43B3-948B-1728B52AA6E4}">
-                <adec:decorative xmlns:adec="http://schemas.microsoft.com/office/drawing/2017/decorative" val="1"/>
-              </a:ext>
-            </a:extLst>
-          </p:cNvPr>
-          <p:cNvSpPr>
-            <a:spLocks noGrp="1" noRot="1" noChangeAspect="1" noMove="1" noResize="1" noEditPoints="1" noAdjustHandles="1" noChangeArrowheads="1" noChangeShapeType="1" noTextEdit="1"/>
-          </p:cNvSpPr>
-          <p:nvPr>
-            <p:extLst>
-              <p:ext uri="{386F3935-93C4-4BCD-93E2-E3B085C9AB24}">
-                <p16:designElem xmlns:p16="http://schemas.microsoft.com/office/powerpoint/2015/main" val="1"/>
-              </p:ext>
-            </p:extLst>
-          </p:nvPr>
-        </p:nvSpPr>
-        <p:spPr>
-          <a:xfrm>
-            <a:off x="4240312" y="654222"/>
-            <a:ext cx="3702878" cy="2437844"/>
-          </a:xfrm>
-          <a:prstGeom prst="rect">
-            <a:avLst/>
-          </a:prstGeom>
-          <a:noFill/>
-          <a:ln w="19050">
-            <a:solidFill>
-              <a:schemeClr val="accent4"/>
-            </a:solidFill>
-          </a:ln>
-        </p:spPr>
-        <p:style>
-          <a:lnRef idx="2">
-            <a:schemeClr val="accent1">
-              <a:shade val="50000"/>
-            </a:schemeClr>
-          </a:lnRef>
-          <a:fillRef idx="1">
-            <a:schemeClr val="accent1"/>
-          </a:fillRef>
-          <a:effectRef idx="0">
-            <a:schemeClr val="accent1"/>
-          </a:effectRef>
-          <a:fontRef idx="minor">
-            <a:schemeClr val="lt1"/>
-          </a:fontRef>
-        </p:style>
-        <p:txBody>
-          <a:bodyPr rtlCol="0" anchor="ctr"/>
-          <a:lstStyle/>
-          <a:p>
-            <a:pPr algn="ctr"/>
-            <a:endParaRPr lang="en-US"/>
-          </a:p>
-        </p:txBody>
-      </p:sp>
-      <p:pic>
-        <p:nvPicPr>
-          <p:cNvPr id="28" name="Picture 27" descr="A screenshot of a cell phone&#10;&#10;Description automatically generated">
-            <a:extLst>
-              <a:ext uri="{FF2B5EF4-FFF2-40B4-BE49-F238E27FC236}">
-                <a16:creationId xmlns:a16="http://schemas.microsoft.com/office/drawing/2014/main" id="{5218AD00-53C0-3843-9C3A-7F1857EDAE0B}"/>
+                <a16:creationId xmlns:a16="http://schemas.microsoft.com/office/drawing/2014/main" id="{15BBFD67-1BC4-604C-B5A9-7BB300543B88}"/>
               </a:ext>
             </a:extLst>
           </p:cNvPr>
@@ -7407,20 +6986,432 @@
         </p:blipFill>
         <p:spPr>
           <a:xfrm>
-            <a:off x="4391187" y="797468"/>
-            <a:ext cx="3392496" cy="2130552"/>
+            <a:off x="4229337" y="1785905"/>
+            <a:ext cx="7930579" cy="5027883"/>
           </a:xfrm>
           <a:prstGeom prst="rect">
             <a:avLst/>
           </a:prstGeom>
         </p:spPr>
       </p:pic>
+      <p:sp>
+        <p:nvSpPr>
+          <p:cNvPr id="2" name="Title 1">
+            <a:extLst>
+              <a:ext uri="{FF2B5EF4-FFF2-40B4-BE49-F238E27FC236}">
+                <a16:creationId xmlns:a16="http://schemas.microsoft.com/office/drawing/2014/main" id="{9901A9B4-B103-744A-9D25-8AEFEAE1BEF2}"/>
+              </a:ext>
+            </a:extLst>
+          </p:cNvPr>
+          <p:cNvSpPr>
+            <a:spLocks noGrp="1"/>
+          </p:cNvSpPr>
+          <p:nvPr>
+            <p:ph type="title"/>
+          </p:nvPr>
+        </p:nvSpPr>
+        <p:spPr>
+          <a:xfrm>
+            <a:off x="1596189" y="760864"/>
+            <a:ext cx="8999621" cy="461666"/>
+          </a:xfrm>
+        </p:spPr>
+        <p:txBody>
+          <a:bodyPr anchor="t">
+            <a:normAutofit/>
+          </a:bodyPr>
+          <a:lstStyle/>
+          <a:p>
+            <a:pPr>
+              <a:lnSpc>
+                <a:spcPct val="90000"/>
+              </a:lnSpc>
+            </a:pPr>
+            <a:r>
+              <a:rPr lang="en-US" sz="2400" dirty="0">
+                <a:solidFill>
+                  <a:schemeClr val="accent2"/>
+                </a:solidFill>
+              </a:rPr>
+              <a:t>Non-smokers only with charges under $22,500</a:t>
+            </a:r>
+            <a:br>
+              <a:rPr lang="en-US" sz="1800" dirty="0">
+                <a:solidFill>
+                  <a:schemeClr val="accent2"/>
+                </a:solidFill>
+              </a:rPr>
+            </a:br>
+            <a:br>
+              <a:rPr lang="en-US" sz="2200" dirty="0">
+                <a:solidFill>
+                  <a:schemeClr val="accent2"/>
+                </a:solidFill>
+              </a:rPr>
+            </a:br>
+            <a:br>
+              <a:rPr lang="en-US" sz="1800" dirty="0">
+                <a:solidFill>
+                  <a:schemeClr val="accent2"/>
+                </a:solidFill>
+              </a:rPr>
+            </a:br>
+            <a:endParaRPr lang="en-US" sz="1800" dirty="0">
+              <a:solidFill>
+                <a:schemeClr val="accent2"/>
+              </a:solidFill>
+            </a:endParaRPr>
+          </a:p>
+        </p:txBody>
+      </p:sp>
+      <p:grpSp>
+        <p:nvGrpSpPr>
+          <p:cNvPr id="7" name="Group 6">
+            <a:extLst>
+              <a:ext uri="{FF2B5EF4-FFF2-40B4-BE49-F238E27FC236}">
+                <a16:creationId xmlns:a16="http://schemas.microsoft.com/office/drawing/2014/main" id="{6BED9D5E-74F5-5543-BA46-DE9F0C4230A2}"/>
+              </a:ext>
+            </a:extLst>
+          </p:cNvPr>
+          <p:cNvGrpSpPr/>
+          <p:nvPr/>
+        </p:nvGrpSpPr>
+        <p:grpSpPr>
+          <a:xfrm>
+            <a:off x="134456" y="4012218"/>
+            <a:ext cx="3336800" cy="2486575"/>
+            <a:chOff x="299551" y="3613660"/>
+            <a:chExt cx="4113858" cy="3019215"/>
+          </a:xfrm>
+        </p:grpSpPr>
+        <p:pic>
+          <p:nvPicPr>
+            <p:cNvPr id="8" name="Content Placeholder 8">
+              <a:extLst>
+                <a:ext uri="{FF2B5EF4-FFF2-40B4-BE49-F238E27FC236}">
+                  <a16:creationId xmlns:a16="http://schemas.microsoft.com/office/drawing/2014/main" id="{CB4858BF-695F-7842-8F0A-FA5C12F5F83E}"/>
+                </a:ext>
+              </a:extLst>
+            </p:cNvPr>
+            <p:cNvPicPr>
+              <a:picLocks noChangeAspect="1"/>
+            </p:cNvPicPr>
+            <p:nvPr/>
+          </p:nvPicPr>
+          <p:blipFill>
+            <a:blip r:embed="rId4"/>
+            <a:srcRect/>
+            <a:stretch/>
+          </p:blipFill>
+          <p:spPr>
+            <a:xfrm>
+              <a:off x="299551" y="3648544"/>
+              <a:ext cx="4113858" cy="2984331"/>
+            </a:xfrm>
+            <a:prstGeom prst="rect">
+              <a:avLst/>
+            </a:prstGeom>
+          </p:spPr>
+        </p:pic>
+        <p:sp>
+          <p:nvSpPr>
+            <p:cNvPr id="9" name="Oval 8">
+              <a:extLst>
+                <a:ext uri="{FF2B5EF4-FFF2-40B4-BE49-F238E27FC236}">
+                  <a16:creationId xmlns:a16="http://schemas.microsoft.com/office/drawing/2014/main" id="{750B9220-3FE0-B14D-94A4-9941D0572BFD}"/>
+                </a:ext>
+              </a:extLst>
+            </p:cNvPr>
+            <p:cNvSpPr/>
+            <p:nvPr/>
+          </p:nvSpPr>
+          <p:spPr>
+            <a:xfrm rot="20936872">
+              <a:off x="2918121" y="3613660"/>
+              <a:ext cx="893504" cy="832982"/>
+            </a:xfrm>
+            <a:prstGeom prst="ellipse">
+              <a:avLst/>
+            </a:prstGeom>
+            <a:noFill/>
+            <a:ln>
+              <a:solidFill>
+                <a:srgbClr val="FF0000"/>
+              </a:solidFill>
+            </a:ln>
+          </p:spPr>
+          <p:style>
+            <a:lnRef idx="1">
+              <a:schemeClr val="accent1"/>
+            </a:lnRef>
+            <a:fillRef idx="3">
+              <a:schemeClr val="accent1"/>
+            </a:fillRef>
+            <a:effectRef idx="2">
+              <a:schemeClr val="accent1"/>
+            </a:effectRef>
+            <a:fontRef idx="minor">
+              <a:schemeClr val="lt1"/>
+            </a:fontRef>
+          </p:style>
+          <p:txBody>
+            <a:bodyPr rtlCol="0" anchor="ctr"/>
+            <a:lstStyle/>
+            <a:p>
+              <a:pPr algn="ctr"/>
+              <a:endParaRPr lang="en-US"/>
+            </a:p>
+          </p:txBody>
+        </p:sp>
+      </p:grpSp>
+      <p:grpSp>
+        <p:nvGrpSpPr>
+          <p:cNvPr id="10" name="Group 9">
+            <a:extLst>
+              <a:ext uri="{FF2B5EF4-FFF2-40B4-BE49-F238E27FC236}">
+                <a16:creationId xmlns:a16="http://schemas.microsoft.com/office/drawing/2014/main" id="{CDB5C8D3-CB6E-6D48-B4D7-E758BB770794}"/>
+              </a:ext>
+            </a:extLst>
+          </p:cNvPr>
+          <p:cNvGrpSpPr/>
+          <p:nvPr/>
+        </p:nvGrpSpPr>
+        <p:grpSpPr>
+          <a:xfrm>
+            <a:off x="152761" y="1309237"/>
+            <a:ext cx="3300191" cy="2448812"/>
+            <a:chOff x="7306286" y="3616915"/>
+            <a:chExt cx="3752149" cy="2784174"/>
+          </a:xfrm>
+        </p:grpSpPr>
+        <p:pic>
+          <p:nvPicPr>
+            <p:cNvPr id="11" name="Picture 10">
+              <a:extLst>
+                <a:ext uri="{FF2B5EF4-FFF2-40B4-BE49-F238E27FC236}">
+                  <a16:creationId xmlns:a16="http://schemas.microsoft.com/office/drawing/2014/main" id="{9222F638-F296-2B48-83AE-8318CB81FBCA}"/>
+                </a:ext>
+              </a:extLst>
+            </p:cNvPr>
+            <p:cNvPicPr>
+              <a:picLocks noChangeAspect="1"/>
+            </p:cNvPicPr>
+            <p:nvPr/>
+          </p:nvPicPr>
+          <p:blipFill>
+            <a:blip r:embed="rId5"/>
+            <a:srcRect/>
+            <a:stretch/>
+          </p:blipFill>
+          <p:spPr>
+            <a:xfrm>
+              <a:off x="7306286" y="3679154"/>
+              <a:ext cx="3752149" cy="2721935"/>
+            </a:xfrm>
+            <a:prstGeom prst="rect">
+              <a:avLst/>
+            </a:prstGeom>
+          </p:spPr>
+        </p:pic>
+        <p:sp>
+          <p:nvSpPr>
+            <p:cNvPr id="12" name="Oval 11">
+              <a:extLst>
+                <a:ext uri="{FF2B5EF4-FFF2-40B4-BE49-F238E27FC236}">
+                  <a16:creationId xmlns:a16="http://schemas.microsoft.com/office/drawing/2014/main" id="{E447E6C0-15D0-174D-A3C5-770DA73B1F9C}"/>
+                </a:ext>
+              </a:extLst>
+            </p:cNvPr>
+            <p:cNvSpPr/>
+            <p:nvPr/>
+          </p:nvSpPr>
+          <p:spPr>
+            <a:xfrm rot="20936872">
+              <a:off x="9607944" y="3616915"/>
+              <a:ext cx="926836" cy="826468"/>
+            </a:xfrm>
+            <a:prstGeom prst="ellipse">
+              <a:avLst/>
+            </a:prstGeom>
+            <a:noFill/>
+            <a:ln>
+              <a:solidFill>
+                <a:srgbClr val="FF0000"/>
+              </a:solidFill>
+            </a:ln>
+          </p:spPr>
+          <p:style>
+            <a:lnRef idx="1">
+              <a:schemeClr val="accent1"/>
+            </a:lnRef>
+            <a:fillRef idx="3">
+              <a:schemeClr val="accent1"/>
+            </a:fillRef>
+            <a:effectRef idx="2">
+              <a:schemeClr val="accent1"/>
+            </a:effectRef>
+            <a:fontRef idx="minor">
+              <a:schemeClr val="lt1"/>
+            </a:fontRef>
+          </p:style>
+          <p:txBody>
+            <a:bodyPr rtlCol="0" anchor="ctr"/>
+            <a:lstStyle/>
+            <a:p>
+              <a:pPr algn="ctr"/>
+              <a:endParaRPr lang="en-US"/>
+            </a:p>
+          </p:txBody>
+        </p:sp>
+      </p:grpSp>
       <p:pic>
         <p:nvPicPr>
-          <p:cNvPr id="23" name="Picture 22" descr="A screenshot of a cell phone&#10;&#10;Description automatically generated">
+          <p:cNvPr id="17" name="Picture 16" descr="A picture containing graphical user interface&#10;&#10;Description automatically generated">
             <a:extLst>
               <a:ext uri="{FF2B5EF4-FFF2-40B4-BE49-F238E27FC236}">
-                <a16:creationId xmlns:a16="http://schemas.microsoft.com/office/drawing/2014/main" id="{73F9B532-B43B-3F45-BE06-979F7F3A8811}"/>
+                <a16:creationId xmlns:a16="http://schemas.microsoft.com/office/drawing/2014/main" id="{0EA111F4-AD03-404E-BAF5-C2A61B0D50F2}"/>
+              </a:ext>
+            </a:extLst>
+          </p:cNvPr>
+          <p:cNvPicPr>
+            <a:picLocks noChangeAspect="1"/>
+          </p:cNvPicPr>
+          <p:nvPr/>
+        </p:nvPicPr>
+        <p:blipFill>
+          <a:blip r:embed="rId6"/>
+          <a:stretch>
+            <a:fillRect/>
+          </a:stretch>
+        </p:blipFill>
+        <p:spPr>
+          <a:xfrm>
+            <a:off x="11366045" y="1659766"/>
+            <a:ext cx="673194" cy="601386"/>
+          </a:xfrm>
+          <a:prstGeom prst="rect">
+            <a:avLst/>
+          </a:prstGeom>
+        </p:spPr>
+      </p:pic>
+    </p:spTree>
+    <p:extLst>
+      <p:ext uri="{BB962C8B-B14F-4D97-AF65-F5344CB8AC3E}">
+        <p14:creationId xmlns:p14="http://schemas.microsoft.com/office/powerpoint/2010/main" val="847540855"/>
+      </p:ext>
+    </p:extLst>
+  </p:cSld>
+  <p:clrMapOvr>
+    <a:masterClrMapping/>
+  </p:clrMapOvr>
+</p:sld>
+</file>
+
+<file path=ppt/slides/slide6.xml><?xml version="1.0" encoding="utf-8"?>
+<p:sld xmlns:a="http://schemas.openxmlformats.org/drawingml/2006/main" xmlns:r="http://schemas.openxmlformats.org/officeDocument/2006/relationships" xmlns:p="http://schemas.openxmlformats.org/presentationml/2006/main">
+  <p:cSld>
+    <p:bg>
+      <p:bgPr>
+        <a:solidFill>
+          <a:schemeClr val="bg1"/>
+        </a:solidFill>
+        <a:effectLst/>
+      </p:bgPr>
+    </p:bg>
+    <p:spTree>
+      <p:nvGrpSpPr>
+        <p:cNvPr id="1" name=""/>
+        <p:cNvGrpSpPr/>
+        <p:nvPr/>
+      </p:nvGrpSpPr>
+      <p:grpSpPr>
+        <a:xfrm>
+          <a:off x="0" y="0"/>
+          <a:ext cx="0" cy="0"/>
+          <a:chOff x="0" y="0"/>
+          <a:chExt cx="0" cy="0"/>
+        </a:xfrm>
+      </p:grpSpPr>
+      <p:sp>
+        <p:nvSpPr>
+          <p:cNvPr id="2" name="Title 1">
+            <a:extLst>
+              <a:ext uri="{FF2B5EF4-FFF2-40B4-BE49-F238E27FC236}">
+                <a16:creationId xmlns:a16="http://schemas.microsoft.com/office/drawing/2014/main" id="{331C21C6-7084-FE4F-8FC4-AD73E7446C3F}"/>
+              </a:ext>
+            </a:extLst>
+          </p:cNvPr>
+          <p:cNvSpPr>
+            <a:spLocks noGrp="1"/>
+          </p:cNvSpPr>
+          <p:nvPr>
+            <p:ph type="title"/>
+          </p:nvPr>
+        </p:nvSpPr>
+        <p:spPr>
+          <a:xfrm>
+            <a:off x="593253" y="3425294"/>
+            <a:ext cx="3397924" cy="2800478"/>
+          </a:xfrm>
+        </p:spPr>
+        <p:txBody>
+          <a:bodyPr anchor="ctr">
+            <a:normAutofit/>
+          </a:bodyPr>
+          <a:lstStyle/>
+          <a:p>
+            <a:pPr>
+              <a:lnSpc>
+                <a:spcPct val="90000"/>
+              </a:lnSpc>
+            </a:pPr>
+            <a:r>
+              <a:rPr lang="en-US" sz="2600">
+                <a:solidFill>
+                  <a:srgbClr val="FFFFFF"/>
+                </a:solidFill>
+              </a:rPr>
+              <a:t>When we look only at the non-smokers, WE SEE WOMEN’S CHARGES ARE 13% HIGHER regardless of region</a:t>
+            </a:r>
+          </a:p>
+        </p:txBody>
+      </p:sp>
+      <p:pic>
+        <p:nvPicPr>
+          <p:cNvPr id="40" name="Picture 39" descr="Chart, bar chart&#10;&#10;Description automatically generated">
+            <a:extLst>
+              <a:ext uri="{FF2B5EF4-FFF2-40B4-BE49-F238E27FC236}">
+                <a16:creationId xmlns:a16="http://schemas.microsoft.com/office/drawing/2014/main" id="{C7D3F2F3-62C7-5D4A-A32D-EC5E87F464FD}"/>
+              </a:ext>
+            </a:extLst>
+          </p:cNvPr>
+          <p:cNvPicPr>
+            <a:picLocks noChangeAspect="1"/>
+          </p:cNvPicPr>
+          <p:nvPr/>
+        </p:nvPicPr>
+        <p:blipFill>
+          <a:blip r:embed="rId3"/>
+          <a:stretch>
+            <a:fillRect/>
+          </a:stretch>
+        </p:blipFill>
+        <p:spPr>
+          <a:xfrm>
+            <a:off x="0" y="948285"/>
+            <a:ext cx="5907763" cy="3701249"/>
+          </a:xfrm>
+          <a:prstGeom prst="rect">
+            <a:avLst/>
+          </a:prstGeom>
+        </p:spPr>
+      </p:pic>
+      <p:pic>
+        <p:nvPicPr>
+          <p:cNvPr id="44" name="Picture 43" descr="Chart, bar chart&#10;&#10;Description automatically generated">
+            <a:extLst>
+              <a:ext uri="{FF2B5EF4-FFF2-40B4-BE49-F238E27FC236}">
+                <a16:creationId xmlns:a16="http://schemas.microsoft.com/office/drawing/2014/main" id="{3CFB13C4-83C8-2549-BB21-90A280F2A2C1}"/>
               </a:ext>
             </a:extLst>
           </p:cNvPr>
@@ -7431,12 +7422,14 @@
         </p:nvPicPr>
         <p:blipFill>
           <a:blip r:embed="rId4"/>
-          <a:stretch/>
+          <a:stretch>
+            <a:fillRect/>
+          </a:stretch>
         </p:blipFill>
         <p:spPr>
           <a:xfrm>
-            <a:off x="8188827" y="805372"/>
-            <a:ext cx="3400442" cy="2135543"/>
+            <a:off x="6096000" y="954496"/>
+            <a:ext cx="5886426" cy="3696789"/>
           </a:xfrm>
           <a:prstGeom prst="rect">
             <a:avLst/>
@@ -7445,128 +7438,10 @@
       </p:pic>
       <p:sp>
         <p:nvSpPr>
-          <p:cNvPr id="65" name="Rectangle 61">
+          <p:cNvPr id="67" name="TextBox 66">
             <a:extLst>
               <a:ext uri="{FF2B5EF4-FFF2-40B4-BE49-F238E27FC236}">
-                <a16:creationId xmlns:a16="http://schemas.microsoft.com/office/drawing/2014/main" id="{E125488F-35F4-46B0-BDF0-AFAA3610078B}"/>
-              </a:ext>
-              <a:ext uri="{C183D7F6-B498-43B3-948B-1728B52AA6E4}">
-                <adec:decorative xmlns:adec="http://schemas.microsoft.com/office/drawing/2017/decorative" val="1"/>
-              </a:ext>
-            </a:extLst>
-          </p:cNvPr>
-          <p:cNvSpPr>
-            <a:spLocks noGrp="1" noRot="1" noChangeAspect="1" noMove="1" noResize="1" noEditPoints="1" noAdjustHandles="1" noChangeArrowheads="1" noChangeShapeType="1" noTextEdit="1"/>
-          </p:cNvSpPr>
-          <p:nvPr>
-            <p:extLst>
-              <p:ext uri="{386F3935-93C4-4BCD-93E2-E3B085C9AB24}">
-                <p16:designElem xmlns:p16="http://schemas.microsoft.com/office/powerpoint/2015/main" val="1"/>
-              </p:ext>
-            </p:extLst>
-          </p:nvPr>
-        </p:nvSpPr>
-        <p:spPr>
-          <a:xfrm>
-            <a:off x="8036239" y="654222"/>
-            <a:ext cx="3702878" cy="2437844"/>
-          </a:xfrm>
-          <a:prstGeom prst="rect">
-            <a:avLst/>
-          </a:prstGeom>
-          <a:noFill/>
-          <a:ln w="19050">
-            <a:solidFill>
-              <a:schemeClr val="accent4"/>
-            </a:solidFill>
-          </a:ln>
-        </p:spPr>
-        <p:style>
-          <a:lnRef idx="2">
-            <a:schemeClr val="accent1">
-              <a:shade val="50000"/>
-            </a:schemeClr>
-          </a:lnRef>
-          <a:fillRef idx="1">
-            <a:schemeClr val="accent1"/>
-          </a:fillRef>
-          <a:effectRef idx="0">
-            <a:schemeClr val="accent1"/>
-          </a:effectRef>
-          <a:fontRef idx="minor">
-            <a:schemeClr val="lt1"/>
-          </a:fontRef>
-        </p:style>
-        <p:txBody>
-          <a:bodyPr rtlCol="0" anchor="ctr"/>
-          <a:lstStyle/>
-          <a:p>
-            <a:pPr algn="ctr"/>
-            <a:endParaRPr lang="en-US"/>
-          </a:p>
-        </p:txBody>
-      </p:sp>
-      <p:sp>
-        <p:nvSpPr>
-          <p:cNvPr id="3" name="Content Placeholder 2">
-            <a:extLst>
-              <a:ext uri="{FF2B5EF4-FFF2-40B4-BE49-F238E27FC236}">
-                <a16:creationId xmlns:a16="http://schemas.microsoft.com/office/drawing/2014/main" id="{76D63729-2DCB-9A43-873B-54BA70ED434C}"/>
-              </a:ext>
-            </a:extLst>
-          </p:cNvPr>
-          <p:cNvSpPr>
-            <a:spLocks noGrp="1"/>
-          </p:cNvSpPr>
-          <p:nvPr>
-            <p:ph idx="1"/>
-          </p:nvPr>
-        </p:nvSpPr>
-        <p:spPr>
-          <a:xfrm>
-            <a:off x="4590077" y="3608649"/>
-            <a:ext cx="6864154" cy="2800477"/>
-          </a:xfrm>
-        </p:spPr>
-        <p:txBody>
-          <a:bodyPr>
-            <a:normAutofit/>
-          </a:bodyPr>
-          <a:lstStyle/>
-          <a:p>
-            <a:r>
-              <a:rPr lang="en-US" dirty="0"/>
-              <a:t>Charges for non-smokers, men and women, by region</a:t>
-            </a:r>
-          </a:p>
-          <a:p>
-            <a:r>
-              <a:rPr lang="en-US" dirty="0"/>
-              <a:t>Even accounting for other factors like </a:t>
-            </a:r>
-            <a:r>
-              <a:rPr lang="en-US" dirty="0" err="1"/>
-              <a:t>bmi</a:t>
-            </a:r>
-            <a:r>
-              <a:rPr lang="en-US" dirty="0"/>
-              <a:t>, # of children, age, women’s charges are higher</a:t>
-            </a:r>
-          </a:p>
-          <a:p>
-            <a:r>
-              <a:rPr lang="en-US" dirty="0"/>
-              <a:t>Is there a statistical difference in average charges between men and women?</a:t>
-            </a:r>
-          </a:p>
-        </p:txBody>
-      </p:sp>
-      <p:sp>
-        <p:nvSpPr>
-          <p:cNvPr id="25" name="TextBox 24">
-            <a:extLst>
-              <a:ext uri="{FF2B5EF4-FFF2-40B4-BE49-F238E27FC236}">
-                <a16:creationId xmlns:a16="http://schemas.microsoft.com/office/drawing/2014/main" id="{C7300E78-324F-9C44-98EC-60043FA778C7}"/>
+                <a16:creationId xmlns:a16="http://schemas.microsoft.com/office/drawing/2014/main" id="{6384B291-BB87-A44E-B263-6670D41F25F6}"/>
               </a:ext>
             </a:extLst>
           </p:cNvPr>
@@ -7575,47 +7450,608 @@
         </p:nvSpPr>
         <p:spPr>
           <a:xfrm>
-            <a:off x="873473" y="2731440"/>
-            <a:ext cx="2837481" cy="216747"/>
+            <a:off x="2048892" y="53604"/>
+            <a:ext cx="8944448" cy="369332"/>
           </a:xfrm>
           <a:prstGeom prst="rect">
             <a:avLst/>
           </a:prstGeom>
-          <a:solidFill>
-            <a:srgbClr val="000000">
-              <a:alpha val="50000"/>
-            </a:srgbClr>
-          </a:solidFill>
-          <a:ln>
-            <a:noFill/>
-          </a:ln>
+          <a:noFill/>
         </p:spPr>
         <p:txBody>
           <a:bodyPr wrap="square" rtlCol="0">
-            <a:noAutofit/>
+            <a:spAutoFit/>
           </a:bodyPr>
           <a:lstStyle/>
           <a:p>
-            <a:pPr algn="ctr">
+            <a:r>
+              <a:rPr lang="en-US" b="1" dirty="0">
+                <a:solidFill>
+                  <a:schemeClr val="accent1"/>
+                </a:solidFill>
+              </a:rPr>
+              <a:t>DO GENDER AND REGION SIGNIFICANTLY EFFECT YOUR CHARGES?</a:t>
+            </a:r>
+          </a:p>
+        </p:txBody>
+      </p:sp>
+      <p:sp>
+        <p:nvSpPr>
+          <p:cNvPr id="68" name="TextBox 67">
+            <a:extLst>
+              <a:ext uri="{FF2B5EF4-FFF2-40B4-BE49-F238E27FC236}">
+                <a16:creationId xmlns:a16="http://schemas.microsoft.com/office/drawing/2014/main" id="{E52AE731-8108-D043-B8CB-E5EE820D4998}"/>
+              </a:ext>
+            </a:extLst>
+          </p:cNvPr>
+          <p:cNvSpPr txBox="1"/>
+          <p:nvPr/>
+        </p:nvSpPr>
+        <p:spPr>
+          <a:xfrm>
+            <a:off x="1427709" y="617212"/>
+            <a:ext cx="3641558" cy="369332"/>
+          </a:xfrm>
+          <a:prstGeom prst="rect">
+            <a:avLst/>
+          </a:prstGeom>
+          <a:noFill/>
+        </p:spPr>
+        <p:txBody>
+          <a:bodyPr wrap="square" rtlCol="0">
+            <a:spAutoFit/>
+          </a:bodyPr>
+          <a:lstStyle/>
+          <a:p>
+            <a:r>
+              <a:rPr lang="en-US" dirty="0"/>
+              <a:t>SMOKERS AND NON-SMOKERS</a:t>
+            </a:r>
+          </a:p>
+        </p:txBody>
+      </p:sp>
+      <p:sp>
+        <p:nvSpPr>
+          <p:cNvPr id="69" name="TextBox 68">
+            <a:extLst>
+              <a:ext uri="{FF2B5EF4-FFF2-40B4-BE49-F238E27FC236}">
+                <a16:creationId xmlns:a16="http://schemas.microsoft.com/office/drawing/2014/main" id="{CB1580A4-19BB-CB48-96A1-6BEDE8E8A1F7}"/>
+              </a:ext>
+            </a:extLst>
+          </p:cNvPr>
+          <p:cNvSpPr txBox="1"/>
+          <p:nvPr/>
+        </p:nvSpPr>
+        <p:spPr>
+          <a:xfrm>
+            <a:off x="8149466" y="617212"/>
+            <a:ext cx="3641558" cy="369332"/>
+          </a:xfrm>
+          <a:prstGeom prst="rect">
+            <a:avLst/>
+          </a:prstGeom>
+          <a:noFill/>
+        </p:spPr>
+        <p:txBody>
+          <a:bodyPr wrap="square" rtlCol="0">
+            <a:spAutoFit/>
+          </a:bodyPr>
+          <a:lstStyle/>
+          <a:p>
+            <a:r>
+              <a:rPr lang="en-US" dirty="0"/>
+              <a:t>NON-SMOKERS ONLY</a:t>
+            </a:r>
+          </a:p>
+        </p:txBody>
+      </p:sp>
+      <p:pic>
+        <p:nvPicPr>
+          <p:cNvPr id="71" name="Picture 70" descr="A picture containing table&#10;&#10;Description automatically generated">
+            <a:extLst>
+              <a:ext uri="{FF2B5EF4-FFF2-40B4-BE49-F238E27FC236}">
+                <a16:creationId xmlns:a16="http://schemas.microsoft.com/office/drawing/2014/main" id="{EF0370D4-EADC-354C-8103-F6EB1AD995EF}"/>
+              </a:ext>
+            </a:extLst>
+          </p:cNvPr>
+          <p:cNvPicPr>
+            <a:picLocks noChangeAspect="1"/>
+          </p:cNvPicPr>
+          <p:nvPr/>
+        </p:nvPicPr>
+        <p:blipFill>
+          <a:blip r:embed="rId5"/>
+          <a:stretch>
+            <a:fillRect/>
+          </a:stretch>
+        </p:blipFill>
+        <p:spPr>
+          <a:xfrm>
+            <a:off x="8897280" y="4649534"/>
+            <a:ext cx="1452325" cy="2107295"/>
+          </a:xfrm>
+          <a:prstGeom prst="rect">
+            <a:avLst/>
+          </a:prstGeom>
+        </p:spPr>
+      </p:pic>
+      <p:pic>
+        <p:nvPicPr>
+          <p:cNvPr id="73" name="Picture 72" descr="Table&#10;&#10;Description automatically generated">
+            <a:extLst>
+              <a:ext uri="{FF2B5EF4-FFF2-40B4-BE49-F238E27FC236}">
+                <a16:creationId xmlns:a16="http://schemas.microsoft.com/office/drawing/2014/main" id="{EDA4D66F-1325-6449-999A-FF93C7E1E7FA}"/>
+              </a:ext>
+            </a:extLst>
+          </p:cNvPr>
+          <p:cNvPicPr>
+            <a:picLocks noChangeAspect="1"/>
+          </p:cNvPicPr>
+          <p:nvPr/>
+        </p:nvPicPr>
+        <p:blipFill>
+          <a:blip r:embed="rId6"/>
+          <a:stretch>
+            <a:fillRect/>
+          </a:stretch>
+        </p:blipFill>
+        <p:spPr>
+          <a:xfrm>
+            <a:off x="1776421" y="4707670"/>
+            <a:ext cx="1959584" cy="1991021"/>
+          </a:xfrm>
+          <a:prstGeom prst="rect">
+            <a:avLst/>
+          </a:prstGeom>
+        </p:spPr>
+      </p:pic>
+    </p:spTree>
+    <p:extLst>
+      <p:ext uri="{BB962C8B-B14F-4D97-AF65-F5344CB8AC3E}">
+        <p14:creationId xmlns:p14="http://schemas.microsoft.com/office/powerpoint/2010/main" val="3957755877"/>
+      </p:ext>
+    </p:extLst>
+  </p:cSld>
+  <p:clrMapOvr>
+    <a:masterClrMapping/>
+  </p:clrMapOvr>
+</p:sld>
+</file>
+
+<file path=ppt/slides/slide7.xml><?xml version="1.0" encoding="utf-8"?>
+<p:sld xmlns:a="http://schemas.openxmlformats.org/drawingml/2006/main" xmlns:r="http://schemas.openxmlformats.org/officeDocument/2006/relationships" xmlns:p="http://schemas.openxmlformats.org/presentationml/2006/main">
+  <p:cSld>
+    <p:spTree>
+      <p:nvGrpSpPr>
+        <p:cNvPr id="1" name=""/>
+        <p:cNvGrpSpPr/>
+        <p:nvPr/>
+      </p:nvGrpSpPr>
+      <p:grpSpPr>
+        <a:xfrm>
+          <a:off x="0" y="0"/>
+          <a:ext cx="0" cy="0"/>
+          <a:chOff x="0" y="0"/>
+          <a:chExt cx="0" cy="0"/>
+        </a:xfrm>
+      </p:grpSpPr>
+      <p:sp>
+        <p:nvSpPr>
+          <p:cNvPr id="2" name="Title 1">
+            <a:extLst>
+              <a:ext uri="{FF2B5EF4-FFF2-40B4-BE49-F238E27FC236}">
+                <a16:creationId xmlns:a16="http://schemas.microsoft.com/office/drawing/2014/main" id="{5F86FBD6-CD90-BC4D-8A95-8D3819D84FFB}"/>
+              </a:ext>
+            </a:extLst>
+          </p:cNvPr>
+          <p:cNvSpPr>
+            <a:spLocks noGrp="1"/>
+          </p:cNvSpPr>
+          <p:nvPr>
+            <p:ph type="title"/>
+          </p:nvPr>
+        </p:nvSpPr>
+        <p:spPr/>
+        <p:txBody>
+          <a:bodyPr anchor="t">
+            <a:normAutofit/>
+          </a:bodyPr>
+          <a:lstStyle/>
+          <a:p>
+            <a:pPr algn="ctr"/>
+            <a:r>
+              <a:rPr lang="en-US" sz="2400" dirty="0"/>
+              <a:t>For this data, the difference between women’s avg charges and men’s avg charges was statistically significant.</a:t>
+            </a:r>
+          </a:p>
+        </p:txBody>
+      </p:sp>
+      <p:sp>
+        <p:nvSpPr>
+          <p:cNvPr id="3" name="Content Placeholder 2">
+            <a:extLst>
+              <a:ext uri="{FF2B5EF4-FFF2-40B4-BE49-F238E27FC236}">
+                <a16:creationId xmlns:a16="http://schemas.microsoft.com/office/drawing/2014/main" id="{3B8AD5E0-C112-8345-9BF2-995B9960531B}"/>
+              </a:ext>
+            </a:extLst>
+          </p:cNvPr>
+          <p:cNvSpPr>
+            <a:spLocks noGrp="1"/>
+          </p:cNvSpPr>
+          <p:nvPr>
+            <p:ph idx="1"/>
+          </p:nvPr>
+        </p:nvSpPr>
+        <p:spPr>
+          <a:xfrm>
+            <a:off x="581193" y="2180496"/>
+            <a:ext cx="3140576" cy="3678303"/>
+          </a:xfrm>
+        </p:spPr>
+        <p:txBody>
+          <a:bodyPr/>
+          <a:lstStyle/>
+          <a:p>
+            <a:r>
+              <a:rPr lang="en-US" dirty="0"/>
+              <a:t>BUT I WAS NOT ABLE TO BUILD A RELIABLE LINEAR REGRESSION MODEL</a:t>
+            </a:r>
+          </a:p>
+          <a:p>
+            <a:r>
+              <a:rPr lang="en-US" dirty="0"/>
+              <a:t>THE LOGISTIC REGRESSION MODEL WAS RIGHTONLY  ABOUT ½ THE TIME</a:t>
+            </a:r>
+          </a:p>
+        </p:txBody>
+      </p:sp>
+      <p:sp>
+        <p:nvSpPr>
+          <p:cNvPr id="6" name="Content Placeholder 2">
+            <a:extLst>
+              <a:ext uri="{FF2B5EF4-FFF2-40B4-BE49-F238E27FC236}">
+                <a16:creationId xmlns:a16="http://schemas.microsoft.com/office/drawing/2014/main" id="{29E32849-A66A-0947-980D-FFB012A237D3}"/>
+              </a:ext>
+            </a:extLst>
+          </p:cNvPr>
+          <p:cNvSpPr txBox="1">
+            <a:spLocks/>
+          </p:cNvSpPr>
+          <p:nvPr/>
+        </p:nvSpPr>
+        <p:spPr>
+          <a:xfrm>
+            <a:off x="769716" y="1710593"/>
+            <a:ext cx="11039650" cy="673769"/>
+          </a:xfrm>
+          <a:prstGeom prst="rect">
+            <a:avLst/>
+          </a:prstGeom>
+        </p:spPr>
+        <p:txBody>
+          <a:bodyPr vert="horz" lIns="91440" tIns="45720" rIns="91440" bIns="45720" rtlCol="0" anchor="ctr">
+            <a:normAutofit/>
+          </a:bodyPr>
+          <a:lstStyle>
+            <a:lvl1pPr marL="306000" indent="-306000" algn="l" defTabSz="457200" rtl="0" eaLnBrk="1" latinLnBrk="0" hangingPunct="1">
+              <a:spcBef>
+                <a:spcPct val="20000"/>
+              </a:spcBef>
               <a:spcAft>
                 <a:spcPts val="600"/>
               </a:spcAft>
-            </a:pPr>
-            <a:r>
-              <a:rPr lang="en-US" sz="800">
-                <a:solidFill>
-                  <a:srgbClr val="FFFFFF"/>
-                </a:solidFill>
-              </a:rPr>
-              <a:t>ARE REGION AND GENDER SIGNIFICANTLY RELATED TO COSTS?</a:t>
-            </a:r>
+              <a:buClr>
+                <a:schemeClr val="accent2"/>
+              </a:buClr>
+              <a:buSzPct val="92000"/>
+              <a:buFont typeface="Wingdings 2" panose="05020102010507070707" pitchFamily="18" charset="2"/>
+              <a:buChar char=""/>
+              <a:defRPr sz="1800" kern="1200">
+                <a:solidFill>
+                  <a:schemeClr val="tx2"/>
+                </a:solidFill>
+                <a:latin typeface="+mn-lt"/>
+                <a:ea typeface="+mn-ea"/>
+                <a:cs typeface="+mn-cs"/>
+              </a:defRPr>
+            </a:lvl1pPr>
+            <a:lvl2pPr marL="630000" indent="-306000" algn="l" defTabSz="457200" rtl="0" eaLnBrk="1" latinLnBrk="0" hangingPunct="1">
+              <a:spcBef>
+                <a:spcPct val="20000"/>
+              </a:spcBef>
+              <a:spcAft>
+                <a:spcPts val="600"/>
+              </a:spcAft>
+              <a:buClr>
+                <a:schemeClr val="accent2"/>
+              </a:buClr>
+              <a:buSzPct val="92000"/>
+              <a:buFont typeface="Wingdings 2" panose="05020102010507070707" pitchFamily="18" charset="2"/>
+              <a:buChar char=""/>
+              <a:defRPr sz="1600" kern="1200">
+                <a:solidFill>
+                  <a:schemeClr val="tx2"/>
+                </a:solidFill>
+                <a:latin typeface="+mn-lt"/>
+                <a:ea typeface="+mn-ea"/>
+                <a:cs typeface="+mn-cs"/>
+              </a:defRPr>
+            </a:lvl2pPr>
+            <a:lvl3pPr marL="900000" indent="-270000" algn="l" defTabSz="457200" rtl="0" eaLnBrk="1" latinLnBrk="0" hangingPunct="1">
+              <a:spcBef>
+                <a:spcPct val="20000"/>
+              </a:spcBef>
+              <a:spcAft>
+                <a:spcPts val="600"/>
+              </a:spcAft>
+              <a:buClr>
+                <a:schemeClr val="accent2"/>
+              </a:buClr>
+              <a:buSzPct val="92000"/>
+              <a:buFont typeface="Wingdings 2" panose="05020102010507070707" pitchFamily="18" charset="2"/>
+              <a:buChar char=""/>
+              <a:defRPr sz="1400" kern="1200">
+                <a:solidFill>
+                  <a:schemeClr val="tx2"/>
+                </a:solidFill>
+                <a:latin typeface="+mn-lt"/>
+                <a:ea typeface="+mn-ea"/>
+                <a:cs typeface="+mn-cs"/>
+              </a:defRPr>
+            </a:lvl3pPr>
+            <a:lvl4pPr marL="1242000" indent="-234000" algn="l" defTabSz="457200" rtl="0" eaLnBrk="1" latinLnBrk="0" hangingPunct="1">
+              <a:spcBef>
+                <a:spcPct val="20000"/>
+              </a:spcBef>
+              <a:spcAft>
+                <a:spcPts val="600"/>
+              </a:spcAft>
+              <a:buClr>
+                <a:schemeClr val="accent2"/>
+              </a:buClr>
+              <a:buSzPct val="92000"/>
+              <a:buFont typeface="Wingdings 2" panose="05020102010507070707" pitchFamily="18" charset="2"/>
+              <a:buChar char=""/>
+              <a:defRPr sz="1200" kern="1200">
+                <a:solidFill>
+                  <a:schemeClr val="tx2"/>
+                </a:solidFill>
+                <a:latin typeface="+mn-lt"/>
+                <a:ea typeface="+mn-ea"/>
+                <a:cs typeface="+mn-cs"/>
+              </a:defRPr>
+            </a:lvl4pPr>
+            <a:lvl5pPr marL="1602000" indent="-234000" algn="l" defTabSz="457200" rtl="0" eaLnBrk="1" latinLnBrk="0" hangingPunct="1">
+              <a:spcBef>
+                <a:spcPct val="20000"/>
+              </a:spcBef>
+              <a:spcAft>
+                <a:spcPts val="600"/>
+              </a:spcAft>
+              <a:buClr>
+                <a:schemeClr val="accent2"/>
+              </a:buClr>
+              <a:buSzPct val="92000"/>
+              <a:buFont typeface="Wingdings 2" panose="05020102010507070707" pitchFamily="18" charset="2"/>
+              <a:buChar char=""/>
+              <a:defRPr sz="1200" kern="1200">
+                <a:solidFill>
+                  <a:schemeClr val="tx2"/>
+                </a:solidFill>
+                <a:latin typeface="+mn-lt"/>
+                <a:ea typeface="+mn-ea"/>
+                <a:cs typeface="+mn-cs"/>
+              </a:defRPr>
+            </a:lvl5pPr>
+            <a:lvl6pPr marL="1900000" indent="-228600" algn="l" defTabSz="457200" rtl="0" eaLnBrk="1" latinLnBrk="0" hangingPunct="1">
+              <a:spcBef>
+                <a:spcPct val="20000"/>
+              </a:spcBef>
+              <a:spcAft>
+                <a:spcPts val="600"/>
+              </a:spcAft>
+              <a:buClr>
+                <a:schemeClr val="accent2"/>
+              </a:buClr>
+              <a:buSzPct val="92000"/>
+              <a:buFont typeface="Wingdings 2" panose="05020102010507070707" pitchFamily="18" charset="2"/>
+              <a:buChar char=""/>
+              <a:defRPr sz="1200" kern="1200">
+                <a:solidFill>
+                  <a:schemeClr val="tx2"/>
+                </a:solidFill>
+                <a:latin typeface="+mn-lt"/>
+                <a:ea typeface="+mn-ea"/>
+                <a:cs typeface="+mn-cs"/>
+              </a:defRPr>
+            </a:lvl6pPr>
+            <a:lvl7pPr marL="2200000" indent="-228600" algn="l" defTabSz="457200" rtl="0" eaLnBrk="1" latinLnBrk="0" hangingPunct="1">
+              <a:spcBef>
+                <a:spcPct val="20000"/>
+              </a:spcBef>
+              <a:spcAft>
+                <a:spcPts val="600"/>
+              </a:spcAft>
+              <a:buClr>
+                <a:schemeClr val="accent2"/>
+              </a:buClr>
+              <a:buSzPct val="92000"/>
+              <a:buFont typeface="Wingdings 2" panose="05020102010507070707" pitchFamily="18" charset="2"/>
+              <a:buChar char=""/>
+              <a:defRPr sz="1200" kern="1200">
+                <a:solidFill>
+                  <a:schemeClr val="tx2"/>
+                </a:solidFill>
+                <a:latin typeface="+mn-lt"/>
+                <a:ea typeface="+mn-ea"/>
+                <a:cs typeface="+mn-cs"/>
+              </a:defRPr>
+            </a:lvl7pPr>
+            <a:lvl8pPr marL="2500000" indent="-228600" algn="l" defTabSz="457200" rtl="0" eaLnBrk="1" latinLnBrk="0" hangingPunct="1">
+              <a:spcBef>
+                <a:spcPct val="20000"/>
+              </a:spcBef>
+              <a:spcAft>
+                <a:spcPts val="600"/>
+              </a:spcAft>
+              <a:buClr>
+                <a:schemeClr val="accent2"/>
+              </a:buClr>
+              <a:buSzPct val="92000"/>
+              <a:buFont typeface="Wingdings 2" panose="05020102010507070707" pitchFamily="18" charset="2"/>
+              <a:buChar char=""/>
+              <a:defRPr sz="1200" kern="1200">
+                <a:solidFill>
+                  <a:schemeClr val="tx2"/>
+                </a:solidFill>
+                <a:latin typeface="+mn-lt"/>
+                <a:ea typeface="+mn-ea"/>
+                <a:cs typeface="+mn-cs"/>
+              </a:defRPr>
+            </a:lvl8pPr>
+            <a:lvl9pPr marL="2800000" indent="-228600" algn="l" defTabSz="457200" rtl="0" eaLnBrk="1" latinLnBrk="0" hangingPunct="1">
+              <a:spcBef>
+                <a:spcPct val="20000"/>
+              </a:spcBef>
+              <a:spcAft>
+                <a:spcPts val="600"/>
+              </a:spcAft>
+              <a:buClr>
+                <a:schemeClr val="accent2"/>
+              </a:buClr>
+              <a:buSzPct val="92000"/>
+              <a:buFont typeface="Wingdings 2" panose="05020102010507070707" pitchFamily="18" charset="2"/>
+              <a:buChar char=""/>
+              <a:defRPr sz="1200" kern="1200">
+                <a:solidFill>
+                  <a:schemeClr val="tx2"/>
+                </a:solidFill>
+                <a:latin typeface="+mn-lt"/>
+                <a:ea typeface="+mn-ea"/>
+                <a:cs typeface="+mn-cs"/>
+              </a:defRPr>
+            </a:lvl9pPr>
+          </a:lstStyle>
+          <a:p>
+            <a:r>
+              <a:rPr lang="en-US"/>
+              <a:t>Even if you don’t smoke, where you live can significantly effect your charges</a:t>
+            </a:r>
+          </a:p>
+          <a:p>
+            <a:r>
+              <a:rPr lang="en-US"/>
+              <a:t>If you are a woman, gender and where you live effect your charges</a:t>
+            </a:r>
+            <a:endParaRPr lang="en-US" dirty="0"/>
           </a:p>
         </p:txBody>
       </p:sp>
     </p:spTree>
     <p:extLst>
       <p:ext uri="{BB962C8B-B14F-4D97-AF65-F5344CB8AC3E}">
-        <p14:creationId xmlns:p14="http://schemas.microsoft.com/office/powerpoint/2010/main" val="1812117299"/>
+        <p14:creationId xmlns:p14="http://schemas.microsoft.com/office/powerpoint/2010/main" val="3973478709"/>
+      </p:ext>
+    </p:extLst>
+  </p:cSld>
+  <p:clrMapOvr>
+    <a:masterClrMapping/>
+  </p:clrMapOvr>
+</p:sld>
+</file>
+
+<file path=ppt/slides/slide8.xml><?xml version="1.0" encoding="utf-8"?>
+<p:sld xmlns:a="http://schemas.openxmlformats.org/drawingml/2006/main" xmlns:r="http://schemas.openxmlformats.org/officeDocument/2006/relationships" xmlns:p="http://schemas.openxmlformats.org/presentationml/2006/main">
+  <p:cSld>
+    <p:spTree>
+      <p:nvGrpSpPr>
+        <p:cNvPr id="1" name=""/>
+        <p:cNvGrpSpPr/>
+        <p:nvPr/>
+      </p:nvGrpSpPr>
+      <p:grpSpPr>
+        <a:xfrm>
+          <a:off x="0" y="0"/>
+          <a:ext cx="0" cy="0"/>
+          <a:chOff x="0" y="0"/>
+          <a:chExt cx="0" cy="0"/>
+        </a:xfrm>
+      </p:grpSpPr>
+      <p:sp>
+        <p:nvSpPr>
+          <p:cNvPr id="2" name="Title 1">
+            <a:extLst>
+              <a:ext uri="{FF2B5EF4-FFF2-40B4-BE49-F238E27FC236}">
+                <a16:creationId xmlns:a16="http://schemas.microsoft.com/office/drawing/2014/main" id="{5711F0C9-5508-FA40-84B9-72BE20D837C5}"/>
+              </a:ext>
+            </a:extLst>
+          </p:cNvPr>
+          <p:cNvSpPr>
+            <a:spLocks noGrp="1"/>
+          </p:cNvSpPr>
+          <p:nvPr>
+            <p:ph type="title"/>
+          </p:nvPr>
+        </p:nvSpPr>
+        <p:spPr/>
+        <p:txBody>
+          <a:bodyPr/>
+          <a:lstStyle/>
+          <a:p>
+            <a:r>
+              <a:rPr lang="en-US" dirty="0"/>
+              <a:t>SUMMARY AND NEXT STEPS</a:t>
+            </a:r>
+          </a:p>
+        </p:txBody>
+      </p:sp>
+      <p:sp>
+        <p:nvSpPr>
+          <p:cNvPr id="3" name="Content Placeholder 2">
+            <a:extLst>
+              <a:ext uri="{FF2B5EF4-FFF2-40B4-BE49-F238E27FC236}">
+                <a16:creationId xmlns:a16="http://schemas.microsoft.com/office/drawing/2014/main" id="{A987A90A-01B4-D24B-9E4D-132228FE1AEC}"/>
+              </a:ext>
+            </a:extLst>
+          </p:cNvPr>
+          <p:cNvSpPr>
+            <a:spLocks noGrp="1"/>
+          </p:cNvSpPr>
+          <p:nvPr>
+            <p:ph idx="1"/>
+          </p:nvPr>
+        </p:nvSpPr>
+        <p:spPr/>
+        <p:txBody>
+          <a:bodyPr anchor="t"/>
+          <a:lstStyle/>
+          <a:p>
+            <a:endParaRPr lang="en-US" dirty="0"/>
+          </a:p>
+          <a:p>
+            <a:r>
+              <a:rPr lang="en-US" dirty="0"/>
+              <a:t>EXPLORE OTHER TYPES OF STATISTICAL MODELS  THAT MIGHT FIT THE DATA BETTER</a:t>
+            </a:r>
+          </a:p>
+          <a:p>
+            <a:r>
+              <a:rPr lang="en-US" dirty="0"/>
+              <a:t>THE DATA SET WAS LIMITED IN SIZE AND SCOPE, REPEAT PROJECT WITH MORE DETAILED AND LARGER DATA SETS</a:t>
+            </a:r>
+          </a:p>
+          <a:p>
+            <a:r>
+              <a:rPr lang="en-US" dirty="0"/>
+              <a:t>EXPLORE UNEXPLAINED DATA ANOMOLIES AND BIMODAL ACTIVITY </a:t>
+            </a:r>
+          </a:p>
+        </p:txBody>
+      </p:sp>
+    </p:spTree>
+    <p:extLst>
+      <p:ext uri="{BB962C8B-B14F-4D97-AF65-F5344CB8AC3E}">
+        <p14:creationId xmlns:p14="http://schemas.microsoft.com/office/powerpoint/2010/main" val="82148327"/>
       </p:ext>
     </p:extLst>
   </p:cSld>
@@ -7647,7 +8083,7 @@
           <p:cNvPr id="2" name="Title 1">
             <a:extLst>
               <a:ext uri="{FF2B5EF4-FFF2-40B4-BE49-F238E27FC236}">
-                <a16:creationId xmlns:a16="http://schemas.microsoft.com/office/drawing/2014/main" id="{5F86FBD6-CD90-BC4D-8A95-8D3819D84FFB}"/>
+                <a16:creationId xmlns:a16="http://schemas.microsoft.com/office/drawing/2014/main" id="{71BD1667-0455-594F-AB36-C17B22BE530A}"/>
               </a:ext>
             </a:extLst>
           </p:cNvPr>
@@ -7658,18 +8094,20 @@
             <p:ph type="title"/>
           </p:nvPr>
         </p:nvSpPr>
-        <p:spPr/>
-        <p:txBody>
-          <a:bodyPr anchor="t">
-            <a:normAutofit/>
-          </a:bodyPr>
+        <p:spPr>
+          <a:xfrm>
+            <a:off x="581192" y="702156"/>
+            <a:ext cx="11029616" cy="1140932"/>
+          </a:xfrm>
+        </p:spPr>
+        <p:txBody>
+          <a:bodyPr anchor="t"/>
           <a:lstStyle/>
           <a:p>
-            <a:pPr algn="ctr"/>
-            <a:r>
-              <a:rPr lang="en-US" sz="2400" dirty="0"/>
-              <a:t>For this data, the difference between women’s avg charges and men’s avg charges was statistically significant.</a:t>
-            </a:r>
+            <a:br>
+              <a:rPr lang="en-US" dirty="0"/>
+            </a:br>
+            <a:endParaRPr lang="en-US" dirty="0"/>
           </a:p>
         </p:txBody>
       </p:sp>
@@ -7678,7 +8116,7 @@
           <p:cNvPr id="3" name="Content Placeholder 2">
             <a:extLst>
               <a:ext uri="{FF2B5EF4-FFF2-40B4-BE49-F238E27FC236}">
-                <a16:creationId xmlns:a16="http://schemas.microsoft.com/office/drawing/2014/main" id="{3B8AD5E0-C112-8345-9BF2-995B9960531B}"/>
+                <a16:creationId xmlns:a16="http://schemas.microsoft.com/office/drawing/2014/main" id="{CD723FF6-03FF-4B49-A8EF-E97D5FD4C2C6}"/>
               </a:ext>
             </a:extLst>
           </p:cNvPr>
@@ -7691,8 +8129,8 @@
         </p:nvSpPr>
         <p:spPr>
           <a:xfrm>
-            <a:off x="581193" y="2180496"/>
-            <a:ext cx="3140576" cy="3678303"/>
+            <a:off x="6734175" y="2451958"/>
+            <a:ext cx="4876633" cy="3434492"/>
           </a:xfrm>
         </p:spPr>
         <p:txBody>
@@ -7701,21 +8139,69 @@
           <a:p>
             <a:r>
               <a:rPr lang="en-US" dirty="0"/>
-              <a:t>BUT I WAS NOT ABLE TO BUILD A RELIABLE LINEAR REGRESSION MODEL</a:t>
+              <a:t>Can gender be used to predict insurance charges?</a:t>
             </a:r>
           </a:p>
           <a:p>
             <a:r>
               <a:rPr lang="en-US" dirty="0"/>
-              <a:t>THE LOGISTIC REGRESSION MODEL WAS RIGHTONLY  ABOUT ½ THE TIME</a:t>
-            </a:r>
+              <a:t>Is the difference in charges between men and women in this data set statistically significant?</a:t>
+            </a:r>
+          </a:p>
+          <a:p>
+            <a:r>
+              <a:rPr lang="en-US" dirty="0"/>
+              <a:t>Does the region in which you live effect your charges?</a:t>
+            </a:r>
+          </a:p>
+        </p:txBody>
+      </p:sp>
+      <p:sp>
+        <p:nvSpPr>
+          <p:cNvPr id="4" name="TextBox 3">
+            <a:extLst>
+              <a:ext uri="{FF2B5EF4-FFF2-40B4-BE49-F238E27FC236}">
+                <a16:creationId xmlns:a16="http://schemas.microsoft.com/office/drawing/2014/main" id="{4A3DD61A-D5EC-2F45-8574-EA3D6EF6EF48}"/>
+              </a:ext>
+            </a:extLst>
+          </p:cNvPr>
+          <p:cNvSpPr txBox="1"/>
+          <p:nvPr/>
+        </p:nvSpPr>
+        <p:spPr>
+          <a:xfrm>
+            <a:off x="328613" y="3015042"/>
+            <a:ext cx="5924382" cy="2308324"/>
+          </a:xfrm>
+          <a:prstGeom prst="rect">
+            <a:avLst/>
+          </a:prstGeom>
+          <a:noFill/>
+        </p:spPr>
+        <p:txBody>
+          <a:bodyPr wrap="square" rtlCol="0" anchor="ctr">
+            <a:spAutoFit/>
+          </a:bodyPr>
+          <a:lstStyle/>
+          <a:p>
+            <a:r>
+              <a:rPr lang="en-US" dirty="0"/>
+              <a:t>“While women and men both feel the impact of health costs, such as insurance premiums, co-payments, and deductibles, they can be particularly burdensome for women who on average earn lower wages, have fewer financial assets, accumulate less wealth, and have higher rates of poverty than men.” - </a:t>
+            </a:r>
+            <a:r>
+              <a:rPr lang="en-US" sz="1400" b="1" i="1" dirty="0"/>
+              <a:t>Women's Coverage, Access, and Affordability: Key Findings from the 2017 Kaiser Women’s Health Survey</a:t>
+            </a:r>
+          </a:p>
+          <a:p>
+            <a:endParaRPr lang="en-US" dirty="0"/>
           </a:p>
         </p:txBody>
       </p:sp>
     </p:spTree>
     <p:extLst>
       <p:ext uri="{BB962C8B-B14F-4D97-AF65-F5344CB8AC3E}">
-        <p14:creationId xmlns:p14="http://schemas.microsoft.com/office/powerpoint/2010/main" val="3973478709"/>
+        <p14:creationId xmlns:p14="http://schemas.microsoft.com/office/powerpoint/2010/main" val="2365626266"/>
       </p:ext>
     </p:extLst>
   </p:cSld>

</xml_diff>